<commit_message>
DDP paper, bibliography, and diagrams update
</commit_message>
<xml_diff>
--- a/Documents/PropellantOptimalJournal/ddp/Diagrams.pptx
+++ b/Documents/PropellantOptimalJournal/ddp/Diagrams.pptx
@@ -6,10 +6,12 @@
   </p:sldMasterIdLst>
   <p:sldIdLst>
     <p:sldId id="256" r:id="rId2"/>
-    <p:sldId id="257" r:id="rId3"/>
-    <p:sldId id="259" r:id="rId4"/>
-    <p:sldId id="258" r:id="rId5"/>
-    <p:sldId id="260" r:id="rId6"/>
+    <p:sldId id="261" r:id="rId3"/>
+    <p:sldId id="262" r:id="rId4"/>
+    <p:sldId id="257" r:id="rId5"/>
+    <p:sldId id="259" r:id="rId6"/>
+    <p:sldId id="258" r:id="rId7"/>
+    <p:sldId id="260" r:id="rId8"/>
   </p:sldIdLst>
   <p:sldSz cx="12192000" cy="6858000"/>
   <p:notesSz cx="6858000" cy="9144000"/>
@@ -245,7 +247,7 @@
           <a:p>
             <a:fld id="{073BE5FF-B486-411D-A066-5813E4596693}" type="datetimeFigureOut">
               <a:rPr lang="en-US" smtClean="0"/>
-              <a:t>1/25/2021</a:t>
+              <a:t>2/17/2021</a:t>
             </a:fld>
             <a:endParaRPr lang="en-US"/>
           </a:p>
@@ -413,7 +415,7 @@
           <a:p>
             <a:fld id="{073BE5FF-B486-411D-A066-5813E4596693}" type="datetimeFigureOut">
               <a:rPr lang="en-US" smtClean="0"/>
-              <a:t>1/25/2021</a:t>
+              <a:t>2/17/2021</a:t>
             </a:fld>
             <a:endParaRPr lang="en-US"/>
           </a:p>
@@ -591,7 +593,7 @@
           <a:p>
             <a:fld id="{073BE5FF-B486-411D-A066-5813E4596693}" type="datetimeFigureOut">
               <a:rPr lang="en-US" smtClean="0"/>
-              <a:t>1/25/2021</a:t>
+              <a:t>2/17/2021</a:t>
             </a:fld>
             <a:endParaRPr lang="en-US"/>
           </a:p>
@@ -759,7 +761,7 @@
           <a:p>
             <a:fld id="{073BE5FF-B486-411D-A066-5813E4596693}" type="datetimeFigureOut">
               <a:rPr lang="en-US" smtClean="0"/>
-              <a:t>1/25/2021</a:t>
+              <a:t>2/17/2021</a:t>
             </a:fld>
             <a:endParaRPr lang="en-US"/>
           </a:p>
@@ -1004,7 +1006,7 @@
           <a:p>
             <a:fld id="{073BE5FF-B486-411D-A066-5813E4596693}" type="datetimeFigureOut">
               <a:rPr lang="en-US" smtClean="0"/>
-              <a:t>1/25/2021</a:t>
+              <a:t>2/17/2021</a:t>
             </a:fld>
             <a:endParaRPr lang="en-US"/>
           </a:p>
@@ -1233,7 +1235,7 @@
           <a:p>
             <a:fld id="{073BE5FF-B486-411D-A066-5813E4596693}" type="datetimeFigureOut">
               <a:rPr lang="en-US" smtClean="0"/>
-              <a:t>1/25/2021</a:t>
+              <a:t>2/17/2021</a:t>
             </a:fld>
             <a:endParaRPr lang="en-US"/>
           </a:p>
@@ -1597,7 +1599,7 @@
           <a:p>
             <a:fld id="{073BE5FF-B486-411D-A066-5813E4596693}" type="datetimeFigureOut">
               <a:rPr lang="en-US" smtClean="0"/>
-              <a:t>1/25/2021</a:t>
+              <a:t>2/17/2021</a:t>
             </a:fld>
             <a:endParaRPr lang="en-US"/>
           </a:p>
@@ -1714,7 +1716,7 @@
           <a:p>
             <a:fld id="{073BE5FF-B486-411D-A066-5813E4596693}" type="datetimeFigureOut">
               <a:rPr lang="en-US" smtClean="0"/>
-              <a:t>1/25/2021</a:t>
+              <a:t>2/17/2021</a:t>
             </a:fld>
             <a:endParaRPr lang="en-US"/>
           </a:p>
@@ -1809,7 +1811,7 @@
           <a:p>
             <a:fld id="{073BE5FF-B486-411D-A066-5813E4596693}" type="datetimeFigureOut">
               <a:rPr lang="en-US" smtClean="0"/>
-              <a:t>1/25/2021</a:t>
+              <a:t>2/17/2021</a:t>
             </a:fld>
             <a:endParaRPr lang="en-US"/>
           </a:p>
@@ -2084,7 +2086,7 @@
           <a:p>
             <a:fld id="{073BE5FF-B486-411D-A066-5813E4596693}" type="datetimeFigureOut">
               <a:rPr lang="en-US" smtClean="0"/>
-              <a:t>1/25/2021</a:t>
+              <a:t>2/17/2021</a:t>
             </a:fld>
             <a:endParaRPr lang="en-US"/>
           </a:p>
@@ -2336,7 +2338,7 @@
           <a:p>
             <a:fld id="{073BE5FF-B486-411D-A066-5813E4596693}" type="datetimeFigureOut">
               <a:rPr lang="en-US" smtClean="0"/>
-              <a:t>1/25/2021</a:t>
+              <a:t>2/17/2021</a:t>
             </a:fld>
             <a:endParaRPr lang="en-US"/>
           </a:p>
@@ -2547,7 +2549,7 @@
           <a:p>
             <a:fld id="{073BE5FF-B486-411D-A066-5813E4596693}" type="datetimeFigureOut">
               <a:rPr lang="en-US" smtClean="0"/>
-              <a:t>1/25/2021</a:t>
+              <a:t>2/17/2021</a:t>
             </a:fld>
             <a:endParaRPr lang="en-US"/>
           </a:p>
@@ -2961,7 +2963,7 @@
           <p:nvPr>
             <p:extLst>
               <p:ext uri="{D42A27DB-BD31-4B8C-83A1-F6EECF244321}">
-                <p14:modId xmlns:p14="http://schemas.microsoft.com/office/powerpoint/2010/main" val="2387893964"/>
+                <p14:modId xmlns:p14="http://schemas.microsoft.com/office/powerpoint/2010/main" val="2994139687"/>
               </p:ext>
             </p:extLst>
           </p:nvPr>
@@ -2980,35 +2982,35 @@
                 <a:gridCol w="692129">
                   <a:extLst>
                     <a:ext uri="{9D8B030D-6E8A-4147-A177-3AD203B41FA5}">
-                      <a16:colId xmlns:a16="http://schemas.microsoft.com/office/drawing/2014/main" xmlns="" val="20000"/>
+                      <a16:colId xmlns:a16="http://schemas.microsoft.com/office/drawing/2014/main" val="20000"/>
                     </a:ext>
                   </a:extLst>
                 </a:gridCol>
                 <a:gridCol w="1030076">
                   <a:extLst>
                     <a:ext uri="{9D8B030D-6E8A-4147-A177-3AD203B41FA5}">
-                      <a16:colId xmlns:a16="http://schemas.microsoft.com/office/drawing/2014/main" xmlns="" val="20001"/>
+                      <a16:colId xmlns:a16="http://schemas.microsoft.com/office/drawing/2014/main" val="20001"/>
                     </a:ext>
                   </a:extLst>
                 </a:gridCol>
                 <a:gridCol w="1175269">
                   <a:extLst>
                     <a:ext uri="{9D8B030D-6E8A-4147-A177-3AD203B41FA5}">
-                      <a16:colId xmlns:a16="http://schemas.microsoft.com/office/drawing/2014/main" xmlns="" val="20003"/>
+                      <a16:colId xmlns:a16="http://schemas.microsoft.com/office/drawing/2014/main" val="20003"/>
                     </a:ext>
                   </a:extLst>
                 </a:gridCol>
                 <a:gridCol w="1028316">
                   <a:extLst>
                     <a:ext uri="{9D8B030D-6E8A-4147-A177-3AD203B41FA5}">
-                      <a16:colId xmlns:a16="http://schemas.microsoft.com/office/drawing/2014/main" xmlns="" val="20004"/>
+                      <a16:colId xmlns:a16="http://schemas.microsoft.com/office/drawing/2014/main" val="20004"/>
                     </a:ext>
                   </a:extLst>
                 </a:gridCol>
                 <a:gridCol w="1028316">
                   <a:extLst>
                     <a:ext uri="{9D8B030D-6E8A-4147-A177-3AD203B41FA5}">
-                      <a16:colId xmlns:a16="http://schemas.microsoft.com/office/drawing/2014/main" xmlns="" val="20005"/>
+                      <a16:colId xmlns:a16="http://schemas.microsoft.com/office/drawing/2014/main" val="20005"/>
                     </a:ext>
                   </a:extLst>
                 </a:gridCol>
@@ -3108,7 +3110,7 @@
                 </a:tc>
                 <a:extLst>
                   <a:ext uri="{0D108BD9-81ED-4DB2-BD59-A6C34878D82A}">
-                    <a16:rowId xmlns:a16="http://schemas.microsoft.com/office/drawing/2014/main" xmlns="" val="10000"/>
+                    <a16:rowId xmlns:a16="http://schemas.microsoft.com/office/drawing/2014/main" val="10000"/>
                   </a:ext>
                 </a:extLst>
               </a:tr>
@@ -3149,7 +3151,7 @@
                       <a:pPr algn="ctr"/>
                       <a:r>
                         <a:rPr lang="en-US" sz="1200" dirty="0"/>
-                        <a:t>6.369</a:t>
+                        <a:t>6.387</a:t>
                       </a:r>
                     </a:p>
                   </a:txBody>
@@ -3163,7 +3165,7 @@
                       <a:pPr algn="ctr"/>
                       <a:r>
                         <a:rPr lang="en-US" sz="1200" dirty="0"/>
-                        <a:t>3.036</a:t>
+                        <a:t>2.863</a:t>
                       </a:r>
                     </a:p>
                   </a:txBody>
@@ -3177,7 +3179,7 @@
                       <a:pPr algn="ctr"/>
                       <a:r>
                         <a:rPr lang="en-US" sz="1200" dirty="0"/>
-                        <a:t>20.311</a:t>
+                        <a:t>17.663</a:t>
                       </a:r>
                     </a:p>
                   </a:txBody>
@@ -3185,7 +3187,7 @@
                 </a:tc>
                 <a:extLst>
                   <a:ext uri="{0D108BD9-81ED-4DB2-BD59-A6C34878D82A}">
-                    <a16:rowId xmlns:a16="http://schemas.microsoft.com/office/drawing/2014/main" xmlns="" val="10004"/>
+                    <a16:rowId xmlns:a16="http://schemas.microsoft.com/office/drawing/2014/main" val="10004"/>
                   </a:ext>
                 </a:extLst>
               </a:tr>
@@ -3226,7 +3228,7 @@
                       <a:pPr algn="ctr"/>
                       <a:r>
                         <a:rPr lang="en-US" sz="1200" dirty="0"/>
-                        <a:t>6.101</a:t>
+                        <a:t>6.200</a:t>
                       </a:r>
                     </a:p>
                   </a:txBody>
@@ -3240,7 +3242,7 @@
                       <a:pPr algn="ctr"/>
                       <a:r>
                         <a:rPr lang="en-US" sz="1200" dirty="0"/>
-                        <a:t>3.450</a:t>
+                        <a:t>3.532</a:t>
                       </a:r>
                     </a:p>
                   </a:txBody>
@@ -3254,7 +3256,7 @@
                       <a:pPr algn="ctr"/>
                       <a:r>
                         <a:rPr lang="en-US" sz="1200" dirty="0"/>
-                        <a:t>15.756</a:t>
+                        <a:t>14.055</a:t>
                       </a:r>
                     </a:p>
                   </a:txBody>
@@ -3262,7 +3264,7 @@
                 </a:tc>
                 <a:extLst>
                   <a:ext uri="{0D108BD9-81ED-4DB2-BD59-A6C34878D82A}">
-                    <a16:rowId xmlns:a16="http://schemas.microsoft.com/office/drawing/2014/main" xmlns="" val="10005"/>
+                    <a16:rowId xmlns:a16="http://schemas.microsoft.com/office/drawing/2014/main" val="10005"/>
                   </a:ext>
                 </a:extLst>
               </a:tr>
@@ -3303,7 +3305,7 @@
                       <a:pPr algn="ctr"/>
                       <a:r>
                         <a:rPr lang="en-US" sz="1200" dirty="0"/>
-                        <a:t>4.793</a:t>
+                        <a:t>4.808</a:t>
                       </a:r>
                     </a:p>
                   </a:txBody>
@@ -3317,7 +3319,7 @@
                       <a:pPr algn="ctr"/>
                       <a:r>
                         <a:rPr lang="en-US" sz="1200" dirty="0"/>
-                        <a:t>2.359</a:t>
+                        <a:t>2.365</a:t>
                       </a:r>
                     </a:p>
                   </a:txBody>
@@ -3331,7 +3333,7 @@
                       <a:pPr algn="ctr"/>
                       <a:r>
                         <a:rPr lang="en-US" sz="1200" dirty="0"/>
-                        <a:t>7.843</a:t>
+                        <a:t>3.726</a:t>
                       </a:r>
                     </a:p>
                   </a:txBody>
@@ -3339,7 +3341,7 @@
                 </a:tc>
                 <a:extLst>
                   <a:ext uri="{0D108BD9-81ED-4DB2-BD59-A6C34878D82A}">
-                    <a16:rowId xmlns:a16="http://schemas.microsoft.com/office/drawing/2014/main" xmlns="" val="10006"/>
+                    <a16:rowId xmlns:a16="http://schemas.microsoft.com/office/drawing/2014/main" val="10006"/>
                   </a:ext>
                 </a:extLst>
               </a:tr>
@@ -3354,7 +3356,7 @@
               <p:cNvPr id="3" name="Table 2">
                 <a:extLst>
                   <a:ext uri="{FF2B5EF4-FFF2-40B4-BE49-F238E27FC236}">
-                    <a16:creationId xmlns:a16="http://schemas.microsoft.com/office/drawing/2014/main" xmlns="" id="{D0EB71A3-46E8-4D14-8C66-7AA2857B02D9}"/>
+                    <a16:creationId xmlns:a16="http://schemas.microsoft.com/office/drawing/2014/main" id="{D0EB71A3-46E8-4D14-8C66-7AA2857B02D9}"/>
                   </a:ext>
                 </a:extLst>
               </p:cNvPr>
@@ -3364,7 +3366,7 @@
               <p:nvPr>
                 <p:extLst>
                   <p:ext uri="{D42A27DB-BD31-4B8C-83A1-F6EECF244321}">
-                    <p14:modId xmlns:p14="http://schemas.microsoft.com/office/powerpoint/2010/main" val="2505350980"/>
+                    <p14:modId xmlns:p14="http://schemas.microsoft.com/office/powerpoint/2010/main" val="2046063666"/>
                   </p:ext>
                 </p:extLst>
               </p:nvPr>
@@ -3383,35 +3385,35 @@
                     <a:gridCol w="665566">
                       <a:extLst>
                         <a:ext uri="{9D8B030D-6E8A-4147-A177-3AD203B41FA5}">
-                          <a16:colId xmlns:a16="http://schemas.microsoft.com/office/drawing/2014/main" xmlns="" val="20000"/>
+                          <a16:colId xmlns:a16="http://schemas.microsoft.com/office/drawing/2014/main" val="20000"/>
                         </a:ext>
                       </a:extLst>
                     </a:gridCol>
                     <a:gridCol w="1018270">
                       <a:extLst>
                         <a:ext uri="{9D8B030D-6E8A-4147-A177-3AD203B41FA5}">
-                          <a16:colId xmlns:a16="http://schemas.microsoft.com/office/drawing/2014/main" xmlns="" val="20002"/>
+                          <a16:colId xmlns:a16="http://schemas.microsoft.com/office/drawing/2014/main" val="20002"/>
                         </a:ext>
                       </a:extLst>
                     </a:gridCol>
                     <a:gridCol w="1174700">
                       <a:extLst>
                         <a:ext uri="{9D8B030D-6E8A-4147-A177-3AD203B41FA5}">
-                          <a16:colId xmlns:a16="http://schemas.microsoft.com/office/drawing/2014/main" xmlns="" val="20003"/>
+                          <a16:colId xmlns:a16="http://schemas.microsoft.com/office/drawing/2014/main" val="20003"/>
                         </a:ext>
                       </a:extLst>
                     </a:gridCol>
                     <a:gridCol w="1106056">
                       <a:extLst>
                         <a:ext uri="{9D8B030D-6E8A-4147-A177-3AD203B41FA5}">
-                          <a16:colId xmlns:a16="http://schemas.microsoft.com/office/drawing/2014/main" xmlns="" val="20004"/>
+                          <a16:colId xmlns:a16="http://schemas.microsoft.com/office/drawing/2014/main" val="20004"/>
                         </a:ext>
                       </a:extLst>
                     </a:gridCol>
                     <a:gridCol w="989514">
                       <a:extLst>
                         <a:ext uri="{9D8B030D-6E8A-4147-A177-3AD203B41FA5}">
-                          <a16:colId xmlns:a16="http://schemas.microsoft.com/office/drawing/2014/main" xmlns="" val="20005"/>
+                          <a16:colId xmlns:a16="http://schemas.microsoft.com/office/drawing/2014/main" val="20005"/>
                         </a:ext>
                       </a:extLst>
                     </a:gridCol>
@@ -3506,7 +3508,7 @@
                     </a:tc>
                     <a:extLst>
                       <a:ext uri="{0D108BD9-81ED-4DB2-BD59-A6C34878D82A}">
-                        <a16:rowId xmlns:a16="http://schemas.microsoft.com/office/drawing/2014/main" xmlns="" val="10000"/>
+                        <a16:rowId xmlns:a16="http://schemas.microsoft.com/office/drawing/2014/main" val="10000"/>
                       </a:ext>
                     </a:extLst>
                   </a:tr>
@@ -3653,35 +3655,35 @@
                           <a:pPr algn="ctr"/>
                           <a:r>
                             <a:rPr lang="en-US" sz="1200" dirty="0"/>
-                            <a:t>7.119</a:t>
-                          </a:r>
-                        </a:p>
-                      </a:txBody>
-                      <a:tcPr anchor="ctr"/>
-                    </a:tc>
-                    <a:tc>
-                      <a:txBody>
-                        <a:bodyPr/>
-                        <a:lstStyle/>
-                        <a:p>
-                          <a:pPr algn="ctr"/>
-                          <a:r>
-                            <a:rPr lang="en-US" sz="1200" dirty="0"/>
-                            <a:t>4.049</a:t>
-                          </a:r>
-                        </a:p>
-                      </a:txBody>
-                      <a:tcPr anchor="ctr"/>
-                    </a:tc>
-                    <a:tc>
-                      <a:txBody>
-                        <a:bodyPr/>
-                        <a:lstStyle/>
-                        <a:p>
-                          <a:pPr algn="ctr"/>
-                          <a:r>
-                            <a:rPr lang="en-US" sz="1200" dirty="0"/>
-                            <a:t>19.651</a:t>
+                            <a:t>6.326</a:t>
+                          </a:r>
+                        </a:p>
+                      </a:txBody>
+                      <a:tcPr anchor="ctr"/>
+                    </a:tc>
+                    <a:tc>
+                      <a:txBody>
+                        <a:bodyPr/>
+                        <a:lstStyle/>
+                        <a:p>
+                          <a:pPr algn="ctr"/>
+                          <a:r>
+                            <a:rPr lang="en-US" sz="1200" dirty="0"/>
+                            <a:t>3.312</a:t>
+                          </a:r>
+                        </a:p>
+                      </a:txBody>
+                      <a:tcPr anchor="ctr"/>
+                    </a:tc>
+                    <a:tc>
+                      <a:txBody>
+                        <a:bodyPr/>
+                        <a:lstStyle/>
+                        <a:p>
+                          <a:pPr algn="ctr"/>
+                          <a:r>
+                            <a:rPr lang="en-US" sz="1200" dirty="0"/>
+                            <a:t>15.530</a:t>
                           </a:r>
                         </a:p>
                       </a:txBody>
@@ -3689,7 +3691,7 @@
                     </a:tc>
                     <a:extLst>
                       <a:ext uri="{0D108BD9-81ED-4DB2-BD59-A6C34878D82A}">
-                        <a16:rowId xmlns:a16="http://schemas.microsoft.com/office/drawing/2014/main" xmlns="" val="10001"/>
+                        <a16:rowId xmlns:a16="http://schemas.microsoft.com/office/drawing/2014/main" val="10001"/>
                       </a:ext>
                     </a:extLst>
                   </a:tr>
@@ -3829,35 +3831,35 @@
                           <a:pPr algn="ctr"/>
                           <a:r>
                             <a:rPr lang="en-US" sz="1200" dirty="0"/>
-                            <a:t>6.821</a:t>
-                          </a:r>
-                        </a:p>
-                      </a:txBody>
-                      <a:tcPr anchor="ctr"/>
-                    </a:tc>
-                    <a:tc>
-                      <a:txBody>
-                        <a:bodyPr/>
-                        <a:lstStyle/>
-                        <a:p>
-                          <a:pPr algn="ctr"/>
-                          <a:r>
-                            <a:rPr lang="en-US" sz="1200" dirty="0"/>
-                            <a:t>4.526</a:t>
-                          </a:r>
-                        </a:p>
-                      </a:txBody>
-                      <a:tcPr anchor="ctr"/>
-                    </a:tc>
-                    <a:tc>
-                      <a:txBody>
-                        <a:bodyPr/>
-                        <a:lstStyle/>
-                        <a:p>
-                          <a:pPr algn="ctr"/>
-                          <a:r>
-                            <a:rPr lang="en-US" sz="1200" dirty="0"/>
-                            <a:t>16.519</a:t>
+                            <a:t>6.064</a:t>
+                          </a:r>
+                        </a:p>
+                      </a:txBody>
+                      <a:tcPr anchor="ctr"/>
+                    </a:tc>
+                    <a:tc>
+                      <a:txBody>
+                        <a:bodyPr/>
+                        <a:lstStyle/>
+                        <a:p>
+                          <a:pPr algn="ctr"/>
+                          <a:r>
+                            <a:rPr lang="en-US" sz="1200" dirty="0"/>
+                            <a:t>3.708</a:t>
+                          </a:r>
+                        </a:p>
+                      </a:txBody>
+                      <a:tcPr anchor="ctr"/>
+                    </a:tc>
+                    <a:tc>
+                      <a:txBody>
+                        <a:bodyPr/>
+                        <a:lstStyle/>
+                        <a:p>
+                          <a:pPr algn="ctr"/>
+                          <a:r>
+                            <a:rPr lang="en-US" sz="1200" dirty="0"/>
+                            <a:t>11.729</a:t>
                           </a:r>
                         </a:p>
                       </a:txBody>
@@ -3865,7 +3867,7 @@
                     </a:tc>
                     <a:extLst>
                       <a:ext uri="{0D108BD9-81ED-4DB2-BD59-A6C34878D82A}">
-                        <a16:rowId xmlns:a16="http://schemas.microsoft.com/office/drawing/2014/main" xmlns="" val="10002"/>
+                        <a16:rowId xmlns:a16="http://schemas.microsoft.com/office/drawing/2014/main" val="10002"/>
                       </a:ext>
                     </a:extLst>
                   </a:tr>
@@ -4005,35 +4007,35 @@
                           <a:pPr algn="ctr"/>
                           <a:r>
                             <a:rPr lang="en-US" sz="1200" dirty="0"/>
-                            <a:t>5.437</a:t>
-                          </a:r>
-                        </a:p>
-                      </a:txBody>
-                      <a:tcPr anchor="ctr"/>
-                    </a:tc>
-                    <a:tc>
-                      <a:txBody>
-                        <a:bodyPr/>
-                        <a:lstStyle/>
-                        <a:p>
-                          <a:pPr algn="ctr"/>
-                          <a:r>
-                            <a:rPr lang="en-US" sz="1200" dirty="0"/>
-                            <a:t>3.197</a:t>
-                          </a:r>
-                        </a:p>
-                      </a:txBody>
-                      <a:tcPr anchor="ctr"/>
-                    </a:tc>
-                    <a:tc>
-                      <a:txBody>
-                        <a:bodyPr/>
-                        <a:lstStyle/>
-                        <a:p>
-                          <a:pPr algn="ctr"/>
-                          <a:r>
-                            <a:rPr lang="en-US" sz="1200" dirty="0"/>
-                            <a:t>5.774</a:t>
+                            <a:t>4.843</a:t>
+                          </a:r>
+                        </a:p>
+                      </a:txBody>
+                      <a:tcPr anchor="ctr"/>
+                    </a:tc>
+                    <a:tc>
+                      <a:txBody>
+                        <a:bodyPr/>
+                        <a:lstStyle/>
+                        <a:p>
+                          <a:pPr algn="ctr"/>
+                          <a:r>
+                            <a:rPr lang="en-US" sz="1200" dirty="0"/>
+                            <a:t>2.583</a:t>
+                          </a:r>
+                        </a:p>
+                      </a:txBody>
+                      <a:tcPr anchor="ctr"/>
+                    </a:tc>
+                    <a:tc>
+                      <a:txBody>
+                        <a:bodyPr/>
+                        <a:lstStyle/>
+                        <a:p>
+                          <a:pPr algn="ctr"/>
+                          <a:r>
+                            <a:rPr lang="en-US" sz="1200" dirty="0"/>
+                            <a:t>2.276</a:t>
                           </a:r>
                         </a:p>
                       </a:txBody>
@@ -4041,7 +4043,7 @@
                     </a:tc>
                     <a:extLst>
                       <a:ext uri="{0D108BD9-81ED-4DB2-BD59-A6C34878D82A}">
-                        <a16:rowId xmlns:a16="http://schemas.microsoft.com/office/drawing/2014/main" xmlns="" val="10003"/>
+                        <a16:rowId xmlns:a16="http://schemas.microsoft.com/office/drawing/2014/main" val="10003"/>
                       </a:ext>
                     </a:extLst>
                   </a:tr>
@@ -4056,7 +4058,7 @@
               <p:cNvPr id="3" name="Table 2">
                 <a:extLst>
                   <a:ext uri="{FF2B5EF4-FFF2-40B4-BE49-F238E27FC236}">
-                    <a16:creationId xmlns:a16="http://schemas.microsoft.com/office/drawing/2014/main" xmlns:a14="http://schemas.microsoft.com/office/drawing/2010/main" xmlns="" id="{D0EB71A3-46E8-4D14-8C66-7AA2857B02D9}"/>
+                    <a16:creationId xmlns:a16="http://schemas.microsoft.com/office/drawing/2014/main" id="{D0EB71A3-46E8-4D14-8C66-7AA2857B02D9}"/>
                   </a:ext>
                 </a:extLst>
               </p:cNvPr>
@@ -4066,7 +4068,7 @@
               <p:nvPr>
                 <p:extLst>
                   <p:ext uri="{D42A27DB-BD31-4B8C-83A1-F6EECF244321}">
-                    <p14:modId xmlns:p14="http://schemas.microsoft.com/office/powerpoint/2010/main" val="2505350980"/>
+                    <p14:modId xmlns:p14="http://schemas.microsoft.com/office/powerpoint/2010/main" val="2046063666"/>
                   </p:ext>
                 </p:extLst>
               </p:nvPr>
@@ -4085,35 +4087,35 @@
                     <a:gridCol w="665566">
                       <a:extLst>
                         <a:ext uri="{9D8B030D-6E8A-4147-A177-3AD203B41FA5}">
-                          <a16:colId xmlns:a16="http://schemas.microsoft.com/office/drawing/2014/main" xmlns:a14="http://schemas.microsoft.com/office/drawing/2010/main" xmlns="" val="20000"/>
+                          <a16:colId xmlns:a16="http://schemas.microsoft.com/office/drawing/2014/main" val="20000"/>
                         </a:ext>
                       </a:extLst>
                     </a:gridCol>
                     <a:gridCol w="1018270">
                       <a:extLst>
                         <a:ext uri="{9D8B030D-6E8A-4147-A177-3AD203B41FA5}">
-                          <a16:colId xmlns:a16="http://schemas.microsoft.com/office/drawing/2014/main" xmlns:a14="http://schemas.microsoft.com/office/drawing/2010/main" xmlns="" val="20002"/>
+                          <a16:colId xmlns:a16="http://schemas.microsoft.com/office/drawing/2014/main" val="20002"/>
                         </a:ext>
                       </a:extLst>
                     </a:gridCol>
                     <a:gridCol w="1174700">
                       <a:extLst>
                         <a:ext uri="{9D8B030D-6E8A-4147-A177-3AD203B41FA5}">
-                          <a16:colId xmlns:a16="http://schemas.microsoft.com/office/drawing/2014/main" xmlns:a14="http://schemas.microsoft.com/office/drawing/2010/main" xmlns="" val="20003"/>
+                          <a16:colId xmlns:a16="http://schemas.microsoft.com/office/drawing/2014/main" val="20003"/>
                         </a:ext>
                       </a:extLst>
                     </a:gridCol>
                     <a:gridCol w="1106056">
                       <a:extLst>
                         <a:ext uri="{9D8B030D-6E8A-4147-A177-3AD203B41FA5}">
-                          <a16:colId xmlns:a16="http://schemas.microsoft.com/office/drawing/2014/main" xmlns:a14="http://schemas.microsoft.com/office/drawing/2010/main" xmlns="" val="20004"/>
+                          <a16:colId xmlns:a16="http://schemas.microsoft.com/office/drawing/2014/main" val="20004"/>
                         </a:ext>
                       </a:extLst>
                     </a:gridCol>
                     <a:gridCol w="989514">
                       <a:extLst>
                         <a:ext uri="{9D8B030D-6E8A-4147-A177-3AD203B41FA5}">
-                          <a16:colId xmlns:a16="http://schemas.microsoft.com/office/drawing/2014/main" xmlns:a14="http://schemas.microsoft.com/office/drawing/2010/main" xmlns="" val="20005"/>
+                          <a16:colId xmlns:a16="http://schemas.microsoft.com/office/drawing/2014/main" val="20005"/>
                         </a:ext>
                       </a:extLst>
                     </a:gridCol>
@@ -4208,7 +4210,7 @@
                     </a:tc>
                     <a:extLst>
                       <a:ext uri="{0D108BD9-81ED-4DB2-BD59-A6C34878D82A}">
-                        <a16:rowId xmlns:a16="http://schemas.microsoft.com/office/drawing/2014/main" xmlns:a14="http://schemas.microsoft.com/office/drawing/2010/main" xmlns="" val="10000"/>
+                        <a16:rowId xmlns:a16="http://schemas.microsoft.com/office/drawing/2014/main" val="10000"/>
                       </a:ext>
                     </a:extLst>
                   </a:tr>
@@ -4236,7 +4238,7 @@
                         </a:p>
                       </a:txBody>
                       <a:tcPr anchor="ctr">
-                        <a:blipFill rotWithShape="0">
+                        <a:blipFill>
                           <a:blip r:embed="rId2"/>
                           <a:stretch>
                             <a:fillRect l="-65269" t="-101316" r="-323353" b="-200000"/>
@@ -4252,35 +4254,35 @@
                           <a:pPr algn="ctr"/>
                           <a:r>
                             <a:rPr lang="en-US" sz="1200" dirty="0"/>
-                            <a:t>7.119</a:t>
-                          </a:r>
-                        </a:p>
-                      </a:txBody>
-                      <a:tcPr anchor="ctr"/>
-                    </a:tc>
-                    <a:tc>
-                      <a:txBody>
-                        <a:bodyPr/>
-                        <a:lstStyle/>
-                        <a:p>
-                          <a:pPr algn="ctr"/>
-                          <a:r>
-                            <a:rPr lang="en-US" sz="1200" dirty="0"/>
-                            <a:t>4.049</a:t>
-                          </a:r>
-                        </a:p>
-                      </a:txBody>
-                      <a:tcPr anchor="ctr"/>
-                    </a:tc>
-                    <a:tc>
-                      <a:txBody>
-                        <a:bodyPr/>
-                        <a:lstStyle/>
-                        <a:p>
-                          <a:pPr algn="ctr"/>
-                          <a:r>
-                            <a:rPr lang="en-US" sz="1200" dirty="0"/>
-                            <a:t>19.651</a:t>
+                            <a:t>6.326</a:t>
+                          </a:r>
+                        </a:p>
+                      </a:txBody>
+                      <a:tcPr anchor="ctr"/>
+                    </a:tc>
+                    <a:tc>
+                      <a:txBody>
+                        <a:bodyPr/>
+                        <a:lstStyle/>
+                        <a:p>
+                          <a:pPr algn="ctr"/>
+                          <a:r>
+                            <a:rPr lang="en-US" sz="1200" dirty="0"/>
+                            <a:t>3.312</a:t>
+                          </a:r>
+                        </a:p>
+                      </a:txBody>
+                      <a:tcPr anchor="ctr"/>
+                    </a:tc>
+                    <a:tc>
+                      <a:txBody>
+                        <a:bodyPr/>
+                        <a:lstStyle/>
+                        <a:p>
+                          <a:pPr algn="ctr"/>
+                          <a:r>
+                            <a:rPr lang="en-US" sz="1200" dirty="0"/>
+                            <a:t>15.530</a:t>
                           </a:r>
                         </a:p>
                       </a:txBody>
@@ -4288,7 +4290,7 @@
                     </a:tc>
                     <a:extLst>
                       <a:ext uri="{0D108BD9-81ED-4DB2-BD59-A6C34878D82A}">
-                        <a16:rowId xmlns:a16="http://schemas.microsoft.com/office/drawing/2014/main" xmlns:a14="http://schemas.microsoft.com/office/drawing/2010/main" xmlns="" val="10001"/>
+                        <a16:rowId xmlns:a16="http://schemas.microsoft.com/office/drawing/2014/main" val="10001"/>
                       </a:ext>
                     </a:extLst>
                   </a:tr>
@@ -4316,7 +4318,7 @@
                         </a:p>
                       </a:txBody>
                       <a:tcPr anchor="ctr">
-                        <a:blipFill rotWithShape="0">
+                        <a:blipFill>
                           <a:blip r:embed="rId2"/>
                           <a:stretch>
                             <a:fillRect l="-65269" t="-204000" r="-323353" b="-102667"/>
@@ -4332,35 +4334,35 @@
                           <a:pPr algn="ctr"/>
                           <a:r>
                             <a:rPr lang="en-US" sz="1200" dirty="0"/>
-                            <a:t>6.821</a:t>
-                          </a:r>
-                        </a:p>
-                      </a:txBody>
-                      <a:tcPr anchor="ctr"/>
-                    </a:tc>
-                    <a:tc>
-                      <a:txBody>
-                        <a:bodyPr/>
-                        <a:lstStyle/>
-                        <a:p>
-                          <a:pPr algn="ctr"/>
-                          <a:r>
-                            <a:rPr lang="en-US" sz="1200" dirty="0"/>
-                            <a:t>4.526</a:t>
-                          </a:r>
-                        </a:p>
-                      </a:txBody>
-                      <a:tcPr anchor="ctr"/>
-                    </a:tc>
-                    <a:tc>
-                      <a:txBody>
-                        <a:bodyPr/>
-                        <a:lstStyle/>
-                        <a:p>
-                          <a:pPr algn="ctr"/>
-                          <a:r>
-                            <a:rPr lang="en-US" sz="1200" dirty="0"/>
-                            <a:t>16.519</a:t>
+                            <a:t>6.064</a:t>
+                          </a:r>
+                        </a:p>
+                      </a:txBody>
+                      <a:tcPr anchor="ctr"/>
+                    </a:tc>
+                    <a:tc>
+                      <a:txBody>
+                        <a:bodyPr/>
+                        <a:lstStyle/>
+                        <a:p>
+                          <a:pPr algn="ctr"/>
+                          <a:r>
+                            <a:rPr lang="en-US" sz="1200" dirty="0"/>
+                            <a:t>3.708</a:t>
+                          </a:r>
+                        </a:p>
+                      </a:txBody>
+                      <a:tcPr anchor="ctr"/>
+                    </a:tc>
+                    <a:tc>
+                      <a:txBody>
+                        <a:bodyPr/>
+                        <a:lstStyle/>
+                        <a:p>
+                          <a:pPr algn="ctr"/>
+                          <a:r>
+                            <a:rPr lang="en-US" sz="1200" dirty="0"/>
+                            <a:t>11.729</a:t>
                           </a:r>
                         </a:p>
                       </a:txBody>
@@ -4368,7 +4370,7 @@
                     </a:tc>
                     <a:extLst>
                       <a:ext uri="{0D108BD9-81ED-4DB2-BD59-A6C34878D82A}">
-                        <a16:rowId xmlns:a16="http://schemas.microsoft.com/office/drawing/2014/main" xmlns:a14="http://schemas.microsoft.com/office/drawing/2010/main" xmlns="" val="10002"/>
+                        <a16:rowId xmlns:a16="http://schemas.microsoft.com/office/drawing/2014/main" val="10002"/>
                       </a:ext>
                     </a:extLst>
                   </a:tr>
@@ -4396,7 +4398,7 @@
                         </a:p>
                       </a:txBody>
                       <a:tcPr anchor="ctr">
-                        <a:blipFill rotWithShape="0">
+                        <a:blipFill>
                           <a:blip r:embed="rId2"/>
                           <a:stretch>
                             <a:fillRect l="-65269" t="-304000" r="-323353" b="-2667"/>
@@ -4412,35 +4414,35 @@
                           <a:pPr algn="ctr"/>
                           <a:r>
                             <a:rPr lang="en-US" sz="1200" dirty="0"/>
-                            <a:t>5.437</a:t>
-                          </a:r>
-                        </a:p>
-                      </a:txBody>
-                      <a:tcPr anchor="ctr"/>
-                    </a:tc>
-                    <a:tc>
-                      <a:txBody>
-                        <a:bodyPr/>
-                        <a:lstStyle/>
-                        <a:p>
-                          <a:pPr algn="ctr"/>
-                          <a:r>
-                            <a:rPr lang="en-US" sz="1200" dirty="0"/>
-                            <a:t>3.197</a:t>
-                          </a:r>
-                        </a:p>
-                      </a:txBody>
-                      <a:tcPr anchor="ctr"/>
-                    </a:tc>
-                    <a:tc>
-                      <a:txBody>
-                        <a:bodyPr/>
-                        <a:lstStyle/>
-                        <a:p>
-                          <a:pPr algn="ctr"/>
-                          <a:r>
-                            <a:rPr lang="en-US" sz="1200" dirty="0"/>
-                            <a:t>5.774</a:t>
+                            <a:t>4.843</a:t>
+                          </a:r>
+                        </a:p>
+                      </a:txBody>
+                      <a:tcPr anchor="ctr"/>
+                    </a:tc>
+                    <a:tc>
+                      <a:txBody>
+                        <a:bodyPr/>
+                        <a:lstStyle/>
+                        <a:p>
+                          <a:pPr algn="ctr"/>
+                          <a:r>
+                            <a:rPr lang="en-US" sz="1200" dirty="0"/>
+                            <a:t>2.583</a:t>
+                          </a:r>
+                        </a:p>
+                      </a:txBody>
+                      <a:tcPr anchor="ctr"/>
+                    </a:tc>
+                    <a:tc>
+                      <a:txBody>
+                        <a:bodyPr/>
+                        <a:lstStyle/>
+                        <a:p>
+                          <a:pPr algn="ctr"/>
+                          <a:r>
+                            <a:rPr lang="en-US" sz="1200" dirty="0"/>
+                            <a:t>2.276</a:t>
                           </a:r>
                         </a:p>
                       </a:txBody>
@@ -4448,7 +4450,7 @@
                     </a:tc>
                     <a:extLst>
                       <a:ext uri="{0D108BD9-81ED-4DB2-BD59-A6C34878D82A}">
-                        <a16:rowId xmlns:a16="http://schemas.microsoft.com/office/drawing/2014/main" xmlns:a14="http://schemas.microsoft.com/office/drawing/2010/main" xmlns="" val="10003"/>
+                        <a16:rowId xmlns:a16="http://schemas.microsoft.com/office/drawing/2014/main" val="10003"/>
                       </a:ext>
                     </a:extLst>
                   </a:tr>
@@ -4458,6 +4460,41 @@
           </p:graphicFrame>
         </mc:Fallback>
       </mc:AlternateContent>
+      <p:sp>
+        <p:nvSpPr>
+          <p:cNvPr id="2" name="TextBox 1">
+            <a:extLst>
+              <a:ext uri="{FF2B5EF4-FFF2-40B4-BE49-F238E27FC236}">
+                <a16:creationId xmlns:a16="http://schemas.microsoft.com/office/drawing/2014/main" id="{AA70D9EB-9FA9-459F-981E-5061D572C3E4}"/>
+              </a:ext>
+            </a:extLst>
+          </p:cNvPr>
+          <p:cNvSpPr txBox="1"/>
+          <p:nvPr/>
+        </p:nvSpPr>
+        <p:spPr>
+          <a:xfrm>
+            <a:off x="6946711" y="655093"/>
+            <a:ext cx="2083455" cy="369332"/>
+          </a:xfrm>
+          <a:prstGeom prst="rect">
+            <a:avLst/>
+          </a:prstGeom>
+          <a:noFill/>
+        </p:spPr>
+        <p:txBody>
+          <a:bodyPr wrap="none" rtlCol="0">
+            <a:spAutoFit/>
+          </a:bodyPr>
+          <a:lstStyle/>
+          <a:p>
+            <a:r>
+              <a:rPr lang="en-US" dirty="0"/>
+              <a:t>Fixed, nominal gains</a:t>
+            </a:r>
+          </a:p>
+        </p:txBody>
+      </p:sp>
     </p:spTree>
     <p:extLst>
       <p:ext uri="{BB962C8B-B14F-4D97-AF65-F5344CB8AC3E}">
@@ -4472,6 +4509,3148 @@
 </file>
 
 <file path=ppt/slides/slide2.xml><?xml version="1.0" encoding="utf-8"?>
+<p:sld xmlns:a="http://schemas.openxmlformats.org/drawingml/2006/main" xmlns:r="http://schemas.openxmlformats.org/officeDocument/2006/relationships" xmlns:p="http://schemas.openxmlformats.org/presentationml/2006/main">
+  <p:cSld>
+    <p:spTree>
+      <p:nvGrpSpPr>
+        <p:cNvPr id="1" name=""/>
+        <p:cNvGrpSpPr/>
+        <p:nvPr/>
+      </p:nvGrpSpPr>
+      <p:grpSpPr>
+        <a:xfrm>
+          <a:off x="0" y="0"/>
+          <a:ext cx="0" cy="0"/>
+          <a:chOff x="0" y="0"/>
+          <a:chExt cx="0" cy="0"/>
+        </a:xfrm>
+      </p:grpSpPr>
+      <p:graphicFrame>
+        <p:nvGraphicFramePr>
+          <p:cNvPr id="4" name="Table 3"/>
+          <p:cNvGraphicFramePr>
+            <a:graphicFrameLocks noGrp="1"/>
+          </p:cNvGraphicFramePr>
+          <p:nvPr>
+            <p:extLst>
+              <p:ext uri="{D42A27DB-BD31-4B8C-83A1-F6EECF244321}">
+                <p14:modId xmlns:p14="http://schemas.microsoft.com/office/powerpoint/2010/main" val="746430633"/>
+              </p:ext>
+            </p:extLst>
+          </p:nvPr>
+        </p:nvGraphicFramePr>
+        <p:xfrm>
+          <a:off x="1181652" y="556233"/>
+          <a:ext cx="4954106" cy="1828798"/>
+        </p:xfrm>
+        <a:graphic>
+          <a:graphicData uri="http://schemas.openxmlformats.org/drawingml/2006/table">
+            <a:tbl>
+              <a:tblPr firstRow="1" bandRow="1">
+                <a:tableStyleId>{8EC20E35-A176-4012-BC5E-935CFFF8708E}</a:tableStyleId>
+              </a:tblPr>
+              <a:tblGrid>
+                <a:gridCol w="692129">
+                  <a:extLst>
+                    <a:ext uri="{9D8B030D-6E8A-4147-A177-3AD203B41FA5}">
+                      <a16:colId xmlns:a16="http://schemas.microsoft.com/office/drawing/2014/main" val="20000"/>
+                    </a:ext>
+                  </a:extLst>
+                </a:gridCol>
+                <a:gridCol w="1030076">
+                  <a:extLst>
+                    <a:ext uri="{9D8B030D-6E8A-4147-A177-3AD203B41FA5}">
+                      <a16:colId xmlns:a16="http://schemas.microsoft.com/office/drawing/2014/main" val="20001"/>
+                    </a:ext>
+                  </a:extLst>
+                </a:gridCol>
+                <a:gridCol w="1175269">
+                  <a:extLst>
+                    <a:ext uri="{9D8B030D-6E8A-4147-A177-3AD203B41FA5}">
+                      <a16:colId xmlns:a16="http://schemas.microsoft.com/office/drawing/2014/main" val="20003"/>
+                    </a:ext>
+                  </a:extLst>
+                </a:gridCol>
+                <a:gridCol w="1028316">
+                  <a:extLst>
+                    <a:ext uri="{9D8B030D-6E8A-4147-A177-3AD203B41FA5}">
+                      <a16:colId xmlns:a16="http://schemas.microsoft.com/office/drawing/2014/main" val="20004"/>
+                    </a:ext>
+                  </a:extLst>
+                </a:gridCol>
+                <a:gridCol w="1028316">
+                  <a:extLst>
+                    <a:ext uri="{9D8B030D-6E8A-4147-A177-3AD203B41FA5}">
+                      <a16:colId xmlns:a16="http://schemas.microsoft.com/office/drawing/2014/main" val="20005"/>
+                    </a:ext>
+                  </a:extLst>
+                </a:gridCol>
+              </a:tblGrid>
+              <a:tr h="532660">
+                <a:tc>
+                  <a:txBody>
+                    <a:bodyPr/>
+                    <a:lstStyle/>
+                    <a:p>
+                      <a:pPr algn="ctr"/>
+                      <a:r>
+                        <a:rPr lang="en-US" sz="1200" dirty="0"/>
+                        <a:t>Case</a:t>
+                      </a:r>
+                    </a:p>
+                  </a:txBody>
+                  <a:tcPr anchor="ctr"/>
+                </a:tc>
+                <a:tc>
+                  <a:txBody>
+                    <a:bodyPr/>
+                    <a:lstStyle/>
+                    <a:p>
+                      <a:pPr algn="ctr"/>
+                      <a:r>
+                        <a:rPr lang="en-US" sz="1200" dirty="0"/>
+                        <a:t>Bank</a:t>
+                      </a:r>
+                      <a:r>
+                        <a:rPr lang="en-US" sz="1200" baseline="0" dirty="0"/>
+                        <a:t> Angle Limits</a:t>
+                      </a:r>
+                      <a:endParaRPr lang="en-US" sz="1200" dirty="0"/>
+                    </a:p>
+                  </a:txBody>
+                  <a:tcPr anchor="ctr"/>
+                </a:tc>
+                <a:tc>
+                  <a:txBody>
+                    <a:bodyPr/>
+                    <a:lstStyle/>
+                    <a:p>
+                      <a:pPr algn="ctr"/>
+                      <a:r>
+                        <a:rPr lang="en-US" sz="1200" dirty="0"/>
+                        <a:t>Mean Altitude (km)</a:t>
+                      </a:r>
+                    </a:p>
+                  </a:txBody>
+                  <a:tcPr anchor="ctr"/>
+                </a:tc>
+                <a:tc>
+                  <a:txBody>
+                    <a:bodyPr/>
+                    <a:lstStyle/>
+                    <a:p>
+                      <a:pPr algn="ctr"/>
+                      <a:r>
+                        <a:rPr lang="en-US" sz="1200" dirty="0"/>
+                        <a:t>3</a:t>
+                      </a:r>
+                      <a:r>
+                        <a:rPr lang="el-GR" sz="1200" dirty="0"/>
+                        <a:t>σ</a:t>
+                      </a:r>
+                      <a:r>
+                        <a:rPr lang="en-US" sz="1200" baseline="0" dirty="0"/>
+                        <a:t> Low Altitude (km)</a:t>
+                      </a:r>
+                      <a:endParaRPr lang="en-US" sz="1200" dirty="0"/>
+                    </a:p>
+                  </a:txBody>
+                  <a:tcPr anchor="ctr"/>
+                </a:tc>
+                <a:tc>
+                  <a:txBody>
+                    <a:bodyPr/>
+                    <a:lstStyle/>
+                    <a:p>
+                      <a:pPr algn="ctr"/>
+                      <a:r>
+                        <a:rPr lang="en-US" sz="1200" dirty="0"/>
+                        <a:t>3</a:t>
+                      </a:r>
+                      <a:r>
+                        <a:rPr lang="el-GR" sz="1200" dirty="0"/>
+                        <a:t>σ</a:t>
+                      </a:r>
+                      <a:r>
+                        <a:rPr lang="en-US" sz="1200" dirty="0"/>
+                        <a:t> Range Error (km)</a:t>
+                      </a:r>
+                    </a:p>
+                  </a:txBody>
+                  <a:tcPr anchor="ctr"/>
+                </a:tc>
+                <a:extLst>
+                  <a:ext uri="{0D108BD9-81ED-4DB2-BD59-A6C34878D82A}">
+                    <a16:rowId xmlns:a16="http://schemas.microsoft.com/office/drawing/2014/main" val="10000"/>
+                  </a:ext>
+                </a:extLst>
+              </a:tr>
+              <a:tr h="432046">
+                <a:tc>
+                  <a:txBody>
+                    <a:bodyPr/>
+                    <a:lstStyle/>
+                    <a:p>
+                      <a:pPr algn="ctr"/>
+                      <a:r>
+                        <a:rPr lang="en-US" sz="1200" dirty="0"/>
+                        <a:t>1</a:t>
+                      </a:r>
+                    </a:p>
+                  </a:txBody>
+                  <a:tcPr anchor="ctr"/>
+                </a:tc>
+                <a:tc>
+                  <a:txBody>
+                    <a:bodyPr/>
+                    <a:lstStyle/>
+                    <a:p>
+                      <a:pPr algn="ctr"/>
+                      <a:r>
+                        <a:rPr lang="en-US" sz="1200" dirty="0"/>
+                        <a:t>[0°,   90°]</a:t>
+                      </a:r>
+                    </a:p>
+                  </a:txBody>
+                  <a:tcPr anchor="ctr"/>
+                </a:tc>
+                <a:tc>
+                  <a:txBody>
+                    <a:bodyPr/>
+                    <a:lstStyle/>
+                    <a:p>
+                      <a:pPr algn="ctr"/>
+                      <a:r>
+                        <a:rPr lang="en-US" sz="1200" dirty="0"/>
+                        <a:t>6.438</a:t>
+                      </a:r>
+                    </a:p>
+                  </a:txBody>
+                  <a:tcPr anchor="ctr"/>
+                </a:tc>
+                <a:tc>
+                  <a:txBody>
+                    <a:bodyPr/>
+                    <a:lstStyle/>
+                    <a:p>
+                      <a:pPr algn="ctr"/>
+                      <a:r>
+                        <a:rPr lang="en-US" sz="1200" dirty="0"/>
+                        <a:t>3.043</a:t>
+                      </a:r>
+                    </a:p>
+                  </a:txBody>
+                  <a:tcPr anchor="ctr"/>
+                </a:tc>
+                <a:tc>
+                  <a:txBody>
+                    <a:bodyPr/>
+                    <a:lstStyle/>
+                    <a:p>
+                      <a:pPr algn="ctr"/>
+                      <a:r>
+                        <a:rPr lang="en-US" sz="1200" dirty="0"/>
+                        <a:t>18.504</a:t>
+                      </a:r>
+                    </a:p>
+                  </a:txBody>
+                  <a:tcPr anchor="ctr"/>
+                </a:tc>
+                <a:extLst>
+                  <a:ext uri="{0D108BD9-81ED-4DB2-BD59-A6C34878D82A}">
+                    <a16:rowId xmlns:a16="http://schemas.microsoft.com/office/drawing/2014/main" val="10004"/>
+                  </a:ext>
+                </a:extLst>
+              </a:tr>
+              <a:tr h="432046">
+                <a:tc>
+                  <a:txBody>
+                    <a:bodyPr/>
+                    <a:lstStyle/>
+                    <a:p>
+                      <a:pPr algn="ctr"/>
+                      <a:r>
+                        <a:rPr lang="en-US" sz="1200" dirty="0"/>
+                        <a:t>2</a:t>
+                      </a:r>
+                    </a:p>
+                  </a:txBody>
+                  <a:tcPr anchor="ctr"/>
+                </a:tc>
+                <a:tc>
+                  <a:txBody>
+                    <a:bodyPr/>
+                    <a:lstStyle/>
+                    <a:p>
+                      <a:pPr algn="ctr"/>
+                      <a:r>
+                        <a:rPr lang="en-US" sz="1200" dirty="0"/>
+                        <a:t>[15°, 75°]</a:t>
+                      </a:r>
+                    </a:p>
+                  </a:txBody>
+                  <a:tcPr anchor="ctr"/>
+                </a:tc>
+                <a:tc>
+                  <a:txBody>
+                    <a:bodyPr/>
+                    <a:lstStyle/>
+                    <a:p>
+                      <a:pPr algn="ctr"/>
+                      <a:r>
+                        <a:rPr lang="en-US" sz="1200" dirty="0"/>
+                        <a:t>6.205</a:t>
+                      </a:r>
+                    </a:p>
+                  </a:txBody>
+                  <a:tcPr anchor="ctr"/>
+                </a:tc>
+                <a:tc>
+                  <a:txBody>
+                    <a:bodyPr/>
+                    <a:lstStyle/>
+                    <a:p>
+                      <a:pPr algn="ctr"/>
+                      <a:r>
+                        <a:rPr lang="en-US" sz="1200" dirty="0"/>
+                        <a:t>3.549</a:t>
+                      </a:r>
+                    </a:p>
+                  </a:txBody>
+                  <a:tcPr anchor="ctr"/>
+                </a:tc>
+                <a:tc>
+                  <a:txBody>
+                    <a:bodyPr/>
+                    <a:lstStyle/>
+                    <a:p>
+                      <a:pPr algn="ctr"/>
+                      <a:r>
+                        <a:rPr lang="en-US" sz="1200" dirty="0"/>
+                        <a:t>14.311</a:t>
+                      </a:r>
+                    </a:p>
+                  </a:txBody>
+                  <a:tcPr anchor="ctr"/>
+                </a:tc>
+                <a:extLst>
+                  <a:ext uri="{0D108BD9-81ED-4DB2-BD59-A6C34878D82A}">
+                    <a16:rowId xmlns:a16="http://schemas.microsoft.com/office/drawing/2014/main" val="10005"/>
+                  </a:ext>
+                </a:extLst>
+              </a:tr>
+              <a:tr h="432046">
+                <a:tc>
+                  <a:txBody>
+                    <a:bodyPr/>
+                    <a:lstStyle/>
+                    <a:p>
+                      <a:pPr algn="ctr"/>
+                      <a:r>
+                        <a:rPr lang="en-US" sz="1200" dirty="0"/>
+                        <a:t>3</a:t>
+                      </a:r>
+                    </a:p>
+                  </a:txBody>
+                  <a:tcPr anchor="ctr"/>
+                </a:tc>
+                <a:tc>
+                  <a:txBody>
+                    <a:bodyPr/>
+                    <a:lstStyle/>
+                    <a:p>
+                      <a:pPr algn="ctr"/>
+                      <a:r>
+                        <a:rPr lang="en-US" sz="1200" dirty="0"/>
+                        <a:t>[30°, 60°]</a:t>
+                      </a:r>
+                    </a:p>
+                  </a:txBody>
+                  <a:tcPr anchor="ctr"/>
+                </a:tc>
+                <a:tc>
+                  <a:txBody>
+                    <a:bodyPr/>
+                    <a:lstStyle/>
+                    <a:p>
+                      <a:pPr algn="ctr"/>
+                      <a:r>
+                        <a:rPr lang="en-US" sz="1200" dirty="0"/>
+                        <a:t>4.804</a:t>
+                      </a:r>
+                    </a:p>
+                  </a:txBody>
+                  <a:tcPr anchor="ctr"/>
+                </a:tc>
+                <a:tc>
+                  <a:txBody>
+                    <a:bodyPr/>
+                    <a:lstStyle/>
+                    <a:p>
+                      <a:pPr algn="ctr"/>
+                      <a:r>
+                        <a:rPr lang="en-US" sz="1200" dirty="0"/>
+                        <a:t>2.367</a:t>
+                      </a:r>
+                    </a:p>
+                  </a:txBody>
+                  <a:tcPr anchor="ctr"/>
+                </a:tc>
+                <a:tc>
+                  <a:txBody>
+                    <a:bodyPr/>
+                    <a:lstStyle/>
+                    <a:p>
+                      <a:pPr algn="ctr"/>
+                      <a:r>
+                        <a:rPr lang="en-US" sz="1200" dirty="0"/>
+                        <a:t>3.913</a:t>
+                      </a:r>
+                    </a:p>
+                  </a:txBody>
+                  <a:tcPr anchor="ctr"/>
+                </a:tc>
+                <a:extLst>
+                  <a:ext uri="{0D108BD9-81ED-4DB2-BD59-A6C34878D82A}">
+                    <a16:rowId xmlns:a16="http://schemas.microsoft.com/office/drawing/2014/main" val="10006"/>
+                  </a:ext>
+                </a:extLst>
+              </a:tr>
+            </a:tbl>
+          </a:graphicData>
+        </a:graphic>
+      </p:graphicFrame>
+      <mc:AlternateContent xmlns:mc="http://schemas.openxmlformats.org/markup-compatibility/2006">
+        <mc:Choice xmlns:a14="http://schemas.microsoft.com/office/drawing/2010/main" Requires="a14">
+          <p:graphicFrame>
+            <p:nvGraphicFramePr>
+              <p:cNvPr id="3" name="Table 2">
+                <a:extLst>
+                  <a:ext uri="{FF2B5EF4-FFF2-40B4-BE49-F238E27FC236}">
+                    <a16:creationId xmlns:a16="http://schemas.microsoft.com/office/drawing/2014/main" id="{D0EB71A3-46E8-4D14-8C66-7AA2857B02D9}"/>
+                  </a:ext>
+                </a:extLst>
+              </p:cNvPr>
+              <p:cNvGraphicFramePr>
+                <a:graphicFrameLocks noGrp="1"/>
+              </p:cNvGraphicFramePr>
+              <p:nvPr>
+                <p:extLst>
+                  <p:ext uri="{D42A27DB-BD31-4B8C-83A1-F6EECF244321}">
+                    <p14:modId xmlns:p14="http://schemas.microsoft.com/office/powerpoint/2010/main" val="2951616292"/>
+                  </p:ext>
+                </p:extLst>
+              </p:nvPr>
+            </p:nvGraphicFramePr>
+            <p:xfrm>
+              <a:off x="1190278" y="2850857"/>
+              <a:ext cx="4954106" cy="1828800"/>
+            </p:xfrm>
+            <a:graphic>
+              <a:graphicData uri="http://schemas.openxmlformats.org/drawingml/2006/table">
+                <a:tbl>
+                  <a:tblPr firstRow="1" bandRow="1">
+                    <a:tableStyleId>{8EC20E35-A176-4012-BC5E-935CFFF8708E}</a:tableStyleId>
+                  </a:tblPr>
+                  <a:tblGrid>
+                    <a:gridCol w="665566">
+                      <a:extLst>
+                        <a:ext uri="{9D8B030D-6E8A-4147-A177-3AD203B41FA5}">
+                          <a16:colId xmlns:a16="http://schemas.microsoft.com/office/drawing/2014/main" val="20000"/>
+                        </a:ext>
+                      </a:extLst>
+                    </a:gridCol>
+                    <a:gridCol w="1018270">
+                      <a:extLst>
+                        <a:ext uri="{9D8B030D-6E8A-4147-A177-3AD203B41FA5}">
+                          <a16:colId xmlns:a16="http://schemas.microsoft.com/office/drawing/2014/main" val="20002"/>
+                        </a:ext>
+                      </a:extLst>
+                    </a:gridCol>
+                    <a:gridCol w="1174700">
+                      <a:extLst>
+                        <a:ext uri="{9D8B030D-6E8A-4147-A177-3AD203B41FA5}">
+                          <a16:colId xmlns:a16="http://schemas.microsoft.com/office/drawing/2014/main" val="20003"/>
+                        </a:ext>
+                      </a:extLst>
+                    </a:gridCol>
+                    <a:gridCol w="1106056">
+                      <a:extLst>
+                        <a:ext uri="{9D8B030D-6E8A-4147-A177-3AD203B41FA5}">
+                          <a16:colId xmlns:a16="http://schemas.microsoft.com/office/drawing/2014/main" val="20004"/>
+                        </a:ext>
+                      </a:extLst>
+                    </a:gridCol>
+                    <a:gridCol w="989514">
+                      <a:extLst>
+                        <a:ext uri="{9D8B030D-6E8A-4147-A177-3AD203B41FA5}">
+                          <a16:colId xmlns:a16="http://schemas.microsoft.com/office/drawing/2014/main" val="20005"/>
+                        </a:ext>
+                      </a:extLst>
+                    </a:gridCol>
+                  </a:tblGrid>
+                  <a:tr h="362434">
+                    <a:tc>
+                      <a:txBody>
+                        <a:bodyPr/>
+                        <a:lstStyle/>
+                        <a:p>
+                          <a:pPr algn="ctr"/>
+                          <a:r>
+                            <a:rPr lang="en-US" sz="1200" dirty="0"/>
+                            <a:t>Case</a:t>
+                          </a:r>
+                        </a:p>
+                      </a:txBody>
+                      <a:tcPr anchor="ctr"/>
+                    </a:tc>
+                    <a:tc>
+                      <a:txBody>
+                        <a:bodyPr/>
+                        <a:lstStyle/>
+                        <a:p>
+                          <a:pPr algn="ctr"/>
+                          <a:r>
+                            <a:rPr lang="en-US" sz="1200" dirty="0"/>
+                            <a:t>Weights</a:t>
+                          </a:r>
+                        </a:p>
+                      </a:txBody>
+                      <a:tcPr anchor="ctr"/>
+                    </a:tc>
+                    <a:tc>
+                      <a:txBody>
+                        <a:bodyPr/>
+                        <a:lstStyle/>
+                        <a:p>
+                          <a:pPr algn="ctr"/>
+                          <a:r>
+                            <a:rPr lang="en-US" sz="1200" dirty="0"/>
+                            <a:t>Mean Altitude (km)</a:t>
+                          </a:r>
+                        </a:p>
+                      </a:txBody>
+                      <a:tcPr anchor="ctr"/>
+                    </a:tc>
+                    <a:tc>
+                      <a:txBody>
+                        <a:bodyPr/>
+                        <a:lstStyle/>
+                        <a:p>
+                          <a:pPr algn="ctr"/>
+                          <a:r>
+                            <a:rPr lang="en-US" sz="1200" dirty="0"/>
+                            <a:t>3</a:t>
+                          </a:r>
+                          <a:r>
+                            <a:rPr lang="el-GR" sz="1200" dirty="0"/>
+                            <a:t>σ</a:t>
+                          </a:r>
+                          <a:r>
+                            <a:rPr lang="en-US" sz="1200" baseline="0" dirty="0"/>
+                            <a:t> Low Altitude (km)</a:t>
+                          </a:r>
+                          <a:endParaRPr lang="en-US" sz="1200" dirty="0"/>
+                        </a:p>
+                      </a:txBody>
+                      <a:tcPr anchor="ctr"/>
+                    </a:tc>
+                    <a:tc>
+                      <a:txBody>
+                        <a:bodyPr/>
+                        <a:lstStyle/>
+                        <a:p>
+                          <a:pPr algn="ctr"/>
+                          <a:r>
+                            <a:rPr lang="en-US" sz="1200" dirty="0"/>
+                            <a:t>3</a:t>
+                          </a:r>
+                          <a:r>
+                            <a:rPr lang="el-GR" sz="1200" dirty="0"/>
+                            <a:t>σ</a:t>
+                          </a:r>
+                          <a:r>
+                            <a:rPr lang="en-US" sz="1200" dirty="0"/>
+                            <a:t> Range Error (km)</a:t>
+                          </a:r>
+                        </a:p>
+                      </a:txBody>
+                      <a:tcPr anchor="ctr"/>
+                    </a:tc>
+                    <a:extLst>
+                      <a:ext uri="{0D108BD9-81ED-4DB2-BD59-A6C34878D82A}">
+                        <a16:rowId xmlns:a16="http://schemas.microsoft.com/office/drawing/2014/main" val="10000"/>
+                      </a:ext>
+                    </a:extLst>
+                  </a:tr>
+                  <a:tr h="362434">
+                    <a:tc>
+                      <a:txBody>
+                        <a:bodyPr/>
+                        <a:lstStyle/>
+                        <a:p>
+                          <a:pPr algn="ctr"/>
+                          <a:r>
+                            <a:rPr lang="en-US" sz="1200" dirty="0"/>
+                            <a:t>4</a:t>
+                          </a:r>
+                        </a:p>
+                      </a:txBody>
+                      <a:tcPr anchor="ctr"/>
+                    </a:tc>
+                    <a:tc>
+                      <a:txBody>
+                        <a:bodyPr/>
+                        <a:lstStyle/>
+                        <a:p>
+                          <a:pPr algn="ctr"/>
+                          <a:r>
+                            <a:rPr lang="en-US" sz="1200" dirty="0"/>
+                            <a:t> </a:t>
+                          </a:r>
+                          <a14:m>
+                            <m:oMath xmlns:m="http://schemas.openxmlformats.org/officeDocument/2006/math">
+                              <m:sSub>
+                                <m:sSubPr>
+                                  <m:ctrlPr>
+                                    <a:rPr lang="en-US" sz="1200" i="1" dirty="0" smtClean="0">
+                                      <a:latin typeface="Cambria Math" panose="02040503050406030204" pitchFamily="18" charset="0"/>
+                                    </a:rPr>
+                                  </m:ctrlPr>
+                                </m:sSubPr>
+                                <m:e>
+                                  <m:r>
+                                    <a:rPr lang="en-US" sz="1200" i="1" dirty="0" smtClean="0">
+                                      <a:latin typeface="Cambria Math" panose="02040503050406030204" pitchFamily="18" charset="0"/>
+                                    </a:rPr>
+                                    <m:t>𝑤</m:t>
+                                  </m:r>
+                                </m:e>
+                                <m:sub>
+                                  <m:r>
+                                    <a:rPr lang="en-US" sz="1200" i="1" dirty="0" smtClean="0">
+                                      <a:latin typeface="Cambria Math" panose="02040503050406030204" pitchFamily="18" charset="0"/>
+                                    </a:rPr>
+                                    <m:t>h</m:t>
+                                  </m:r>
+                                </m:sub>
+                              </m:sSub>
+                              <m:r>
+                                <a:rPr lang="en-US" sz="1200" i="1" dirty="0" smtClean="0">
+                                  <a:latin typeface="Cambria Math" panose="02040503050406030204" pitchFamily="18" charset="0"/>
+                                </a:rPr>
+                                <m:t>=</m:t>
+                              </m:r>
+                              <m:r>
+                                <a:rPr lang="en-US" sz="1200" b="0" i="1" dirty="0" smtClean="0">
+                                  <a:latin typeface="Cambria Math" panose="02040503050406030204" pitchFamily="18" charset="0"/>
+                                </a:rPr>
+                                <m:t>0</m:t>
+                              </m:r>
+                            </m:oMath>
+                          </a14:m>
+                          <a:endParaRPr lang="en-US" sz="1200" b="0" i="1" dirty="0">
+                            <a:latin typeface="Cambria Math" panose="02040503050406030204" pitchFamily="18" charset="0"/>
+                          </a:endParaRPr>
+                        </a:p>
+                        <a:p>
+                          <a:pPr algn="ctr"/>
+                          <a14:m>
+                            <m:oMathPara xmlns:m="http://schemas.openxmlformats.org/officeDocument/2006/math">
+                              <m:oMathParaPr>
+                                <m:jc m:val="centerGroup"/>
+                              </m:oMathParaPr>
+                              <m:oMath xmlns:m="http://schemas.openxmlformats.org/officeDocument/2006/math">
+                                <m:r>
+                                  <a:rPr lang="en-US" sz="1200" b="0" i="1" dirty="0" smtClean="0">
+                                    <a:latin typeface="Cambria Math" panose="02040503050406030204" pitchFamily="18" charset="0"/>
+                                  </a:rPr>
+                                  <m:t> </m:t>
+                                </m:r>
+                                <m:sSub>
+                                  <m:sSubPr>
+                                    <m:ctrlPr>
+                                      <a:rPr lang="en-US" sz="1200" i="1" dirty="0" smtClean="0">
+                                        <a:latin typeface="Cambria Math" panose="02040503050406030204" pitchFamily="18" charset="0"/>
+                                      </a:rPr>
+                                    </m:ctrlPr>
+                                  </m:sSubPr>
+                                  <m:e>
+                                    <m:r>
+                                      <a:rPr lang="en-US" sz="1200" i="1" dirty="0" smtClean="0">
+                                        <a:latin typeface="Cambria Math" panose="02040503050406030204" pitchFamily="18" charset="0"/>
+                                      </a:rPr>
+                                      <m:t>𝑤</m:t>
+                                    </m:r>
+                                  </m:e>
+                                  <m:sub>
+                                    <m:r>
+                                      <a:rPr lang="en-US" sz="1200" b="0" i="1" dirty="0" smtClean="0">
+                                        <a:latin typeface="Cambria Math" panose="02040503050406030204" pitchFamily="18" charset="0"/>
+                                      </a:rPr>
+                                      <m:t>𝑠</m:t>
+                                    </m:r>
+                                  </m:sub>
+                                </m:sSub>
+                                <m:r>
+                                  <a:rPr lang="en-US" sz="1200" b="0" i="1" dirty="0" smtClean="0">
+                                    <a:latin typeface="Cambria Math" panose="02040503050406030204" pitchFamily="18" charset="0"/>
+                                  </a:rPr>
+                                  <m:t> </m:t>
+                                </m:r>
+                                <m:r>
+                                  <a:rPr lang="en-US" sz="1200" i="1" dirty="0" smtClean="0">
+                                    <a:latin typeface="Cambria Math" panose="02040503050406030204" pitchFamily="18" charset="0"/>
+                                  </a:rPr>
+                                  <m:t>=</m:t>
+                                </m:r>
+                                <m:r>
+                                  <a:rPr lang="en-US" sz="1200" b="0" i="1" dirty="0" smtClean="0">
+                                    <a:latin typeface="Cambria Math" panose="02040503050406030204" pitchFamily="18" charset="0"/>
+                                  </a:rPr>
+                                  <m:t>0</m:t>
+                                </m:r>
+                              </m:oMath>
+                            </m:oMathPara>
+                          </a14:m>
+                          <a:endParaRPr lang="en-US" sz="1200" dirty="0"/>
+                        </a:p>
+                      </a:txBody>
+                      <a:tcPr anchor="ctr"/>
+                    </a:tc>
+                    <a:tc>
+                      <a:txBody>
+                        <a:bodyPr/>
+                        <a:lstStyle/>
+                        <a:p>
+                          <a:pPr algn="ctr"/>
+                          <a:r>
+                            <a:rPr lang="en-US" sz="1200" dirty="0"/>
+                            <a:t>6.334</a:t>
+                          </a:r>
+                        </a:p>
+                      </a:txBody>
+                      <a:tcPr anchor="ctr"/>
+                    </a:tc>
+                    <a:tc>
+                      <a:txBody>
+                        <a:bodyPr/>
+                        <a:lstStyle/>
+                        <a:p>
+                          <a:pPr algn="ctr"/>
+                          <a:r>
+                            <a:rPr lang="en-US" sz="1200" dirty="0"/>
+                            <a:t>3.356</a:t>
+                          </a:r>
+                        </a:p>
+                      </a:txBody>
+                      <a:tcPr anchor="ctr"/>
+                    </a:tc>
+                    <a:tc>
+                      <a:txBody>
+                        <a:bodyPr/>
+                        <a:lstStyle/>
+                        <a:p>
+                          <a:pPr algn="ctr"/>
+                          <a:r>
+                            <a:rPr lang="en-US" sz="1200" dirty="0"/>
+                            <a:t>16.249</a:t>
+                          </a:r>
+                        </a:p>
+                      </a:txBody>
+                      <a:tcPr anchor="ctr"/>
+                    </a:tc>
+                    <a:extLst>
+                      <a:ext uri="{0D108BD9-81ED-4DB2-BD59-A6C34878D82A}">
+                        <a16:rowId xmlns:a16="http://schemas.microsoft.com/office/drawing/2014/main" val="10001"/>
+                      </a:ext>
+                    </a:extLst>
+                  </a:tr>
+                  <a:tr h="362434">
+                    <a:tc>
+                      <a:txBody>
+                        <a:bodyPr/>
+                        <a:lstStyle/>
+                        <a:p>
+                          <a:pPr algn="ctr"/>
+                          <a:r>
+                            <a:rPr lang="en-US" sz="1200" dirty="0"/>
+                            <a:t>5</a:t>
+                          </a:r>
+                        </a:p>
+                      </a:txBody>
+                      <a:tcPr anchor="ctr"/>
+                    </a:tc>
+                    <a:tc>
+                      <a:txBody>
+                        <a:bodyPr/>
+                        <a:lstStyle/>
+                        <a:p>
+                          <a:pPr algn="ctr"/>
+                          <a:r>
+                            <a:rPr lang="en-US" sz="1200" dirty="0"/>
+                            <a:t> </a:t>
+                          </a:r>
+                          <a14:m>
+                            <m:oMath xmlns:m="http://schemas.openxmlformats.org/officeDocument/2006/math">
+                              <m:sSub>
+                                <m:sSubPr>
+                                  <m:ctrlPr>
+                                    <a:rPr lang="en-US" sz="1200" i="1" dirty="0" smtClean="0">
+                                      <a:latin typeface="Cambria Math" panose="02040503050406030204" pitchFamily="18" charset="0"/>
+                                    </a:rPr>
+                                  </m:ctrlPr>
+                                </m:sSubPr>
+                                <m:e>
+                                  <m:r>
+                                    <a:rPr lang="en-US" sz="1200" i="1" dirty="0" smtClean="0">
+                                      <a:latin typeface="Cambria Math" panose="02040503050406030204" pitchFamily="18" charset="0"/>
+                                    </a:rPr>
+                                    <m:t>𝑤</m:t>
+                                  </m:r>
+                                </m:e>
+                                <m:sub>
+                                  <m:r>
+                                    <a:rPr lang="en-US" sz="1200" i="1" dirty="0" smtClean="0">
+                                      <a:latin typeface="Cambria Math" panose="02040503050406030204" pitchFamily="18" charset="0"/>
+                                    </a:rPr>
+                                    <m:t>h</m:t>
+                                  </m:r>
+                                </m:sub>
+                              </m:sSub>
+                              <m:r>
+                                <a:rPr lang="en-US" sz="1200" i="1" dirty="0" smtClean="0">
+                                  <a:latin typeface="Cambria Math" panose="02040503050406030204" pitchFamily="18" charset="0"/>
+                                </a:rPr>
+                                <m:t>=</m:t>
+                              </m:r>
+                              <m:r>
+                                <a:rPr lang="en-US" sz="1200" b="0" i="1" dirty="0" smtClean="0">
+                                  <a:latin typeface="Cambria Math" panose="02040503050406030204" pitchFamily="18" charset="0"/>
+                                </a:rPr>
+                                <m:t>3</m:t>
+                              </m:r>
+                            </m:oMath>
+                          </a14:m>
+                          <a:r>
+                            <a:rPr lang="en-US" sz="1200" dirty="0"/>
+                            <a:t> </a:t>
+                          </a:r>
+                          <a14:m>
+                            <m:oMath xmlns:m="http://schemas.openxmlformats.org/officeDocument/2006/math">
+                              <m:r>
+                                <a:rPr lang="en-US" sz="1200" b="0" i="0" dirty="0" smtClean="0">
+                                  <a:latin typeface="Cambria Math" panose="02040503050406030204" pitchFamily="18" charset="0"/>
+                                </a:rPr>
+                                <m:t> </m:t>
+                              </m:r>
+                              <m:sSub>
+                                <m:sSubPr>
+                                  <m:ctrlPr>
+                                    <a:rPr lang="en-US" sz="1200" i="1" dirty="0" smtClean="0">
+                                      <a:latin typeface="Cambria Math" panose="02040503050406030204" pitchFamily="18" charset="0"/>
+                                    </a:rPr>
+                                  </m:ctrlPr>
+                                </m:sSubPr>
+                                <m:e>
+                                  <m:r>
+                                    <a:rPr lang="en-US" sz="1200" i="1" dirty="0" smtClean="0">
+                                      <a:latin typeface="Cambria Math" panose="02040503050406030204" pitchFamily="18" charset="0"/>
+                                    </a:rPr>
+                                    <m:t>𝑤</m:t>
+                                  </m:r>
+                                </m:e>
+                                <m:sub>
+                                  <m:r>
+                                    <a:rPr lang="en-US" sz="1200" b="0" i="1" dirty="0" smtClean="0">
+                                      <a:latin typeface="Cambria Math" panose="02040503050406030204" pitchFamily="18" charset="0"/>
+                                    </a:rPr>
+                                    <m:t>𝑠</m:t>
+                                  </m:r>
+                                </m:sub>
+                              </m:sSub>
+                              <m:r>
+                                <a:rPr lang="en-US" sz="1200" b="0" i="1" dirty="0" smtClean="0">
+                                  <a:latin typeface="Cambria Math" panose="02040503050406030204" pitchFamily="18" charset="0"/>
+                                </a:rPr>
+                                <m:t> </m:t>
+                              </m:r>
+                              <m:r>
+                                <a:rPr lang="en-US" sz="1200" i="1" dirty="0" smtClean="0">
+                                  <a:latin typeface="Cambria Math" panose="02040503050406030204" pitchFamily="18" charset="0"/>
+                                </a:rPr>
+                                <m:t>=</m:t>
+                              </m:r>
+                              <m:r>
+                                <a:rPr lang="en-US" sz="1200" b="0" i="1" dirty="0" smtClean="0">
+                                  <a:latin typeface="Cambria Math" panose="02040503050406030204" pitchFamily="18" charset="0"/>
+                                </a:rPr>
+                                <m:t>0</m:t>
+                              </m:r>
+                            </m:oMath>
+                          </a14:m>
+                          <a:endParaRPr lang="en-US" sz="1200" dirty="0"/>
+                        </a:p>
+                      </a:txBody>
+                      <a:tcPr anchor="ctr"/>
+                    </a:tc>
+                    <a:tc>
+                      <a:txBody>
+                        <a:bodyPr/>
+                        <a:lstStyle/>
+                        <a:p>
+                          <a:pPr algn="ctr"/>
+                          <a:r>
+                            <a:rPr lang="en-US" sz="1200" dirty="0"/>
+                            <a:t>6.052</a:t>
+                          </a:r>
+                        </a:p>
+                      </a:txBody>
+                      <a:tcPr anchor="ctr"/>
+                    </a:tc>
+                    <a:tc>
+                      <a:txBody>
+                        <a:bodyPr/>
+                        <a:lstStyle/>
+                        <a:p>
+                          <a:pPr algn="ctr"/>
+                          <a:r>
+                            <a:rPr lang="en-US" sz="1200" dirty="0"/>
+                            <a:t>3.693</a:t>
+                          </a:r>
+                        </a:p>
+                      </a:txBody>
+                      <a:tcPr anchor="ctr"/>
+                    </a:tc>
+                    <a:tc>
+                      <a:txBody>
+                        <a:bodyPr/>
+                        <a:lstStyle/>
+                        <a:p>
+                          <a:pPr algn="ctr"/>
+                          <a:r>
+                            <a:rPr lang="en-US" sz="1200" dirty="0"/>
+                            <a:t>11.720</a:t>
+                          </a:r>
+                        </a:p>
+                      </a:txBody>
+                      <a:tcPr anchor="ctr"/>
+                    </a:tc>
+                    <a:extLst>
+                      <a:ext uri="{0D108BD9-81ED-4DB2-BD59-A6C34878D82A}">
+                        <a16:rowId xmlns:a16="http://schemas.microsoft.com/office/drawing/2014/main" val="10002"/>
+                      </a:ext>
+                    </a:extLst>
+                  </a:tr>
+                  <a:tr h="432637">
+                    <a:tc>
+                      <a:txBody>
+                        <a:bodyPr/>
+                        <a:lstStyle/>
+                        <a:p>
+                          <a:pPr algn="ctr"/>
+                          <a:r>
+                            <a:rPr lang="en-US" sz="1200" dirty="0"/>
+                            <a:t>6</a:t>
+                          </a:r>
+                        </a:p>
+                      </a:txBody>
+                      <a:tcPr anchor="ctr"/>
+                    </a:tc>
+                    <a:tc>
+                      <a:txBody>
+                        <a:bodyPr/>
+                        <a:lstStyle/>
+                        <a:p>
+                          <a:pPr algn="ctr"/>
+                          <a:r>
+                            <a:rPr lang="en-US" sz="1200" dirty="0"/>
+                            <a:t> </a:t>
+                          </a:r>
+                          <a14:m>
+                            <m:oMath xmlns:m="http://schemas.openxmlformats.org/officeDocument/2006/math">
+                              <m:sSub>
+                                <m:sSubPr>
+                                  <m:ctrlPr>
+                                    <a:rPr lang="en-US" sz="1200" i="1" dirty="0" smtClean="0">
+                                      <a:latin typeface="Cambria Math" panose="02040503050406030204" pitchFamily="18" charset="0"/>
+                                    </a:rPr>
+                                  </m:ctrlPr>
+                                </m:sSubPr>
+                                <m:e>
+                                  <m:r>
+                                    <a:rPr lang="en-US" sz="1200" i="1" dirty="0" smtClean="0">
+                                      <a:latin typeface="Cambria Math" panose="02040503050406030204" pitchFamily="18" charset="0"/>
+                                    </a:rPr>
+                                    <m:t>𝑤</m:t>
+                                  </m:r>
+                                </m:e>
+                                <m:sub>
+                                  <m:r>
+                                    <a:rPr lang="en-US" sz="1200" i="1" dirty="0" smtClean="0">
+                                      <a:latin typeface="Cambria Math" panose="02040503050406030204" pitchFamily="18" charset="0"/>
+                                    </a:rPr>
+                                    <m:t>h</m:t>
+                                  </m:r>
+                                </m:sub>
+                              </m:sSub>
+                              <m:r>
+                                <a:rPr lang="en-US" sz="1200" i="1" dirty="0" smtClean="0">
+                                  <a:latin typeface="Cambria Math" panose="02040503050406030204" pitchFamily="18" charset="0"/>
+                                </a:rPr>
+                                <m:t>=</m:t>
+                              </m:r>
+                              <m:r>
+                                <a:rPr lang="en-US" sz="1200" b="0" i="1" dirty="0" smtClean="0">
+                                  <a:latin typeface="Cambria Math" panose="02040503050406030204" pitchFamily="18" charset="0"/>
+                                </a:rPr>
+                                <m:t>0</m:t>
+                              </m:r>
+                            </m:oMath>
+                          </a14:m>
+                          <a:r>
+                            <a:rPr lang="en-US" sz="1200" dirty="0"/>
+                            <a:t> </a:t>
+                          </a:r>
+                          <a14:m>
+                            <m:oMath xmlns:m="http://schemas.openxmlformats.org/officeDocument/2006/math">
+                              <m:r>
+                                <a:rPr lang="en-US" sz="1200" b="0" i="0" dirty="0" smtClean="0">
+                                  <a:latin typeface="Cambria Math" panose="02040503050406030204" pitchFamily="18" charset="0"/>
+                                </a:rPr>
+                                <m:t> </m:t>
+                              </m:r>
+                              <m:sSub>
+                                <m:sSubPr>
+                                  <m:ctrlPr>
+                                    <a:rPr lang="en-US" sz="1200" i="1" dirty="0" smtClean="0">
+                                      <a:latin typeface="Cambria Math" panose="02040503050406030204" pitchFamily="18" charset="0"/>
+                                    </a:rPr>
+                                  </m:ctrlPr>
+                                </m:sSubPr>
+                                <m:e>
+                                  <m:r>
+                                    <a:rPr lang="en-US" sz="1200" i="1" dirty="0" smtClean="0">
+                                      <a:latin typeface="Cambria Math" panose="02040503050406030204" pitchFamily="18" charset="0"/>
+                                    </a:rPr>
+                                    <m:t>𝑤</m:t>
+                                  </m:r>
+                                </m:e>
+                                <m:sub>
+                                  <m:r>
+                                    <a:rPr lang="en-US" sz="1200" b="0" i="1" dirty="0" smtClean="0">
+                                      <a:latin typeface="Cambria Math" panose="02040503050406030204" pitchFamily="18" charset="0"/>
+                                    </a:rPr>
+                                    <m:t>𝑠</m:t>
+                                  </m:r>
+                                </m:sub>
+                              </m:sSub>
+                              <m:r>
+                                <a:rPr lang="en-US" sz="1200" b="0" i="1" dirty="0" smtClean="0">
+                                  <a:latin typeface="Cambria Math" panose="02040503050406030204" pitchFamily="18" charset="0"/>
+                                </a:rPr>
+                                <m:t> </m:t>
+                              </m:r>
+                              <m:r>
+                                <a:rPr lang="en-US" sz="1200" i="1" dirty="0" smtClean="0">
+                                  <a:latin typeface="Cambria Math" panose="02040503050406030204" pitchFamily="18" charset="0"/>
+                                </a:rPr>
+                                <m:t>=</m:t>
+                              </m:r>
+                              <m:r>
+                                <a:rPr lang="en-US" sz="1200" b="0" i="1" dirty="0" smtClean="0">
+                                  <a:latin typeface="Cambria Math" panose="02040503050406030204" pitchFamily="18" charset="0"/>
+                                </a:rPr>
+                                <m:t>3</m:t>
+                              </m:r>
+                            </m:oMath>
+                          </a14:m>
+                          <a:endParaRPr lang="en-US" sz="1200" dirty="0"/>
+                        </a:p>
+                      </a:txBody>
+                      <a:tcPr anchor="ctr"/>
+                    </a:tc>
+                    <a:tc>
+                      <a:txBody>
+                        <a:bodyPr/>
+                        <a:lstStyle/>
+                        <a:p>
+                          <a:pPr algn="ctr"/>
+                          <a:r>
+                            <a:rPr lang="en-US" sz="1200" dirty="0"/>
+                            <a:t>4.723</a:t>
+                          </a:r>
+                        </a:p>
+                      </a:txBody>
+                      <a:tcPr anchor="ctr"/>
+                    </a:tc>
+                    <a:tc>
+                      <a:txBody>
+                        <a:bodyPr/>
+                        <a:lstStyle/>
+                        <a:p>
+                          <a:pPr algn="ctr"/>
+                          <a:r>
+                            <a:rPr lang="en-US" sz="1200" dirty="0"/>
+                            <a:t>2.470</a:t>
+                          </a:r>
+                        </a:p>
+                      </a:txBody>
+                      <a:tcPr anchor="ctr"/>
+                    </a:tc>
+                    <a:tc>
+                      <a:txBody>
+                        <a:bodyPr/>
+                        <a:lstStyle/>
+                        <a:p>
+                          <a:pPr algn="ctr"/>
+                          <a:r>
+                            <a:rPr lang="en-US" sz="1200" dirty="0"/>
+                            <a:t>1.709</a:t>
+                          </a:r>
+                        </a:p>
+                      </a:txBody>
+                      <a:tcPr anchor="ctr"/>
+                    </a:tc>
+                    <a:extLst>
+                      <a:ext uri="{0D108BD9-81ED-4DB2-BD59-A6C34878D82A}">
+                        <a16:rowId xmlns:a16="http://schemas.microsoft.com/office/drawing/2014/main" val="10003"/>
+                      </a:ext>
+                    </a:extLst>
+                  </a:tr>
+                </a:tbl>
+              </a:graphicData>
+            </a:graphic>
+          </p:graphicFrame>
+        </mc:Choice>
+        <mc:Fallback>
+          <p:graphicFrame>
+            <p:nvGraphicFramePr>
+              <p:cNvPr id="3" name="Table 2">
+                <a:extLst>
+                  <a:ext uri="{FF2B5EF4-FFF2-40B4-BE49-F238E27FC236}">
+                    <a16:creationId xmlns:a16="http://schemas.microsoft.com/office/drawing/2014/main" id="{D0EB71A3-46E8-4D14-8C66-7AA2857B02D9}"/>
+                  </a:ext>
+                </a:extLst>
+              </p:cNvPr>
+              <p:cNvGraphicFramePr>
+                <a:graphicFrameLocks noGrp="1"/>
+              </p:cNvGraphicFramePr>
+              <p:nvPr>
+                <p:extLst>
+                  <p:ext uri="{D42A27DB-BD31-4B8C-83A1-F6EECF244321}">
+                    <p14:modId xmlns:p14="http://schemas.microsoft.com/office/powerpoint/2010/main" val="2951616292"/>
+                  </p:ext>
+                </p:extLst>
+              </p:nvPr>
+            </p:nvGraphicFramePr>
+            <p:xfrm>
+              <a:off x="1190278" y="2850857"/>
+              <a:ext cx="4954106" cy="1828800"/>
+            </p:xfrm>
+            <a:graphic>
+              <a:graphicData uri="http://schemas.openxmlformats.org/drawingml/2006/table">
+                <a:tbl>
+                  <a:tblPr firstRow="1" bandRow="1">
+                    <a:tableStyleId>{8EC20E35-A176-4012-BC5E-935CFFF8708E}</a:tableStyleId>
+                  </a:tblPr>
+                  <a:tblGrid>
+                    <a:gridCol w="665566">
+                      <a:extLst>
+                        <a:ext uri="{9D8B030D-6E8A-4147-A177-3AD203B41FA5}">
+                          <a16:colId xmlns:a16="http://schemas.microsoft.com/office/drawing/2014/main" val="20000"/>
+                        </a:ext>
+                      </a:extLst>
+                    </a:gridCol>
+                    <a:gridCol w="1018270">
+                      <a:extLst>
+                        <a:ext uri="{9D8B030D-6E8A-4147-A177-3AD203B41FA5}">
+                          <a16:colId xmlns:a16="http://schemas.microsoft.com/office/drawing/2014/main" val="20002"/>
+                        </a:ext>
+                      </a:extLst>
+                    </a:gridCol>
+                    <a:gridCol w="1174700">
+                      <a:extLst>
+                        <a:ext uri="{9D8B030D-6E8A-4147-A177-3AD203B41FA5}">
+                          <a16:colId xmlns:a16="http://schemas.microsoft.com/office/drawing/2014/main" val="20003"/>
+                        </a:ext>
+                      </a:extLst>
+                    </a:gridCol>
+                    <a:gridCol w="1106056">
+                      <a:extLst>
+                        <a:ext uri="{9D8B030D-6E8A-4147-A177-3AD203B41FA5}">
+                          <a16:colId xmlns:a16="http://schemas.microsoft.com/office/drawing/2014/main" val="20004"/>
+                        </a:ext>
+                      </a:extLst>
+                    </a:gridCol>
+                    <a:gridCol w="989514">
+                      <a:extLst>
+                        <a:ext uri="{9D8B030D-6E8A-4147-A177-3AD203B41FA5}">
+                          <a16:colId xmlns:a16="http://schemas.microsoft.com/office/drawing/2014/main" val="20005"/>
+                        </a:ext>
+                      </a:extLst>
+                    </a:gridCol>
+                  </a:tblGrid>
+                  <a:tr h="457200">
+                    <a:tc>
+                      <a:txBody>
+                        <a:bodyPr/>
+                        <a:lstStyle/>
+                        <a:p>
+                          <a:pPr algn="ctr"/>
+                          <a:r>
+                            <a:rPr lang="en-US" sz="1200" dirty="0"/>
+                            <a:t>Case</a:t>
+                          </a:r>
+                        </a:p>
+                      </a:txBody>
+                      <a:tcPr anchor="ctr"/>
+                    </a:tc>
+                    <a:tc>
+                      <a:txBody>
+                        <a:bodyPr/>
+                        <a:lstStyle/>
+                        <a:p>
+                          <a:pPr algn="ctr"/>
+                          <a:r>
+                            <a:rPr lang="en-US" sz="1200" dirty="0"/>
+                            <a:t>Weights</a:t>
+                          </a:r>
+                        </a:p>
+                      </a:txBody>
+                      <a:tcPr anchor="ctr"/>
+                    </a:tc>
+                    <a:tc>
+                      <a:txBody>
+                        <a:bodyPr/>
+                        <a:lstStyle/>
+                        <a:p>
+                          <a:pPr algn="ctr"/>
+                          <a:r>
+                            <a:rPr lang="en-US" sz="1200" dirty="0"/>
+                            <a:t>Mean Altitude (km)</a:t>
+                          </a:r>
+                        </a:p>
+                      </a:txBody>
+                      <a:tcPr anchor="ctr"/>
+                    </a:tc>
+                    <a:tc>
+                      <a:txBody>
+                        <a:bodyPr/>
+                        <a:lstStyle/>
+                        <a:p>
+                          <a:pPr algn="ctr"/>
+                          <a:r>
+                            <a:rPr lang="en-US" sz="1200" dirty="0"/>
+                            <a:t>3</a:t>
+                          </a:r>
+                          <a:r>
+                            <a:rPr lang="el-GR" sz="1200" dirty="0"/>
+                            <a:t>σ</a:t>
+                          </a:r>
+                          <a:r>
+                            <a:rPr lang="en-US" sz="1200" baseline="0" dirty="0"/>
+                            <a:t> Low Altitude (km)</a:t>
+                          </a:r>
+                          <a:endParaRPr lang="en-US" sz="1200" dirty="0"/>
+                        </a:p>
+                      </a:txBody>
+                      <a:tcPr anchor="ctr"/>
+                    </a:tc>
+                    <a:tc>
+                      <a:txBody>
+                        <a:bodyPr/>
+                        <a:lstStyle/>
+                        <a:p>
+                          <a:pPr algn="ctr"/>
+                          <a:r>
+                            <a:rPr lang="en-US" sz="1200" dirty="0"/>
+                            <a:t>3</a:t>
+                          </a:r>
+                          <a:r>
+                            <a:rPr lang="el-GR" sz="1200" dirty="0"/>
+                            <a:t>σ</a:t>
+                          </a:r>
+                          <a:r>
+                            <a:rPr lang="en-US" sz="1200" dirty="0"/>
+                            <a:t> Range Error (km)</a:t>
+                          </a:r>
+                        </a:p>
+                      </a:txBody>
+                      <a:tcPr anchor="ctr"/>
+                    </a:tc>
+                    <a:extLst>
+                      <a:ext uri="{0D108BD9-81ED-4DB2-BD59-A6C34878D82A}">
+                        <a16:rowId xmlns:a16="http://schemas.microsoft.com/office/drawing/2014/main" val="10000"/>
+                      </a:ext>
+                    </a:extLst>
+                  </a:tr>
+                  <a:tr h="457200">
+                    <a:tc>
+                      <a:txBody>
+                        <a:bodyPr/>
+                        <a:lstStyle/>
+                        <a:p>
+                          <a:pPr algn="ctr"/>
+                          <a:r>
+                            <a:rPr lang="en-US" sz="1200" dirty="0"/>
+                            <a:t>4</a:t>
+                          </a:r>
+                        </a:p>
+                      </a:txBody>
+                      <a:tcPr anchor="ctr"/>
+                    </a:tc>
+                    <a:tc>
+                      <a:txBody>
+                        <a:bodyPr/>
+                        <a:lstStyle/>
+                        <a:p>
+                          <a:endParaRPr lang="en-US"/>
+                        </a:p>
+                      </a:txBody>
+                      <a:tcPr anchor="ctr">
+                        <a:blipFill>
+                          <a:blip r:embed="rId2"/>
+                          <a:stretch>
+                            <a:fillRect l="-65269" t="-101316" r="-323353" b="-200000"/>
+                          </a:stretch>
+                        </a:blipFill>
+                      </a:tcPr>
+                    </a:tc>
+                    <a:tc>
+                      <a:txBody>
+                        <a:bodyPr/>
+                        <a:lstStyle/>
+                        <a:p>
+                          <a:pPr algn="ctr"/>
+                          <a:r>
+                            <a:rPr lang="en-US" sz="1200" dirty="0"/>
+                            <a:t>6.334</a:t>
+                          </a:r>
+                        </a:p>
+                      </a:txBody>
+                      <a:tcPr anchor="ctr"/>
+                    </a:tc>
+                    <a:tc>
+                      <a:txBody>
+                        <a:bodyPr/>
+                        <a:lstStyle/>
+                        <a:p>
+                          <a:pPr algn="ctr"/>
+                          <a:r>
+                            <a:rPr lang="en-US" sz="1200" dirty="0"/>
+                            <a:t>3.356</a:t>
+                          </a:r>
+                        </a:p>
+                      </a:txBody>
+                      <a:tcPr anchor="ctr"/>
+                    </a:tc>
+                    <a:tc>
+                      <a:txBody>
+                        <a:bodyPr/>
+                        <a:lstStyle/>
+                        <a:p>
+                          <a:pPr algn="ctr"/>
+                          <a:r>
+                            <a:rPr lang="en-US" sz="1200" dirty="0"/>
+                            <a:t>16.249</a:t>
+                          </a:r>
+                        </a:p>
+                      </a:txBody>
+                      <a:tcPr anchor="ctr"/>
+                    </a:tc>
+                    <a:extLst>
+                      <a:ext uri="{0D108BD9-81ED-4DB2-BD59-A6C34878D82A}">
+                        <a16:rowId xmlns:a16="http://schemas.microsoft.com/office/drawing/2014/main" val="10001"/>
+                      </a:ext>
+                    </a:extLst>
+                  </a:tr>
+                  <a:tr h="457200">
+                    <a:tc>
+                      <a:txBody>
+                        <a:bodyPr/>
+                        <a:lstStyle/>
+                        <a:p>
+                          <a:pPr algn="ctr"/>
+                          <a:r>
+                            <a:rPr lang="en-US" sz="1200" dirty="0"/>
+                            <a:t>5</a:t>
+                          </a:r>
+                        </a:p>
+                      </a:txBody>
+                      <a:tcPr anchor="ctr"/>
+                    </a:tc>
+                    <a:tc>
+                      <a:txBody>
+                        <a:bodyPr/>
+                        <a:lstStyle/>
+                        <a:p>
+                          <a:endParaRPr lang="en-US"/>
+                        </a:p>
+                      </a:txBody>
+                      <a:tcPr anchor="ctr">
+                        <a:blipFill>
+                          <a:blip r:embed="rId2"/>
+                          <a:stretch>
+                            <a:fillRect l="-65269" t="-204000" r="-323353" b="-102667"/>
+                          </a:stretch>
+                        </a:blipFill>
+                      </a:tcPr>
+                    </a:tc>
+                    <a:tc>
+                      <a:txBody>
+                        <a:bodyPr/>
+                        <a:lstStyle/>
+                        <a:p>
+                          <a:pPr algn="ctr"/>
+                          <a:r>
+                            <a:rPr lang="en-US" sz="1200" dirty="0"/>
+                            <a:t>6.052</a:t>
+                          </a:r>
+                        </a:p>
+                      </a:txBody>
+                      <a:tcPr anchor="ctr"/>
+                    </a:tc>
+                    <a:tc>
+                      <a:txBody>
+                        <a:bodyPr/>
+                        <a:lstStyle/>
+                        <a:p>
+                          <a:pPr algn="ctr"/>
+                          <a:r>
+                            <a:rPr lang="en-US" sz="1200" dirty="0"/>
+                            <a:t>3.693</a:t>
+                          </a:r>
+                        </a:p>
+                      </a:txBody>
+                      <a:tcPr anchor="ctr"/>
+                    </a:tc>
+                    <a:tc>
+                      <a:txBody>
+                        <a:bodyPr/>
+                        <a:lstStyle/>
+                        <a:p>
+                          <a:pPr algn="ctr"/>
+                          <a:r>
+                            <a:rPr lang="en-US" sz="1200" dirty="0"/>
+                            <a:t>11.720</a:t>
+                          </a:r>
+                        </a:p>
+                      </a:txBody>
+                      <a:tcPr anchor="ctr"/>
+                    </a:tc>
+                    <a:extLst>
+                      <a:ext uri="{0D108BD9-81ED-4DB2-BD59-A6C34878D82A}">
+                        <a16:rowId xmlns:a16="http://schemas.microsoft.com/office/drawing/2014/main" val="10002"/>
+                      </a:ext>
+                    </a:extLst>
+                  </a:tr>
+                  <a:tr h="457200">
+                    <a:tc>
+                      <a:txBody>
+                        <a:bodyPr/>
+                        <a:lstStyle/>
+                        <a:p>
+                          <a:pPr algn="ctr"/>
+                          <a:r>
+                            <a:rPr lang="en-US" sz="1200" dirty="0"/>
+                            <a:t>6</a:t>
+                          </a:r>
+                        </a:p>
+                      </a:txBody>
+                      <a:tcPr anchor="ctr"/>
+                    </a:tc>
+                    <a:tc>
+                      <a:txBody>
+                        <a:bodyPr/>
+                        <a:lstStyle/>
+                        <a:p>
+                          <a:endParaRPr lang="en-US"/>
+                        </a:p>
+                      </a:txBody>
+                      <a:tcPr anchor="ctr">
+                        <a:blipFill>
+                          <a:blip r:embed="rId2"/>
+                          <a:stretch>
+                            <a:fillRect l="-65269" t="-304000" r="-323353" b="-2667"/>
+                          </a:stretch>
+                        </a:blipFill>
+                      </a:tcPr>
+                    </a:tc>
+                    <a:tc>
+                      <a:txBody>
+                        <a:bodyPr/>
+                        <a:lstStyle/>
+                        <a:p>
+                          <a:pPr algn="ctr"/>
+                          <a:r>
+                            <a:rPr lang="en-US" sz="1200" dirty="0"/>
+                            <a:t>4.723</a:t>
+                          </a:r>
+                        </a:p>
+                      </a:txBody>
+                      <a:tcPr anchor="ctr"/>
+                    </a:tc>
+                    <a:tc>
+                      <a:txBody>
+                        <a:bodyPr/>
+                        <a:lstStyle/>
+                        <a:p>
+                          <a:pPr algn="ctr"/>
+                          <a:r>
+                            <a:rPr lang="en-US" sz="1200" dirty="0"/>
+                            <a:t>2.470</a:t>
+                          </a:r>
+                        </a:p>
+                      </a:txBody>
+                      <a:tcPr anchor="ctr"/>
+                    </a:tc>
+                    <a:tc>
+                      <a:txBody>
+                        <a:bodyPr/>
+                        <a:lstStyle/>
+                        <a:p>
+                          <a:pPr algn="ctr"/>
+                          <a:r>
+                            <a:rPr lang="en-US" sz="1200" dirty="0"/>
+                            <a:t>1.709</a:t>
+                          </a:r>
+                        </a:p>
+                      </a:txBody>
+                      <a:tcPr anchor="ctr"/>
+                    </a:tc>
+                    <a:extLst>
+                      <a:ext uri="{0D108BD9-81ED-4DB2-BD59-A6C34878D82A}">
+                        <a16:rowId xmlns:a16="http://schemas.microsoft.com/office/drawing/2014/main" val="10003"/>
+                      </a:ext>
+                    </a:extLst>
+                  </a:tr>
+                </a:tbl>
+              </a:graphicData>
+            </a:graphic>
+          </p:graphicFrame>
+        </mc:Fallback>
+      </mc:AlternateContent>
+      <p:sp>
+        <p:nvSpPr>
+          <p:cNvPr id="2" name="TextBox 1">
+            <a:extLst>
+              <a:ext uri="{FF2B5EF4-FFF2-40B4-BE49-F238E27FC236}">
+                <a16:creationId xmlns:a16="http://schemas.microsoft.com/office/drawing/2014/main" id="{AA70D9EB-9FA9-459F-981E-5061D572C3E4}"/>
+              </a:ext>
+            </a:extLst>
+          </p:cNvPr>
+          <p:cNvSpPr txBox="1"/>
+          <p:nvPr/>
+        </p:nvSpPr>
+        <p:spPr>
+          <a:xfrm>
+            <a:off x="6946711" y="655093"/>
+            <a:ext cx="3205365" cy="369332"/>
+          </a:xfrm>
+          <a:prstGeom prst="rect">
+            <a:avLst/>
+          </a:prstGeom>
+          <a:noFill/>
+        </p:spPr>
+        <p:txBody>
+          <a:bodyPr wrap="none" rtlCol="0">
+            <a:spAutoFit/>
+          </a:bodyPr>
+          <a:lstStyle/>
+          <a:p>
+            <a:r>
+              <a:rPr lang="en-US" dirty="0"/>
+              <a:t>Fixed, optimized for case 6 gains</a:t>
+            </a:r>
+          </a:p>
+        </p:txBody>
+      </p:sp>
+    </p:spTree>
+    <p:extLst>
+      <p:ext uri="{BB962C8B-B14F-4D97-AF65-F5344CB8AC3E}">
+        <p14:creationId xmlns:p14="http://schemas.microsoft.com/office/powerpoint/2010/main" val="1445117917"/>
+      </p:ext>
+    </p:extLst>
+  </p:cSld>
+  <p:clrMapOvr>
+    <a:masterClrMapping/>
+  </p:clrMapOvr>
+</p:sld>
+</file>
+
+<file path=ppt/slides/slide3.xml><?xml version="1.0" encoding="utf-8"?>
+<p:sld xmlns:a="http://schemas.openxmlformats.org/drawingml/2006/main" xmlns:r="http://schemas.openxmlformats.org/officeDocument/2006/relationships" xmlns:p="http://schemas.openxmlformats.org/presentationml/2006/main">
+  <p:cSld>
+    <p:spTree>
+      <p:nvGrpSpPr>
+        <p:cNvPr id="1" name=""/>
+        <p:cNvGrpSpPr/>
+        <p:nvPr/>
+      </p:nvGrpSpPr>
+      <p:grpSpPr>
+        <a:xfrm>
+          <a:off x="0" y="0"/>
+          <a:ext cx="0" cy="0"/>
+          <a:chOff x="0" y="0"/>
+          <a:chExt cx="0" cy="0"/>
+        </a:xfrm>
+      </p:grpSpPr>
+      <p:graphicFrame>
+        <p:nvGraphicFramePr>
+          <p:cNvPr id="4" name="Table 3"/>
+          <p:cNvGraphicFramePr>
+            <a:graphicFrameLocks noGrp="1"/>
+          </p:cNvGraphicFramePr>
+          <p:nvPr>
+            <p:extLst>
+              <p:ext uri="{D42A27DB-BD31-4B8C-83A1-F6EECF244321}">
+                <p14:modId xmlns:p14="http://schemas.microsoft.com/office/powerpoint/2010/main" val="94341890"/>
+              </p:ext>
+            </p:extLst>
+          </p:nvPr>
+        </p:nvGraphicFramePr>
+        <p:xfrm>
+          <a:off x="1181652" y="556233"/>
+          <a:ext cx="4954106" cy="1828798"/>
+        </p:xfrm>
+        <a:graphic>
+          <a:graphicData uri="http://schemas.openxmlformats.org/drawingml/2006/table">
+            <a:tbl>
+              <a:tblPr firstRow="1" bandRow="1">
+                <a:tableStyleId>{8EC20E35-A176-4012-BC5E-935CFFF8708E}</a:tableStyleId>
+              </a:tblPr>
+              <a:tblGrid>
+                <a:gridCol w="692129">
+                  <a:extLst>
+                    <a:ext uri="{9D8B030D-6E8A-4147-A177-3AD203B41FA5}">
+                      <a16:colId xmlns:a16="http://schemas.microsoft.com/office/drawing/2014/main" val="20000"/>
+                    </a:ext>
+                  </a:extLst>
+                </a:gridCol>
+                <a:gridCol w="1030076">
+                  <a:extLst>
+                    <a:ext uri="{9D8B030D-6E8A-4147-A177-3AD203B41FA5}">
+                      <a16:colId xmlns:a16="http://schemas.microsoft.com/office/drawing/2014/main" val="20001"/>
+                    </a:ext>
+                  </a:extLst>
+                </a:gridCol>
+                <a:gridCol w="1175269">
+                  <a:extLst>
+                    <a:ext uri="{9D8B030D-6E8A-4147-A177-3AD203B41FA5}">
+                      <a16:colId xmlns:a16="http://schemas.microsoft.com/office/drawing/2014/main" val="20003"/>
+                    </a:ext>
+                  </a:extLst>
+                </a:gridCol>
+                <a:gridCol w="1028316">
+                  <a:extLst>
+                    <a:ext uri="{9D8B030D-6E8A-4147-A177-3AD203B41FA5}">
+                      <a16:colId xmlns:a16="http://schemas.microsoft.com/office/drawing/2014/main" val="20004"/>
+                    </a:ext>
+                  </a:extLst>
+                </a:gridCol>
+                <a:gridCol w="1028316">
+                  <a:extLst>
+                    <a:ext uri="{9D8B030D-6E8A-4147-A177-3AD203B41FA5}">
+                      <a16:colId xmlns:a16="http://schemas.microsoft.com/office/drawing/2014/main" val="20005"/>
+                    </a:ext>
+                  </a:extLst>
+                </a:gridCol>
+              </a:tblGrid>
+              <a:tr h="532660">
+                <a:tc>
+                  <a:txBody>
+                    <a:bodyPr/>
+                    <a:lstStyle/>
+                    <a:p>
+                      <a:pPr algn="ctr"/>
+                      <a:r>
+                        <a:rPr lang="en-US" sz="1200" dirty="0"/>
+                        <a:t>Case</a:t>
+                      </a:r>
+                    </a:p>
+                  </a:txBody>
+                  <a:tcPr anchor="ctr"/>
+                </a:tc>
+                <a:tc>
+                  <a:txBody>
+                    <a:bodyPr/>
+                    <a:lstStyle/>
+                    <a:p>
+                      <a:pPr algn="ctr"/>
+                      <a:r>
+                        <a:rPr lang="en-US" sz="1200" dirty="0"/>
+                        <a:t>Bank</a:t>
+                      </a:r>
+                      <a:r>
+                        <a:rPr lang="en-US" sz="1200" baseline="0" dirty="0"/>
+                        <a:t> Angle Limits</a:t>
+                      </a:r>
+                      <a:endParaRPr lang="en-US" sz="1200" dirty="0"/>
+                    </a:p>
+                  </a:txBody>
+                  <a:tcPr anchor="ctr"/>
+                </a:tc>
+                <a:tc>
+                  <a:txBody>
+                    <a:bodyPr/>
+                    <a:lstStyle/>
+                    <a:p>
+                      <a:pPr algn="ctr"/>
+                      <a:r>
+                        <a:rPr lang="en-US" sz="1200" dirty="0"/>
+                        <a:t>Mean Altitude (km)</a:t>
+                      </a:r>
+                    </a:p>
+                  </a:txBody>
+                  <a:tcPr anchor="ctr"/>
+                </a:tc>
+                <a:tc>
+                  <a:txBody>
+                    <a:bodyPr/>
+                    <a:lstStyle/>
+                    <a:p>
+                      <a:pPr algn="ctr"/>
+                      <a:r>
+                        <a:rPr lang="en-US" sz="1200" dirty="0"/>
+                        <a:t>3</a:t>
+                      </a:r>
+                      <a:r>
+                        <a:rPr lang="el-GR" sz="1200" dirty="0"/>
+                        <a:t>σ</a:t>
+                      </a:r>
+                      <a:r>
+                        <a:rPr lang="en-US" sz="1200" baseline="0" dirty="0"/>
+                        <a:t> Low Altitude (km)</a:t>
+                      </a:r>
+                      <a:endParaRPr lang="en-US" sz="1200" dirty="0"/>
+                    </a:p>
+                  </a:txBody>
+                  <a:tcPr anchor="ctr"/>
+                </a:tc>
+                <a:tc>
+                  <a:txBody>
+                    <a:bodyPr/>
+                    <a:lstStyle/>
+                    <a:p>
+                      <a:pPr algn="ctr"/>
+                      <a:r>
+                        <a:rPr lang="en-US" sz="1200" dirty="0"/>
+                        <a:t>3</a:t>
+                      </a:r>
+                      <a:r>
+                        <a:rPr lang="el-GR" sz="1200" dirty="0"/>
+                        <a:t>σ</a:t>
+                      </a:r>
+                      <a:r>
+                        <a:rPr lang="en-US" sz="1200" dirty="0"/>
+                        <a:t> Range Error (km)</a:t>
+                      </a:r>
+                    </a:p>
+                  </a:txBody>
+                  <a:tcPr anchor="ctr"/>
+                </a:tc>
+                <a:extLst>
+                  <a:ext uri="{0D108BD9-81ED-4DB2-BD59-A6C34878D82A}">
+                    <a16:rowId xmlns:a16="http://schemas.microsoft.com/office/drawing/2014/main" val="10000"/>
+                  </a:ext>
+                </a:extLst>
+              </a:tr>
+              <a:tr h="432046">
+                <a:tc>
+                  <a:txBody>
+                    <a:bodyPr/>
+                    <a:lstStyle/>
+                    <a:p>
+                      <a:pPr algn="ctr"/>
+                      <a:r>
+                        <a:rPr lang="en-US" sz="1200" dirty="0"/>
+                        <a:t>1</a:t>
+                      </a:r>
+                    </a:p>
+                  </a:txBody>
+                  <a:tcPr anchor="ctr"/>
+                </a:tc>
+                <a:tc>
+                  <a:txBody>
+                    <a:bodyPr/>
+                    <a:lstStyle/>
+                    <a:p>
+                      <a:pPr algn="ctr"/>
+                      <a:r>
+                        <a:rPr lang="en-US" sz="1200" dirty="0"/>
+                        <a:t>[0°,   90°]</a:t>
+                      </a:r>
+                    </a:p>
+                  </a:txBody>
+                  <a:tcPr anchor="ctr"/>
+                </a:tc>
+                <a:tc>
+                  <a:txBody>
+                    <a:bodyPr/>
+                    <a:lstStyle/>
+                    <a:p>
+                      <a:pPr algn="ctr"/>
+                      <a:r>
+                        <a:rPr lang="en-US" sz="1200" dirty="0"/>
+                        <a:t>6.846</a:t>
+                      </a:r>
+                    </a:p>
+                  </a:txBody>
+                  <a:tcPr anchor="ctr"/>
+                </a:tc>
+                <a:tc>
+                  <a:txBody>
+                    <a:bodyPr/>
+                    <a:lstStyle/>
+                    <a:p>
+                      <a:pPr algn="ctr"/>
+                      <a:r>
+                        <a:rPr lang="en-US" sz="1200" dirty="0"/>
+                        <a:t>4.569</a:t>
+                      </a:r>
+                    </a:p>
+                  </a:txBody>
+                  <a:tcPr anchor="ctr"/>
+                </a:tc>
+                <a:tc>
+                  <a:txBody>
+                    <a:bodyPr/>
+                    <a:lstStyle/>
+                    <a:p>
+                      <a:pPr algn="ctr"/>
+                      <a:r>
+                        <a:rPr lang="en-US" sz="1200" dirty="0"/>
+                        <a:t>53.903</a:t>
+                      </a:r>
+                    </a:p>
+                  </a:txBody>
+                  <a:tcPr anchor="ctr"/>
+                </a:tc>
+                <a:extLst>
+                  <a:ext uri="{0D108BD9-81ED-4DB2-BD59-A6C34878D82A}">
+                    <a16:rowId xmlns:a16="http://schemas.microsoft.com/office/drawing/2014/main" val="10004"/>
+                  </a:ext>
+                </a:extLst>
+              </a:tr>
+              <a:tr h="432046">
+                <a:tc>
+                  <a:txBody>
+                    <a:bodyPr/>
+                    <a:lstStyle/>
+                    <a:p>
+                      <a:pPr algn="ctr"/>
+                      <a:r>
+                        <a:rPr lang="en-US" sz="1200" dirty="0"/>
+                        <a:t>2</a:t>
+                      </a:r>
+                    </a:p>
+                  </a:txBody>
+                  <a:tcPr anchor="ctr"/>
+                </a:tc>
+                <a:tc>
+                  <a:txBody>
+                    <a:bodyPr/>
+                    <a:lstStyle/>
+                    <a:p>
+                      <a:pPr algn="ctr"/>
+                      <a:r>
+                        <a:rPr lang="en-US" sz="1200" dirty="0"/>
+                        <a:t>[15°, 75°]</a:t>
+                      </a:r>
+                    </a:p>
+                  </a:txBody>
+                  <a:tcPr anchor="ctr"/>
+                </a:tc>
+                <a:tc>
+                  <a:txBody>
+                    <a:bodyPr/>
+                    <a:lstStyle/>
+                    <a:p>
+                      <a:pPr algn="ctr"/>
+                      <a:r>
+                        <a:rPr lang="en-US" sz="1200" dirty="0"/>
+                        <a:t>6.357</a:t>
+                      </a:r>
+                    </a:p>
+                  </a:txBody>
+                  <a:tcPr anchor="ctr"/>
+                </a:tc>
+                <a:tc>
+                  <a:txBody>
+                    <a:bodyPr/>
+                    <a:lstStyle/>
+                    <a:p>
+                      <a:pPr algn="ctr"/>
+                      <a:r>
+                        <a:rPr lang="en-US" sz="1200" dirty="0"/>
+                        <a:t>4.173</a:t>
+                      </a:r>
+                    </a:p>
+                  </a:txBody>
+                  <a:tcPr anchor="ctr"/>
+                </a:tc>
+                <a:tc>
+                  <a:txBody>
+                    <a:bodyPr/>
+                    <a:lstStyle/>
+                    <a:p>
+                      <a:pPr algn="ctr"/>
+                      <a:r>
+                        <a:rPr lang="en-US" sz="1200" dirty="0"/>
+                        <a:t>37.840</a:t>
+                      </a:r>
+                    </a:p>
+                  </a:txBody>
+                  <a:tcPr anchor="ctr"/>
+                </a:tc>
+                <a:extLst>
+                  <a:ext uri="{0D108BD9-81ED-4DB2-BD59-A6C34878D82A}">
+                    <a16:rowId xmlns:a16="http://schemas.microsoft.com/office/drawing/2014/main" val="10005"/>
+                  </a:ext>
+                </a:extLst>
+              </a:tr>
+              <a:tr h="432046">
+                <a:tc>
+                  <a:txBody>
+                    <a:bodyPr/>
+                    <a:lstStyle/>
+                    <a:p>
+                      <a:pPr algn="ctr"/>
+                      <a:r>
+                        <a:rPr lang="en-US" sz="1200" dirty="0"/>
+                        <a:t>3</a:t>
+                      </a:r>
+                    </a:p>
+                  </a:txBody>
+                  <a:tcPr anchor="ctr"/>
+                </a:tc>
+                <a:tc>
+                  <a:txBody>
+                    <a:bodyPr/>
+                    <a:lstStyle/>
+                    <a:p>
+                      <a:pPr algn="ctr"/>
+                      <a:r>
+                        <a:rPr lang="en-US" sz="1200" dirty="0"/>
+                        <a:t>[30°, 60°]</a:t>
+                      </a:r>
+                    </a:p>
+                  </a:txBody>
+                  <a:tcPr anchor="ctr"/>
+                </a:tc>
+                <a:tc>
+                  <a:txBody>
+                    <a:bodyPr/>
+                    <a:lstStyle/>
+                    <a:p>
+                      <a:pPr algn="ctr"/>
+                      <a:r>
+                        <a:rPr lang="en-US" sz="1200" dirty="0"/>
+                        <a:t>4.928</a:t>
+                      </a:r>
+                    </a:p>
+                  </a:txBody>
+                  <a:tcPr anchor="ctr"/>
+                </a:tc>
+                <a:tc>
+                  <a:txBody>
+                    <a:bodyPr/>
+                    <a:lstStyle/>
+                    <a:p>
+                      <a:pPr algn="ctr"/>
+                      <a:r>
+                        <a:rPr lang="en-US" sz="1200" dirty="0"/>
+                        <a:t>2.363</a:t>
+                      </a:r>
+                    </a:p>
+                  </a:txBody>
+                  <a:tcPr anchor="ctr"/>
+                </a:tc>
+                <a:tc>
+                  <a:txBody>
+                    <a:bodyPr/>
+                    <a:lstStyle/>
+                    <a:p>
+                      <a:pPr algn="ctr"/>
+                      <a:r>
+                        <a:rPr lang="en-US" sz="1200" dirty="0"/>
+                        <a:t>12.252</a:t>
+                      </a:r>
+                    </a:p>
+                  </a:txBody>
+                  <a:tcPr anchor="ctr"/>
+                </a:tc>
+                <a:extLst>
+                  <a:ext uri="{0D108BD9-81ED-4DB2-BD59-A6C34878D82A}">
+                    <a16:rowId xmlns:a16="http://schemas.microsoft.com/office/drawing/2014/main" val="10006"/>
+                  </a:ext>
+                </a:extLst>
+              </a:tr>
+            </a:tbl>
+          </a:graphicData>
+        </a:graphic>
+      </p:graphicFrame>
+      <mc:AlternateContent xmlns:mc="http://schemas.openxmlformats.org/markup-compatibility/2006">
+        <mc:Choice xmlns:a14="http://schemas.microsoft.com/office/drawing/2010/main" Requires="a14">
+          <p:graphicFrame>
+            <p:nvGraphicFramePr>
+              <p:cNvPr id="3" name="Table 2">
+                <a:extLst>
+                  <a:ext uri="{FF2B5EF4-FFF2-40B4-BE49-F238E27FC236}">
+                    <a16:creationId xmlns:a16="http://schemas.microsoft.com/office/drawing/2014/main" id="{D0EB71A3-46E8-4D14-8C66-7AA2857B02D9}"/>
+                  </a:ext>
+                </a:extLst>
+              </p:cNvPr>
+              <p:cNvGraphicFramePr>
+                <a:graphicFrameLocks noGrp="1"/>
+              </p:cNvGraphicFramePr>
+              <p:nvPr>
+                <p:extLst>
+                  <p:ext uri="{D42A27DB-BD31-4B8C-83A1-F6EECF244321}">
+                    <p14:modId xmlns:p14="http://schemas.microsoft.com/office/powerpoint/2010/main" val="1437036646"/>
+                  </p:ext>
+                </p:extLst>
+              </p:nvPr>
+            </p:nvGraphicFramePr>
+            <p:xfrm>
+              <a:off x="1190278" y="2850857"/>
+              <a:ext cx="4954106" cy="1828800"/>
+            </p:xfrm>
+            <a:graphic>
+              <a:graphicData uri="http://schemas.openxmlformats.org/drawingml/2006/table">
+                <a:tbl>
+                  <a:tblPr firstRow="1" bandRow="1">
+                    <a:tableStyleId>{8EC20E35-A176-4012-BC5E-935CFFF8708E}</a:tableStyleId>
+                  </a:tblPr>
+                  <a:tblGrid>
+                    <a:gridCol w="665566">
+                      <a:extLst>
+                        <a:ext uri="{9D8B030D-6E8A-4147-A177-3AD203B41FA5}">
+                          <a16:colId xmlns:a16="http://schemas.microsoft.com/office/drawing/2014/main" val="20000"/>
+                        </a:ext>
+                      </a:extLst>
+                    </a:gridCol>
+                    <a:gridCol w="1018270">
+                      <a:extLst>
+                        <a:ext uri="{9D8B030D-6E8A-4147-A177-3AD203B41FA5}">
+                          <a16:colId xmlns:a16="http://schemas.microsoft.com/office/drawing/2014/main" val="20002"/>
+                        </a:ext>
+                      </a:extLst>
+                    </a:gridCol>
+                    <a:gridCol w="1174700">
+                      <a:extLst>
+                        <a:ext uri="{9D8B030D-6E8A-4147-A177-3AD203B41FA5}">
+                          <a16:colId xmlns:a16="http://schemas.microsoft.com/office/drawing/2014/main" val="20003"/>
+                        </a:ext>
+                      </a:extLst>
+                    </a:gridCol>
+                    <a:gridCol w="1106056">
+                      <a:extLst>
+                        <a:ext uri="{9D8B030D-6E8A-4147-A177-3AD203B41FA5}">
+                          <a16:colId xmlns:a16="http://schemas.microsoft.com/office/drawing/2014/main" val="20004"/>
+                        </a:ext>
+                      </a:extLst>
+                    </a:gridCol>
+                    <a:gridCol w="989514">
+                      <a:extLst>
+                        <a:ext uri="{9D8B030D-6E8A-4147-A177-3AD203B41FA5}">
+                          <a16:colId xmlns:a16="http://schemas.microsoft.com/office/drawing/2014/main" val="20005"/>
+                        </a:ext>
+                      </a:extLst>
+                    </a:gridCol>
+                  </a:tblGrid>
+                  <a:tr h="362434">
+                    <a:tc>
+                      <a:txBody>
+                        <a:bodyPr/>
+                        <a:lstStyle/>
+                        <a:p>
+                          <a:pPr algn="ctr"/>
+                          <a:r>
+                            <a:rPr lang="en-US" sz="1200" dirty="0"/>
+                            <a:t>Case</a:t>
+                          </a:r>
+                        </a:p>
+                      </a:txBody>
+                      <a:tcPr anchor="ctr"/>
+                    </a:tc>
+                    <a:tc>
+                      <a:txBody>
+                        <a:bodyPr/>
+                        <a:lstStyle/>
+                        <a:p>
+                          <a:pPr algn="ctr"/>
+                          <a:r>
+                            <a:rPr lang="en-US" sz="1200" dirty="0"/>
+                            <a:t>Weights</a:t>
+                          </a:r>
+                        </a:p>
+                      </a:txBody>
+                      <a:tcPr anchor="ctr"/>
+                    </a:tc>
+                    <a:tc>
+                      <a:txBody>
+                        <a:bodyPr/>
+                        <a:lstStyle/>
+                        <a:p>
+                          <a:pPr algn="ctr"/>
+                          <a:r>
+                            <a:rPr lang="en-US" sz="1200" dirty="0"/>
+                            <a:t>Mean Altitude (km)</a:t>
+                          </a:r>
+                        </a:p>
+                      </a:txBody>
+                      <a:tcPr anchor="ctr"/>
+                    </a:tc>
+                    <a:tc>
+                      <a:txBody>
+                        <a:bodyPr/>
+                        <a:lstStyle/>
+                        <a:p>
+                          <a:pPr algn="ctr"/>
+                          <a:r>
+                            <a:rPr lang="en-US" sz="1200" dirty="0"/>
+                            <a:t>3</a:t>
+                          </a:r>
+                          <a:r>
+                            <a:rPr lang="el-GR" sz="1200" dirty="0"/>
+                            <a:t>σ</a:t>
+                          </a:r>
+                          <a:r>
+                            <a:rPr lang="en-US" sz="1200" baseline="0" dirty="0"/>
+                            <a:t> Low Altitude (km)</a:t>
+                          </a:r>
+                          <a:endParaRPr lang="en-US" sz="1200" dirty="0"/>
+                        </a:p>
+                      </a:txBody>
+                      <a:tcPr anchor="ctr"/>
+                    </a:tc>
+                    <a:tc>
+                      <a:txBody>
+                        <a:bodyPr/>
+                        <a:lstStyle/>
+                        <a:p>
+                          <a:pPr algn="ctr"/>
+                          <a:r>
+                            <a:rPr lang="en-US" sz="1200" dirty="0"/>
+                            <a:t>3</a:t>
+                          </a:r>
+                          <a:r>
+                            <a:rPr lang="el-GR" sz="1200" dirty="0"/>
+                            <a:t>σ</a:t>
+                          </a:r>
+                          <a:r>
+                            <a:rPr lang="en-US" sz="1200" dirty="0"/>
+                            <a:t> Range Error (km)</a:t>
+                          </a:r>
+                        </a:p>
+                      </a:txBody>
+                      <a:tcPr anchor="ctr"/>
+                    </a:tc>
+                    <a:extLst>
+                      <a:ext uri="{0D108BD9-81ED-4DB2-BD59-A6C34878D82A}">
+                        <a16:rowId xmlns:a16="http://schemas.microsoft.com/office/drawing/2014/main" val="10000"/>
+                      </a:ext>
+                    </a:extLst>
+                  </a:tr>
+                  <a:tr h="362434">
+                    <a:tc>
+                      <a:txBody>
+                        <a:bodyPr/>
+                        <a:lstStyle/>
+                        <a:p>
+                          <a:pPr algn="ctr"/>
+                          <a:r>
+                            <a:rPr lang="en-US" sz="1200" dirty="0"/>
+                            <a:t>4</a:t>
+                          </a:r>
+                        </a:p>
+                      </a:txBody>
+                      <a:tcPr anchor="ctr"/>
+                    </a:tc>
+                    <a:tc>
+                      <a:txBody>
+                        <a:bodyPr/>
+                        <a:lstStyle/>
+                        <a:p>
+                          <a:pPr algn="ctr"/>
+                          <a:r>
+                            <a:rPr lang="en-US" sz="1200" dirty="0"/>
+                            <a:t> </a:t>
+                          </a:r>
+                          <a14:m>
+                            <m:oMath xmlns:m="http://schemas.openxmlformats.org/officeDocument/2006/math">
+                              <m:sSub>
+                                <m:sSubPr>
+                                  <m:ctrlPr>
+                                    <a:rPr lang="en-US" sz="1200" i="1" dirty="0" smtClean="0">
+                                      <a:latin typeface="Cambria Math" panose="02040503050406030204" pitchFamily="18" charset="0"/>
+                                    </a:rPr>
+                                  </m:ctrlPr>
+                                </m:sSubPr>
+                                <m:e>
+                                  <m:r>
+                                    <a:rPr lang="en-US" sz="1200" i="1" dirty="0" smtClean="0">
+                                      <a:latin typeface="Cambria Math" panose="02040503050406030204" pitchFamily="18" charset="0"/>
+                                    </a:rPr>
+                                    <m:t>𝑤</m:t>
+                                  </m:r>
+                                </m:e>
+                                <m:sub>
+                                  <m:r>
+                                    <a:rPr lang="en-US" sz="1200" i="1" dirty="0" smtClean="0">
+                                      <a:latin typeface="Cambria Math" panose="02040503050406030204" pitchFamily="18" charset="0"/>
+                                    </a:rPr>
+                                    <m:t>h</m:t>
+                                  </m:r>
+                                </m:sub>
+                              </m:sSub>
+                              <m:r>
+                                <a:rPr lang="en-US" sz="1200" i="1" dirty="0" smtClean="0">
+                                  <a:latin typeface="Cambria Math" panose="02040503050406030204" pitchFamily="18" charset="0"/>
+                                </a:rPr>
+                                <m:t>=</m:t>
+                              </m:r>
+                              <m:r>
+                                <a:rPr lang="en-US" sz="1200" b="0" i="1" dirty="0" smtClean="0">
+                                  <a:latin typeface="Cambria Math" panose="02040503050406030204" pitchFamily="18" charset="0"/>
+                                </a:rPr>
+                                <m:t>0</m:t>
+                              </m:r>
+                            </m:oMath>
+                          </a14:m>
+                          <a:endParaRPr lang="en-US" sz="1200" b="0" i="1" dirty="0">
+                            <a:latin typeface="Cambria Math" panose="02040503050406030204" pitchFamily="18" charset="0"/>
+                          </a:endParaRPr>
+                        </a:p>
+                        <a:p>
+                          <a:pPr algn="ctr"/>
+                          <a14:m>
+                            <m:oMathPara xmlns:m="http://schemas.openxmlformats.org/officeDocument/2006/math">
+                              <m:oMathParaPr>
+                                <m:jc m:val="centerGroup"/>
+                              </m:oMathParaPr>
+                              <m:oMath xmlns:m="http://schemas.openxmlformats.org/officeDocument/2006/math">
+                                <m:r>
+                                  <a:rPr lang="en-US" sz="1200" b="0" i="1" dirty="0" smtClean="0">
+                                    <a:latin typeface="Cambria Math" panose="02040503050406030204" pitchFamily="18" charset="0"/>
+                                  </a:rPr>
+                                  <m:t> </m:t>
+                                </m:r>
+                                <m:sSub>
+                                  <m:sSubPr>
+                                    <m:ctrlPr>
+                                      <a:rPr lang="en-US" sz="1200" i="1" dirty="0" smtClean="0">
+                                        <a:latin typeface="Cambria Math" panose="02040503050406030204" pitchFamily="18" charset="0"/>
+                                      </a:rPr>
+                                    </m:ctrlPr>
+                                  </m:sSubPr>
+                                  <m:e>
+                                    <m:r>
+                                      <a:rPr lang="en-US" sz="1200" i="1" dirty="0" smtClean="0">
+                                        <a:latin typeface="Cambria Math" panose="02040503050406030204" pitchFamily="18" charset="0"/>
+                                      </a:rPr>
+                                      <m:t>𝑤</m:t>
+                                    </m:r>
+                                  </m:e>
+                                  <m:sub>
+                                    <m:r>
+                                      <a:rPr lang="en-US" sz="1200" b="0" i="1" dirty="0" smtClean="0">
+                                        <a:latin typeface="Cambria Math" panose="02040503050406030204" pitchFamily="18" charset="0"/>
+                                      </a:rPr>
+                                      <m:t>𝑠</m:t>
+                                    </m:r>
+                                  </m:sub>
+                                </m:sSub>
+                                <m:r>
+                                  <a:rPr lang="en-US" sz="1200" b="0" i="1" dirty="0" smtClean="0">
+                                    <a:latin typeface="Cambria Math" panose="02040503050406030204" pitchFamily="18" charset="0"/>
+                                  </a:rPr>
+                                  <m:t> </m:t>
+                                </m:r>
+                                <m:r>
+                                  <a:rPr lang="en-US" sz="1200" i="1" dirty="0" smtClean="0">
+                                    <a:latin typeface="Cambria Math" panose="02040503050406030204" pitchFamily="18" charset="0"/>
+                                  </a:rPr>
+                                  <m:t>=</m:t>
+                                </m:r>
+                                <m:r>
+                                  <a:rPr lang="en-US" sz="1200" b="0" i="1" dirty="0" smtClean="0">
+                                    <a:latin typeface="Cambria Math" panose="02040503050406030204" pitchFamily="18" charset="0"/>
+                                  </a:rPr>
+                                  <m:t>0</m:t>
+                                </m:r>
+                              </m:oMath>
+                            </m:oMathPara>
+                          </a14:m>
+                          <a:endParaRPr lang="en-US" sz="1200" dirty="0"/>
+                        </a:p>
+                      </a:txBody>
+                      <a:tcPr anchor="ctr"/>
+                    </a:tc>
+                    <a:tc>
+                      <a:txBody>
+                        <a:bodyPr/>
+                        <a:lstStyle/>
+                        <a:p>
+                          <a:pPr algn="ctr"/>
+                          <a:r>
+                            <a:rPr lang="en-US" sz="1200" dirty="0"/>
+                            <a:t>6.307</a:t>
+                          </a:r>
+                        </a:p>
+                      </a:txBody>
+                      <a:tcPr anchor="ctr"/>
+                    </a:tc>
+                    <a:tc>
+                      <a:txBody>
+                        <a:bodyPr/>
+                        <a:lstStyle/>
+                        <a:p>
+                          <a:pPr algn="ctr"/>
+                          <a:r>
+                            <a:rPr lang="en-US" sz="1200" dirty="0"/>
+                            <a:t>3.166</a:t>
+                          </a:r>
+                        </a:p>
+                      </a:txBody>
+                      <a:tcPr anchor="ctr"/>
+                    </a:tc>
+                    <a:tc>
+                      <a:txBody>
+                        <a:bodyPr/>
+                        <a:lstStyle/>
+                        <a:p>
+                          <a:pPr algn="ctr"/>
+                          <a:r>
+                            <a:rPr lang="en-US" sz="1200" dirty="0"/>
+                            <a:t>9.988</a:t>
+                          </a:r>
+                        </a:p>
+                      </a:txBody>
+                      <a:tcPr anchor="ctr"/>
+                    </a:tc>
+                    <a:extLst>
+                      <a:ext uri="{0D108BD9-81ED-4DB2-BD59-A6C34878D82A}">
+                        <a16:rowId xmlns:a16="http://schemas.microsoft.com/office/drawing/2014/main" val="10001"/>
+                      </a:ext>
+                    </a:extLst>
+                  </a:tr>
+                  <a:tr h="362434">
+                    <a:tc>
+                      <a:txBody>
+                        <a:bodyPr/>
+                        <a:lstStyle/>
+                        <a:p>
+                          <a:pPr algn="ctr"/>
+                          <a:r>
+                            <a:rPr lang="en-US" sz="1200" dirty="0"/>
+                            <a:t>5</a:t>
+                          </a:r>
+                        </a:p>
+                      </a:txBody>
+                      <a:tcPr anchor="ctr"/>
+                    </a:tc>
+                    <a:tc>
+                      <a:txBody>
+                        <a:bodyPr/>
+                        <a:lstStyle/>
+                        <a:p>
+                          <a:pPr algn="ctr"/>
+                          <a:r>
+                            <a:rPr lang="en-US" sz="1200" dirty="0"/>
+                            <a:t> </a:t>
+                          </a:r>
+                          <a14:m>
+                            <m:oMath xmlns:m="http://schemas.openxmlformats.org/officeDocument/2006/math">
+                              <m:sSub>
+                                <m:sSubPr>
+                                  <m:ctrlPr>
+                                    <a:rPr lang="en-US" sz="1200" i="1" dirty="0" smtClean="0">
+                                      <a:latin typeface="Cambria Math" panose="02040503050406030204" pitchFamily="18" charset="0"/>
+                                    </a:rPr>
+                                  </m:ctrlPr>
+                                </m:sSubPr>
+                                <m:e>
+                                  <m:r>
+                                    <a:rPr lang="en-US" sz="1200" i="1" dirty="0" smtClean="0">
+                                      <a:latin typeface="Cambria Math" panose="02040503050406030204" pitchFamily="18" charset="0"/>
+                                    </a:rPr>
+                                    <m:t>𝑤</m:t>
+                                  </m:r>
+                                </m:e>
+                                <m:sub>
+                                  <m:r>
+                                    <a:rPr lang="en-US" sz="1200" i="1" dirty="0" smtClean="0">
+                                      <a:latin typeface="Cambria Math" panose="02040503050406030204" pitchFamily="18" charset="0"/>
+                                    </a:rPr>
+                                    <m:t>h</m:t>
+                                  </m:r>
+                                </m:sub>
+                              </m:sSub>
+                              <m:r>
+                                <a:rPr lang="en-US" sz="1200" i="1" dirty="0" smtClean="0">
+                                  <a:latin typeface="Cambria Math" panose="02040503050406030204" pitchFamily="18" charset="0"/>
+                                </a:rPr>
+                                <m:t>=</m:t>
+                              </m:r>
+                              <m:r>
+                                <a:rPr lang="en-US" sz="1200" b="0" i="1" dirty="0" smtClean="0">
+                                  <a:latin typeface="Cambria Math" panose="02040503050406030204" pitchFamily="18" charset="0"/>
+                                </a:rPr>
+                                <m:t>3</m:t>
+                              </m:r>
+                            </m:oMath>
+                          </a14:m>
+                          <a:r>
+                            <a:rPr lang="en-US" sz="1200" dirty="0"/>
+                            <a:t> </a:t>
+                          </a:r>
+                          <a14:m>
+                            <m:oMath xmlns:m="http://schemas.openxmlformats.org/officeDocument/2006/math">
+                              <m:r>
+                                <a:rPr lang="en-US" sz="1200" b="0" i="0" dirty="0" smtClean="0">
+                                  <a:latin typeface="Cambria Math" panose="02040503050406030204" pitchFamily="18" charset="0"/>
+                                </a:rPr>
+                                <m:t> </m:t>
+                              </m:r>
+                              <m:sSub>
+                                <m:sSubPr>
+                                  <m:ctrlPr>
+                                    <a:rPr lang="en-US" sz="1200" i="1" dirty="0" smtClean="0">
+                                      <a:latin typeface="Cambria Math" panose="02040503050406030204" pitchFamily="18" charset="0"/>
+                                    </a:rPr>
+                                  </m:ctrlPr>
+                                </m:sSubPr>
+                                <m:e>
+                                  <m:r>
+                                    <a:rPr lang="en-US" sz="1200" i="1" dirty="0" smtClean="0">
+                                      <a:latin typeface="Cambria Math" panose="02040503050406030204" pitchFamily="18" charset="0"/>
+                                    </a:rPr>
+                                    <m:t>𝑤</m:t>
+                                  </m:r>
+                                </m:e>
+                                <m:sub>
+                                  <m:r>
+                                    <a:rPr lang="en-US" sz="1200" b="0" i="1" dirty="0" smtClean="0">
+                                      <a:latin typeface="Cambria Math" panose="02040503050406030204" pitchFamily="18" charset="0"/>
+                                    </a:rPr>
+                                    <m:t>𝑠</m:t>
+                                  </m:r>
+                                </m:sub>
+                              </m:sSub>
+                              <m:r>
+                                <a:rPr lang="en-US" sz="1200" b="0" i="1" dirty="0" smtClean="0">
+                                  <a:latin typeface="Cambria Math" panose="02040503050406030204" pitchFamily="18" charset="0"/>
+                                </a:rPr>
+                                <m:t> </m:t>
+                              </m:r>
+                              <m:r>
+                                <a:rPr lang="en-US" sz="1200" i="1" dirty="0" smtClean="0">
+                                  <a:latin typeface="Cambria Math" panose="02040503050406030204" pitchFamily="18" charset="0"/>
+                                </a:rPr>
+                                <m:t>=</m:t>
+                              </m:r>
+                              <m:r>
+                                <a:rPr lang="en-US" sz="1200" b="0" i="1" dirty="0" smtClean="0">
+                                  <a:latin typeface="Cambria Math" panose="02040503050406030204" pitchFamily="18" charset="0"/>
+                                </a:rPr>
+                                <m:t>0</m:t>
+                              </m:r>
+                            </m:oMath>
+                          </a14:m>
+                          <a:endParaRPr lang="en-US" sz="1200" dirty="0"/>
+                        </a:p>
+                      </a:txBody>
+                      <a:tcPr anchor="ctr"/>
+                    </a:tc>
+                    <a:tc>
+                      <a:txBody>
+                        <a:bodyPr/>
+                        <a:lstStyle/>
+                        <a:p>
+                          <a:pPr algn="ctr"/>
+                          <a:r>
+                            <a:rPr lang="en-US" sz="1200" dirty="0"/>
+                            <a:t>6.296</a:t>
+                          </a:r>
+                        </a:p>
+                      </a:txBody>
+                      <a:tcPr anchor="ctr"/>
+                    </a:tc>
+                    <a:tc>
+                      <a:txBody>
+                        <a:bodyPr/>
+                        <a:lstStyle/>
+                        <a:p>
+                          <a:pPr algn="ctr"/>
+                          <a:r>
+                            <a:rPr lang="en-US" sz="1200" dirty="0"/>
+                            <a:t>4.124</a:t>
+                          </a:r>
+                        </a:p>
+                      </a:txBody>
+                      <a:tcPr anchor="ctr"/>
+                    </a:tc>
+                    <a:tc>
+                      <a:txBody>
+                        <a:bodyPr/>
+                        <a:lstStyle/>
+                        <a:p>
+                          <a:pPr algn="ctr"/>
+                          <a:r>
+                            <a:rPr lang="en-US" sz="1200" dirty="0"/>
+                            <a:t>31.736</a:t>
+                          </a:r>
+                        </a:p>
+                      </a:txBody>
+                      <a:tcPr anchor="ctr"/>
+                    </a:tc>
+                    <a:extLst>
+                      <a:ext uri="{0D108BD9-81ED-4DB2-BD59-A6C34878D82A}">
+                        <a16:rowId xmlns:a16="http://schemas.microsoft.com/office/drawing/2014/main" val="10002"/>
+                      </a:ext>
+                    </a:extLst>
+                  </a:tr>
+                  <a:tr h="432637">
+                    <a:tc>
+                      <a:txBody>
+                        <a:bodyPr/>
+                        <a:lstStyle/>
+                        <a:p>
+                          <a:pPr algn="ctr"/>
+                          <a:r>
+                            <a:rPr lang="en-US" sz="1200" dirty="0"/>
+                            <a:t>6</a:t>
+                          </a:r>
+                        </a:p>
+                      </a:txBody>
+                      <a:tcPr anchor="ctr"/>
+                    </a:tc>
+                    <a:tc>
+                      <a:txBody>
+                        <a:bodyPr/>
+                        <a:lstStyle/>
+                        <a:p>
+                          <a:pPr algn="ctr"/>
+                          <a:r>
+                            <a:rPr lang="en-US" sz="1200" dirty="0"/>
+                            <a:t> </a:t>
+                          </a:r>
+                          <a14:m>
+                            <m:oMath xmlns:m="http://schemas.openxmlformats.org/officeDocument/2006/math">
+                              <m:sSub>
+                                <m:sSubPr>
+                                  <m:ctrlPr>
+                                    <a:rPr lang="en-US" sz="1200" i="1" dirty="0" smtClean="0">
+                                      <a:latin typeface="Cambria Math" panose="02040503050406030204" pitchFamily="18" charset="0"/>
+                                    </a:rPr>
+                                  </m:ctrlPr>
+                                </m:sSubPr>
+                                <m:e>
+                                  <m:r>
+                                    <a:rPr lang="en-US" sz="1200" i="1" dirty="0" smtClean="0">
+                                      <a:latin typeface="Cambria Math" panose="02040503050406030204" pitchFamily="18" charset="0"/>
+                                    </a:rPr>
+                                    <m:t>𝑤</m:t>
+                                  </m:r>
+                                </m:e>
+                                <m:sub>
+                                  <m:r>
+                                    <a:rPr lang="en-US" sz="1200" i="1" dirty="0" smtClean="0">
+                                      <a:latin typeface="Cambria Math" panose="02040503050406030204" pitchFamily="18" charset="0"/>
+                                    </a:rPr>
+                                    <m:t>h</m:t>
+                                  </m:r>
+                                </m:sub>
+                              </m:sSub>
+                              <m:r>
+                                <a:rPr lang="en-US" sz="1200" i="1" dirty="0" smtClean="0">
+                                  <a:latin typeface="Cambria Math" panose="02040503050406030204" pitchFamily="18" charset="0"/>
+                                </a:rPr>
+                                <m:t>=</m:t>
+                              </m:r>
+                              <m:r>
+                                <a:rPr lang="en-US" sz="1200" b="0" i="1" dirty="0" smtClean="0">
+                                  <a:latin typeface="Cambria Math" panose="02040503050406030204" pitchFamily="18" charset="0"/>
+                                </a:rPr>
+                                <m:t>0</m:t>
+                              </m:r>
+                            </m:oMath>
+                          </a14:m>
+                          <a:r>
+                            <a:rPr lang="en-US" sz="1200" dirty="0"/>
+                            <a:t> </a:t>
+                          </a:r>
+                          <a14:m>
+                            <m:oMath xmlns:m="http://schemas.openxmlformats.org/officeDocument/2006/math">
+                              <m:r>
+                                <a:rPr lang="en-US" sz="1200" b="0" i="0" dirty="0" smtClean="0">
+                                  <a:latin typeface="Cambria Math" panose="02040503050406030204" pitchFamily="18" charset="0"/>
+                                </a:rPr>
+                                <m:t> </m:t>
+                              </m:r>
+                              <m:sSub>
+                                <m:sSubPr>
+                                  <m:ctrlPr>
+                                    <a:rPr lang="en-US" sz="1200" i="1" dirty="0" smtClean="0">
+                                      <a:latin typeface="Cambria Math" panose="02040503050406030204" pitchFamily="18" charset="0"/>
+                                    </a:rPr>
+                                  </m:ctrlPr>
+                                </m:sSubPr>
+                                <m:e>
+                                  <m:r>
+                                    <a:rPr lang="en-US" sz="1200" i="1" dirty="0" smtClean="0">
+                                      <a:latin typeface="Cambria Math" panose="02040503050406030204" pitchFamily="18" charset="0"/>
+                                    </a:rPr>
+                                    <m:t>𝑤</m:t>
+                                  </m:r>
+                                </m:e>
+                                <m:sub>
+                                  <m:r>
+                                    <a:rPr lang="en-US" sz="1200" b="0" i="1" dirty="0" smtClean="0">
+                                      <a:latin typeface="Cambria Math" panose="02040503050406030204" pitchFamily="18" charset="0"/>
+                                    </a:rPr>
+                                    <m:t>𝑠</m:t>
+                                  </m:r>
+                                </m:sub>
+                              </m:sSub>
+                              <m:r>
+                                <a:rPr lang="en-US" sz="1200" b="0" i="1" dirty="0" smtClean="0">
+                                  <a:latin typeface="Cambria Math" panose="02040503050406030204" pitchFamily="18" charset="0"/>
+                                </a:rPr>
+                                <m:t> </m:t>
+                              </m:r>
+                              <m:r>
+                                <a:rPr lang="en-US" sz="1200" i="1" dirty="0" smtClean="0">
+                                  <a:latin typeface="Cambria Math" panose="02040503050406030204" pitchFamily="18" charset="0"/>
+                                </a:rPr>
+                                <m:t>=</m:t>
+                              </m:r>
+                              <m:r>
+                                <a:rPr lang="en-US" sz="1200" b="0" i="1" dirty="0" smtClean="0">
+                                  <a:latin typeface="Cambria Math" panose="02040503050406030204" pitchFamily="18" charset="0"/>
+                                </a:rPr>
+                                <m:t>3</m:t>
+                              </m:r>
+                            </m:oMath>
+                          </a14:m>
+                          <a:endParaRPr lang="en-US" sz="1200" dirty="0"/>
+                        </a:p>
+                      </a:txBody>
+                      <a:tcPr anchor="ctr"/>
+                    </a:tc>
+                    <a:tc>
+                      <a:txBody>
+                        <a:bodyPr/>
+                        <a:lstStyle/>
+                        <a:p>
+                          <a:pPr algn="ctr"/>
+                          <a:r>
+                            <a:rPr lang="en-US" sz="1200" dirty="0"/>
+                            <a:t>4.743</a:t>
+                          </a:r>
+                        </a:p>
+                      </a:txBody>
+                      <a:tcPr anchor="ctr"/>
+                    </a:tc>
+                    <a:tc>
+                      <a:txBody>
+                        <a:bodyPr/>
+                        <a:lstStyle/>
+                        <a:p>
+                          <a:pPr algn="ctr"/>
+                          <a:r>
+                            <a:rPr lang="en-US" sz="1200" dirty="0"/>
+                            <a:t>2.494</a:t>
+                          </a:r>
+                        </a:p>
+                      </a:txBody>
+                      <a:tcPr anchor="ctr"/>
+                    </a:tc>
+                    <a:tc>
+                      <a:txBody>
+                        <a:bodyPr/>
+                        <a:lstStyle/>
+                        <a:p>
+                          <a:pPr algn="ctr"/>
+                          <a:r>
+                            <a:rPr lang="en-US" sz="1200" dirty="0"/>
+                            <a:t>1.729</a:t>
+                          </a:r>
+                        </a:p>
+                      </a:txBody>
+                      <a:tcPr anchor="ctr"/>
+                    </a:tc>
+                    <a:extLst>
+                      <a:ext uri="{0D108BD9-81ED-4DB2-BD59-A6C34878D82A}">
+                        <a16:rowId xmlns:a16="http://schemas.microsoft.com/office/drawing/2014/main" val="10003"/>
+                      </a:ext>
+                    </a:extLst>
+                  </a:tr>
+                </a:tbl>
+              </a:graphicData>
+            </a:graphic>
+          </p:graphicFrame>
+        </mc:Choice>
+        <mc:Fallback>
+          <p:graphicFrame>
+            <p:nvGraphicFramePr>
+              <p:cNvPr id="3" name="Table 2">
+                <a:extLst>
+                  <a:ext uri="{FF2B5EF4-FFF2-40B4-BE49-F238E27FC236}">
+                    <a16:creationId xmlns:a16="http://schemas.microsoft.com/office/drawing/2014/main" id="{D0EB71A3-46E8-4D14-8C66-7AA2857B02D9}"/>
+                  </a:ext>
+                </a:extLst>
+              </p:cNvPr>
+              <p:cNvGraphicFramePr>
+                <a:graphicFrameLocks noGrp="1"/>
+              </p:cNvGraphicFramePr>
+              <p:nvPr>
+                <p:extLst>
+                  <p:ext uri="{D42A27DB-BD31-4B8C-83A1-F6EECF244321}">
+                    <p14:modId xmlns:p14="http://schemas.microsoft.com/office/powerpoint/2010/main" val="1437036646"/>
+                  </p:ext>
+                </p:extLst>
+              </p:nvPr>
+            </p:nvGraphicFramePr>
+            <p:xfrm>
+              <a:off x="1190278" y="2850857"/>
+              <a:ext cx="4954106" cy="1828800"/>
+            </p:xfrm>
+            <a:graphic>
+              <a:graphicData uri="http://schemas.openxmlformats.org/drawingml/2006/table">
+                <a:tbl>
+                  <a:tblPr firstRow="1" bandRow="1">
+                    <a:tableStyleId>{8EC20E35-A176-4012-BC5E-935CFFF8708E}</a:tableStyleId>
+                  </a:tblPr>
+                  <a:tblGrid>
+                    <a:gridCol w="665566">
+                      <a:extLst>
+                        <a:ext uri="{9D8B030D-6E8A-4147-A177-3AD203B41FA5}">
+                          <a16:colId xmlns:a16="http://schemas.microsoft.com/office/drawing/2014/main" val="20000"/>
+                        </a:ext>
+                      </a:extLst>
+                    </a:gridCol>
+                    <a:gridCol w="1018270">
+                      <a:extLst>
+                        <a:ext uri="{9D8B030D-6E8A-4147-A177-3AD203B41FA5}">
+                          <a16:colId xmlns:a16="http://schemas.microsoft.com/office/drawing/2014/main" val="20002"/>
+                        </a:ext>
+                      </a:extLst>
+                    </a:gridCol>
+                    <a:gridCol w="1174700">
+                      <a:extLst>
+                        <a:ext uri="{9D8B030D-6E8A-4147-A177-3AD203B41FA5}">
+                          <a16:colId xmlns:a16="http://schemas.microsoft.com/office/drawing/2014/main" val="20003"/>
+                        </a:ext>
+                      </a:extLst>
+                    </a:gridCol>
+                    <a:gridCol w="1106056">
+                      <a:extLst>
+                        <a:ext uri="{9D8B030D-6E8A-4147-A177-3AD203B41FA5}">
+                          <a16:colId xmlns:a16="http://schemas.microsoft.com/office/drawing/2014/main" val="20004"/>
+                        </a:ext>
+                      </a:extLst>
+                    </a:gridCol>
+                    <a:gridCol w="989514">
+                      <a:extLst>
+                        <a:ext uri="{9D8B030D-6E8A-4147-A177-3AD203B41FA5}">
+                          <a16:colId xmlns:a16="http://schemas.microsoft.com/office/drawing/2014/main" val="20005"/>
+                        </a:ext>
+                      </a:extLst>
+                    </a:gridCol>
+                  </a:tblGrid>
+                  <a:tr h="457200">
+                    <a:tc>
+                      <a:txBody>
+                        <a:bodyPr/>
+                        <a:lstStyle/>
+                        <a:p>
+                          <a:pPr algn="ctr"/>
+                          <a:r>
+                            <a:rPr lang="en-US" sz="1200" dirty="0"/>
+                            <a:t>Case</a:t>
+                          </a:r>
+                        </a:p>
+                      </a:txBody>
+                      <a:tcPr anchor="ctr"/>
+                    </a:tc>
+                    <a:tc>
+                      <a:txBody>
+                        <a:bodyPr/>
+                        <a:lstStyle/>
+                        <a:p>
+                          <a:pPr algn="ctr"/>
+                          <a:r>
+                            <a:rPr lang="en-US" sz="1200" dirty="0"/>
+                            <a:t>Weights</a:t>
+                          </a:r>
+                        </a:p>
+                      </a:txBody>
+                      <a:tcPr anchor="ctr"/>
+                    </a:tc>
+                    <a:tc>
+                      <a:txBody>
+                        <a:bodyPr/>
+                        <a:lstStyle/>
+                        <a:p>
+                          <a:pPr algn="ctr"/>
+                          <a:r>
+                            <a:rPr lang="en-US" sz="1200" dirty="0"/>
+                            <a:t>Mean Altitude (km)</a:t>
+                          </a:r>
+                        </a:p>
+                      </a:txBody>
+                      <a:tcPr anchor="ctr"/>
+                    </a:tc>
+                    <a:tc>
+                      <a:txBody>
+                        <a:bodyPr/>
+                        <a:lstStyle/>
+                        <a:p>
+                          <a:pPr algn="ctr"/>
+                          <a:r>
+                            <a:rPr lang="en-US" sz="1200" dirty="0"/>
+                            <a:t>3</a:t>
+                          </a:r>
+                          <a:r>
+                            <a:rPr lang="el-GR" sz="1200" dirty="0"/>
+                            <a:t>σ</a:t>
+                          </a:r>
+                          <a:r>
+                            <a:rPr lang="en-US" sz="1200" baseline="0" dirty="0"/>
+                            <a:t> Low Altitude (km)</a:t>
+                          </a:r>
+                          <a:endParaRPr lang="en-US" sz="1200" dirty="0"/>
+                        </a:p>
+                      </a:txBody>
+                      <a:tcPr anchor="ctr"/>
+                    </a:tc>
+                    <a:tc>
+                      <a:txBody>
+                        <a:bodyPr/>
+                        <a:lstStyle/>
+                        <a:p>
+                          <a:pPr algn="ctr"/>
+                          <a:r>
+                            <a:rPr lang="en-US" sz="1200" dirty="0"/>
+                            <a:t>3</a:t>
+                          </a:r>
+                          <a:r>
+                            <a:rPr lang="el-GR" sz="1200" dirty="0"/>
+                            <a:t>σ</a:t>
+                          </a:r>
+                          <a:r>
+                            <a:rPr lang="en-US" sz="1200" dirty="0"/>
+                            <a:t> Range Error (km)</a:t>
+                          </a:r>
+                        </a:p>
+                      </a:txBody>
+                      <a:tcPr anchor="ctr"/>
+                    </a:tc>
+                    <a:extLst>
+                      <a:ext uri="{0D108BD9-81ED-4DB2-BD59-A6C34878D82A}">
+                        <a16:rowId xmlns:a16="http://schemas.microsoft.com/office/drawing/2014/main" val="10000"/>
+                      </a:ext>
+                    </a:extLst>
+                  </a:tr>
+                  <a:tr h="457200">
+                    <a:tc>
+                      <a:txBody>
+                        <a:bodyPr/>
+                        <a:lstStyle/>
+                        <a:p>
+                          <a:pPr algn="ctr"/>
+                          <a:r>
+                            <a:rPr lang="en-US" sz="1200" dirty="0"/>
+                            <a:t>4</a:t>
+                          </a:r>
+                        </a:p>
+                      </a:txBody>
+                      <a:tcPr anchor="ctr"/>
+                    </a:tc>
+                    <a:tc>
+                      <a:txBody>
+                        <a:bodyPr/>
+                        <a:lstStyle/>
+                        <a:p>
+                          <a:endParaRPr lang="en-US"/>
+                        </a:p>
+                      </a:txBody>
+                      <a:tcPr anchor="ctr">
+                        <a:blipFill>
+                          <a:blip r:embed="rId2"/>
+                          <a:stretch>
+                            <a:fillRect l="-65269" t="-101316" r="-323353" b="-200000"/>
+                          </a:stretch>
+                        </a:blipFill>
+                      </a:tcPr>
+                    </a:tc>
+                    <a:tc>
+                      <a:txBody>
+                        <a:bodyPr/>
+                        <a:lstStyle/>
+                        <a:p>
+                          <a:pPr algn="ctr"/>
+                          <a:r>
+                            <a:rPr lang="en-US" sz="1200" dirty="0"/>
+                            <a:t>6.307</a:t>
+                          </a:r>
+                        </a:p>
+                      </a:txBody>
+                      <a:tcPr anchor="ctr"/>
+                    </a:tc>
+                    <a:tc>
+                      <a:txBody>
+                        <a:bodyPr/>
+                        <a:lstStyle/>
+                        <a:p>
+                          <a:pPr algn="ctr"/>
+                          <a:r>
+                            <a:rPr lang="en-US" sz="1200" dirty="0"/>
+                            <a:t>3.166</a:t>
+                          </a:r>
+                        </a:p>
+                      </a:txBody>
+                      <a:tcPr anchor="ctr"/>
+                    </a:tc>
+                    <a:tc>
+                      <a:txBody>
+                        <a:bodyPr/>
+                        <a:lstStyle/>
+                        <a:p>
+                          <a:pPr algn="ctr"/>
+                          <a:r>
+                            <a:rPr lang="en-US" sz="1200" dirty="0"/>
+                            <a:t>9.988</a:t>
+                          </a:r>
+                        </a:p>
+                      </a:txBody>
+                      <a:tcPr anchor="ctr"/>
+                    </a:tc>
+                    <a:extLst>
+                      <a:ext uri="{0D108BD9-81ED-4DB2-BD59-A6C34878D82A}">
+                        <a16:rowId xmlns:a16="http://schemas.microsoft.com/office/drawing/2014/main" val="10001"/>
+                      </a:ext>
+                    </a:extLst>
+                  </a:tr>
+                  <a:tr h="457200">
+                    <a:tc>
+                      <a:txBody>
+                        <a:bodyPr/>
+                        <a:lstStyle/>
+                        <a:p>
+                          <a:pPr algn="ctr"/>
+                          <a:r>
+                            <a:rPr lang="en-US" sz="1200" dirty="0"/>
+                            <a:t>5</a:t>
+                          </a:r>
+                        </a:p>
+                      </a:txBody>
+                      <a:tcPr anchor="ctr"/>
+                    </a:tc>
+                    <a:tc>
+                      <a:txBody>
+                        <a:bodyPr/>
+                        <a:lstStyle/>
+                        <a:p>
+                          <a:endParaRPr lang="en-US"/>
+                        </a:p>
+                      </a:txBody>
+                      <a:tcPr anchor="ctr">
+                        <a:blipFill>
+                          <a:blip r:embed="rId2"/>
+                          <a:stretch>
+                            <a:fillRect l="-65269" t="-204000" r="-323353" b="-102667"/>
+                          </a:stretch>
+                        </a:blipFill>
+                      </a:tcPr>
+                    </a:tc>
+                    <a:tc>
+                      <a:txBody>
+                        <a:bodyPr/>
+                        <a:lstStyle/>
+                        <a:p>
+                          <a:pPr algn="ctr"/>
+                          <a:r>
+                            <a:rPr lang="en-US" sz="1200" dirty="0"/>
+                            <a:t>6.296</a:t>
+                          </a:r>
+                        </a:p>
+                      </a:txBody>
+                      <a:tcPr anchor="ctr"/>
+                    </a:tc>
+                    <a:tc>
+                      <a:txBody>
+                        <a:bodyPr/>
+                        <a:lstStyle/>
+                        <a:p>
+                          <a:pPr algn="ctr"/>
+                          <a:r>
+                            <a:rPr lang="en-US" sz="1200" dirty="0"/>
+                            <a:t>4.124</a:t>
+                          </a:r>
+                        </a:p>
+                      </a:txBody>
+                      <a:tcPr anchor="ctr"/>
+                    </a:tc>
+                    <a:tc>
+                      <a:txBody>
+                        <a:bodyPr/>
+                        <a:lstStyle/>
+                        <a:p>
+                          <a:pPr algn="ctr"/>
+                          <a:r>
+                            <a:rPr lang="en-US" sz="1200" dirty="0"/>
+                            <a:t>31.736</a:t>
+                          </a:r>
+                        </a:p>
+                      </a:txBody>
+                      <a:tcPr anchor="ctr"/>
+                    </a:tc>
+                    <a:extLst>
+                      <a:ext uri="{0D108BD9-81ED-4DB2-BD59-A6C34878D82A}">
+                        <a16:rowId xmlns:a16="http://schemas.microsoft.com/office/drawing/2014/main" val="10002"/>
+                      </a:ext>
+                    </a:extLst>
+                  </a:tr>
+                  <a:tr h="457200">
+                    <a:tc>
+                      <a:txBody>
+                        <a:bodyPr/>
+                        <a:lstStyle/>
+                        <a:p>
+                          <a:pPr algn="ctr"/>
+                          <a:r>
+                            <a:rPr lang="en-US" sz="1200" dirty="0"/>
+                            <a:t>6</a:t>
+                          </a:r>
+                        </a:p>
+                      </a:txBody>
+                      <a:tcPr anchor="ctr"/>
+                    </a:tc>
+                    <a:tc>
+                      <a:txBody>
+                        <a:bodyPr/>
+                        <a:lstStyle/>
+                        <a:p>
+                          <a:endParaRPr lang="en-US"/>
+                        </a:p>
+                      </a:txBody>
+                      <a:tcPr anchor="ctr">
+                        <a:blipFill>
+                          <a:blip r:embed="rId2"/>
+                          <a:stretch>
+                            <a:fillRect l="-65269" t="-304000" r="-323353" b="-2667"/>
+                          </a:stretch>
+                        </a:blipFill>
+                      </a:tcPr>
+                    </a:tc>
+                    <a:tc>
+                      <a:txBody>
+                        <a:bodyPr/>
+                        <a:lstStyle/>
+                        <a:p>
+                          <a:pPr algn="ctr"/>
+                          <a:r>
+                            <a:rPr lang="en-US" sz="1200" dirty="0"/>
+                            <a:t>4.743</a:t>
+                          </a:r>
+                        </a:p>
+                      </a:txBody>
+                      <a:tcPr anchor="ctr"/>
+                    </a:tc>
+                    <a:tc>
+                      <a:txBody>
+                        <a:bodyPr/>
+                        <a:lstStyle/>
+                        <a:p>
+                          <a:pPr algn="ctr"/>
+                          <a:r>
+                            <a:rPr lang="en-US" sz="1200" dirty="0"/>
+                            <a:t>2.494</a:t>
+                          </a:r>
+                        </a:p>
+                      </a:txBody>
+                      <a:tcPr anchor="ctr"/>
+                    </a:tc>
+                    <a:tc>
+                      <a:txBody>
+                        <a:bodyPr/>
+                        <a:lstStyle/>
+                        <a:p>
+                          <a:pPr algn="ctr"/>
+                          <a:r>
+                            <a:rPr lang="en-US" sz="1200" dirty="0"/>
+                            <a:t>1.729</a:t>
+                          </a:r>
+                        </a:p>
+                      </a:txBody>
+                      <a:tcPr anchor="ctr"/>
+                    </a:tc>
+                    <a:extLst>
+                      <a:ext uri="{0D108BD9-81ED-4DB2-BD59-A6C34878D82A}">
+                        <a16:rowId xmlns:a16="http://schemas.microsoft.com/office/drawing/2014/main" val="10003"/>
+                      </a:ext>
+                    </a:extLst>
+                  </a:tr>
+                </a:tbl>
+              </a:graphicData>
+            </a:graphic>
+          </p:graphicFrame>
+        </mc:Fallback>
+      </mc:AlternateContent>
+      <p:sp>
+        <p:nvSpPr>
+          <p:cNvPr id="2" name="TextBox 1">
+            <a:extLst>
+              <a:ext uri="{FF2B5EF4-FFF2-40B4-BE49-F238E27FC236}">
+                <a16:creationId xmlns:a16="http://schemas.microsoft.com/office/drawing/2014/main" id="{AA70D9EB-9FA9-459F-981E-5061D572C3E4}"/>
+              </a:ext>
+            </a:extLst>
+          </p:cNvPr>
+          <p:cNvSpPr txBox="1"/>
+          <p:nvPr/>
+        </p:nvSpPr>
+        <p:spPr>
+          <a:xfrm>
+            <a:off x="6946711" y="655093"/>
+            <a:ext cx="3017493" cy="369332"/>
+          </a:xfrm>
+          <a:prstGeom prst="rect">
+            <a:avLst/>
+          </a:prstGeom>
+          <a:noFill/>
+        </p:spPr>
+        <p:txBody>
+          <a:bodyPr wrap="none" rtlCol="0">
+            <a:spAutoFit/>
+          </a:bodyPr>
+          <a:lstStyle/>
+          <a:p>
+            <a:r>
+              <a:rPr lang="en-US" dirty="0"/>
+              <a:t>Optimized for  each case gains</a:t>
+            </a:r>
+          </a:p>
+        </p:txBody>
+      </p:sp>
+    </p:spTree>
+    <p:extLst>
+      <p:ext uri="{BB962C8B-B14F-4D97-AF65-F5344CB8AC3E}">
+        <p14:creationId xmlns:p14="http://schemas.microsoft.com/office/powerpoint/2010/main" val="1182718341"/>
+      </p:ext>
+    </p:extLst>
+  </p:cSld>
+  <p:clrMapOvr>
+    <a:masterClrMapping/>
+  </p:clrMapOvr>
+</p:sld>
+</file>
+
+<file path=ppt/slides/slide4.xml><?xml version="1.0" encoding="utf-8"?>
 <p:sld xmlns:a="http://schemas.openxmlformats.org/drawingml/2006/main" xmlns:r="http://schemas.openxmlformats.org/officeDocument/2006/relationships" xmlns:p="http://schemas.openxmlformats.org/presentationml/2006/main">
   <p:cSld>
     <p:spTree>
@@ -4561,7 +7740,7 @@
 </p:sld>
 </file>
 
-<file path=ppt/slides/slide3.xml><?xml version="1.0" encoding="utf-8"?>
+<file path=ppt/slides/slide5.xml><?xml version="1.0" encoding="utf-8"?>
 <p:sld xmlns:a="http://schemas.openxmlformats.org/drawingml/2006/main" xmlns:r="http://schemas.openxmlformats.org/officeDocument/2006/relationships" xmlns:p="http://schemas.openxmlformats.org/presentationml/2006/main">
   <p:cSld>
     <p:spTree>
@@ -4651,7 +7830,7 @@
 </p:sld>
 </file>
 
-<file path=ppt/slides/slide4.xml><?xml version="1.0" encoding="utf-8"?>
+<file path=ppt/slides/slide6.xml><?xml version="1.0" encoding="utf-8"?>
 <p:sld xmlns:a="http://schemas.openxmlformats.org/drawingml/2006/main" xmlns:r="http://schemas.openxmlformats.org/officeDocument/2006/relationships" xmlns:p="http://schemas.openxmlformats.org/presentationml/2006/main">
   <p:cSld>
     <p:spTree>
@@ -4741,7 +7920,7 @@
 </p:sld>
 </file>
 
-<file path=ppt/slides/slide5.xml><?xml version="1.0" encoding="utf-8"?>
+<file path=ppt/slides/slide7.xml><?xml version="1.0" encoding="utf-8"?>
 <p:sld xmlns:a="http://schemas.openxmlformats.org/drawingml/2006/main" xmlns:r="http://schemas.openxmlformats.org/officeDocument/2006/relationships" xmlns:p="http://schemas.openxmlformats.org/presentationml/2006/main">
   <p:cSld>
     <p:spTree>

</xml_diff>

<commit_message>
Small notebook and doc update
</commit_message>
<xml_diff>
--- a/Documents/PropellantOptimalJournal/ddp/Diagrams.pptx
+++ b/Documents/PropellantOptimalJournal/ddp/Diagrams.pptx
@@ -112,7 +112,7 @@
   </p:defaultTextStyle>
   <p:extLst>
     <p:ext uri="{EFAFB233-063F-42B5-8137-9DF3F51BA10A}">
-      <p15:sldGuideLst xmlns:p15="http://schemas.microsoft.com/office/powerpoint/2012/main"/>
+      <p15:sldGuideLst xmlns:p15="http://schemas.microsoft.com/office/powerpoint/2012/main" xmlns=""/>
     </p:ext>
   </p:extLst>
 </p:presentation>
@@ -247,7 +247,7 @@
           <a:p>
             <a:fld id="{073BE5FF-B486-411D-A066-5813E4596693}" type="datetimeFigureOut">
               <a:rPr lang="en-US" smtClean="0"/>
-              <a:t>2/17/2021</a:t>
+              <a:t>2/22/2021</a:t>
             </a:fld>
             <a:endParaRPr lang="en-US"/>
           </a:p>
@@ -415,7 +415,7 @@
           <a:p>
             <a:fld id="{073BE5FF-B486-411D-A066-5813E4596693}" type="datetimeFigureOut">
               <a:rPr lang="en-US" smtClean="0"/>
-              <a:t>2/17/2021</a:t>
+              <a:t>2/22/2021</a:t>
             </a:fld>
             <a:endParaRPr lang="en-US"/>
           </a:p>
@@ -593,7 +593,7 @@
           <a:p>
             <a:fld id="{073BE5FF-B486-411D-A066-5813E4596693}" type="datetimeFigureOut">
               <a:rPr lang="en-US" smtClean="0"/>
-              <a:t>2/17/2021</a:t>
+              <a:t>2/22/2021</a:t>
             </a:fld>
             <a:endParaRPr lang="en-US"/>
           </a:p>
@@ -761,7 +761,7 @@
           <a:p>
             <a:fld id="{073BE5FF-B486-411D-A066-5813E4596693}" type="datetimeFigureOut">
               <a:rPr lang="en-US" smtClean="0"/>
-              <a:t>2/17/2021</a:t>
+              <a:t>2/22/2021</a:t>
             </a:fld>
             <a:endParaRPr lang="en-US"/>
           </a:p>
@@ -1006,7 +1006,7 @@
           <a:p>
             <a:fld id="{073BE5FF-B486-411D-A066-5813E4596693}" type="datetimeFigureOut">
               <a:rPr lang="en-US" smtClean="0"/>
-              <a:t>2/17/2021</a:t>
+              <a:t>2/22/2021</a:t>
             </a:fld>
             <a:endParaRPr lang="en-US"/>
           </a:p>
@@ -1235,7 +1235,7 @@
           <a:p>
             <a:fld id="{073BE5FF-B486-411D-A066-5813E4596693}" type="datetimeFigureOut">
               <a:rPr lang="en-US" smtClean="0"/>
-              <a:t>2/17/2021</a:t>
+              <a:t>2/22/2021</a:t>
             </a:fld>
             <a:endParaRPr lang="en-US"/>
           </a:p>
@@ -1599,7 +1599,7 @@
           <a:p>
             <a:fld id="{073BE5FF-B486-411D-A066-5813E4596693}" type="datetimeFigureOut">
               <a:rPr lang="en-US" smtClean="0"/>
-              <a:t>2/17/2021</a:t>
+              <a:t>2/22/2021</a:t>
             </a:fld>
             <a:endParaRPr lang="en-US"/>
           </a:p>
@@ -1716,7 +1716,7 @@
           <a:p>
             <a:fld id="{073BE5FF-B486-411D-A066-5813E4596693}" type="datetimeFigureOut">
               <a:rPr lang="en-US" smtClean="0"/>
-              <a:t>2/17/2021</a:t>
+              <a:t>2/22/2021</a:t>
             </a:fld>
             <a:endParaRPr lang="en-US"/>
           </a:p>
@@ -1811,7 +1811,7 @@
           <a:p>
             <a:fld id="{073BE5FF-B486-411D-A066-5813E4596693}" type="datetimeFigureOut">
               <a:rPr lang="en-US" smtClean="0"/>
-              <a:t>2/17/2021</a:t>
+              <a:t>2/22/2021</a:t>
             </a:fld>
             <a:endParaRPr lang="en-US"/>
           </a:p>
@@ -2086,7 +2086,7 @@
           <a:p>
             <a:fld id="{073BE5FF-B486-411D-A066-5813E4596693}" type="datetimeFigureOut">
               <a:rPr lang="en-US" smtClean="0"/>
-              <a:t>2/17/2021</a:t>
+              <a:t>2/22/2021</a:t>
             </a:fld>
             <a:endParaRPr lang="en-US"/>
           </a:p>
@@ -2338,7 +2338,7 @@
           <a:p>
             <a:fld id="{073BE5FF-B486-411D-A066-5813E4596693}" type="datetimeFigureOut">
               <a:rPr lang="en-US" smtClean="0"/>
-              <a:t>2/17/2021</a:t>
+              <a:t>2/22/2021</a:t>
             </a:fld>
             <a:endParaRPr lang="en-US"/>
           </a:p>
@@ -2549,7 +2549,7 @@
           <a:p>
             <a:fld id="{073BE5FF-B486-411D-A066-5813E4596693}" type="datetimeFigureOut">
               <a:rPr lang="en-US" smtClean="0"/>
-              <a:t>2/17/2021</a:t>
+              <a:t>2/22/2021</a:t>
             </a:fld>
             <a:endParaRPr lang="en-US"/>
           </a:p>
@@ -2963,7 +2963,7 @@
           <p:nvPr>
             <p:extLst>
               <p:ext uri="{D42A27DB-BD31-4B8C-83A1-F6EECF244321}">
-                <p14:modId xmlns:p14="http://schemas.microsoft.com/office/powerpoint/2010/main" val="2994139687"/>
+                <p14:modId xmlns:p14="http://schemas.microsoft.com/office/powerpoint/2010/main" val="1119037012"/>
               </p:ext>
             </p:extLst>
           </p:nvPr>
@@ -2982,35 +2982,35 @@
                 <a:gridCol w="692129">
                   <a:extLst>
                     <a:ext uri="{9D8B030D-6E8A-4147-A177-3AD203B41FA5}">
-                      <a16:colId xmlns:a16="http://schemas.microsoft.com/office/drawing/2014/main" val="20000"/>
+                      <a16:colId xmlns:a16="http://schemas.microsoft.com/office/drawing/2014/main" xmlns="" val="20000"/>
                     </a:ext>
                   </a:extLst>
                 </a:gridCol>
                 <a:gridCol w="1030076">
                   <a:extLst>
                     <a:ext uri="{9D8B030D-6E8A-4147-A177-3AD203B41FA5}">
-                      <a16:colId xmlns:a16="http://schemas.microsoft.com/office/drawing/2014/main" val="20001"/>
+                      <a16:colId xmlns:a16="http://schemas.microsoft.com/office/drawing/2014/main" xmlns="" val="20001"/>
                     </a:ext>
                   </a:extLst>
                 </a:gridCol>
                 <a:gridCol w="1175269">
                   <a:extLst>
                     <a:ext uri="{9D8B030D-6E8A-4147-A177-3AD203B41FA5}">
-                      <a16:colId xmlns:a16="http://schemas.microsoft.com/office/drawing/2014/main" val="20003"/>
+                      <a16:colId xmlns:a16="http://schemas.microsoft.com/office/drawing/2014/main" xmlns="" val="20003"/>
                     </a:ext>
                   </a:extLst>
                 </a:gridCol>
                 <a:gridCol w="1028316">
                   <a:extLst>
                     <a:ext uri="{9D8B030D-6E8A-4147-A177-3AD203B41FA5}">
-                      <a16:colId xmlns:a16="http://schemas.microsoft.com/office/drawing/2014/main" val="20004"/>
+                      <a16:colId xmlns:a16="http://schemas.microsoft.com/office/drawing/2014/main" xmlns="" val="20004"/>
                     </a:ext>
                   </a:extLst>
                 </a:gridCol>
                 <a:gridCol w="1028316">
                   <a:extLst>
                     <a:ext uri="{9D8B030D-6E8A-4147-A177-3AD203B41FA5}">
-                      <a16:colId xmlns:a16="http://schemas.microsoft.com/office/drawing/2014/main" val="20005"/>
+                      <a16:colId xmlns:a16="http://schemas.microsoft.com/office/drawing/2014/main" xmlns="" val="20005"/>
                     </a:ext>
                   </a:extLst>
                 </a:gridCol>
@@ -3110,7 +3110,7 @@
                 </a:tc>
                 <a:extLst>
                   <a:ext uri="{0D108BD9-81ED-4DB2-BD59-A6C34878D82A}">
-                    <a16:rowId xmlns:a16="http://schemas.microsoft.com/office/drawing/2014/main" val="10000"/>
+                    <a16:rowId xmlns:a16="http://schemas.microsoft.com/office/drawing/2014/main" xmlns="" val="10000"/>
                   </a:ext>
                 </a:extLst>
               </a:tr>
@@ -3178,16 +3178,17 @@
                     <a:p>
                       <a:pPr algn="ctr"/>
                       <a:r>
-                        <a:rPr lang="en-US" sz="1200" dirty="0"/>
-                        <a:t>17.663</a:t>
+                        <a:rPr lang="en-US" sz="1200" dirty="0" smtClean="0"/>
+                        <a:t>21.865</a:t>
                       </a:r>
+                      <a:endParaRPr lang="en-US" sz="1200" dirty="0"/>
                     </a:p>
                   </a:txBody>
                   <a:tcPr anchor="ctr"/>
                 </a:tc>
                 <a:extLst>
                   <a:ext uri="{0D108BD9-81ED-4DB2-BD59-A6C34878D82A}">
-                    <a16:rowId xmlns:a16="http://schemas.microsoft.com/office/drawing/2014/main" val="10004"/>
+                    <a16:rowId xmlns:a16="http://schemas.microsoft.com/office/drawing/2014/main" xmlns="" val="10004"/>
                   </a:ext>
                 </a:extLst>
               </a:tr>
@@ -3255,16 +3256,17 @@
                     <a:p>
                       <a:pPr algn="ctr"/>
                       <a:r>
-                        <a:rPr lang="en-US" sz="1200" dirty="0"/>
-                        <a:t>14.055</a:t>
+                        <a:rPr lang="en-US" sz="1200" dirty="0" smtClean="0"/>
+                        <a:t>15.718</a:t>
                       </a:r>
+                      <a:endParaRPr lang="en-US" sz="1200" dirty="0"/>
                     </a:p>
                   </a:txBody>
                   <a:tcPr anchor="ctr"/>
                 </a:tc>
                 <a:extLst>
                   <a:ext uri="{0D108BD9-81ED-4DB2-BD59-A6C34878D82A}">
-                    <a16:rowId xmlns:a16="http://schemas.microsoft.com/office/drawing/2014/main" val="10005"/>
+                    <a16:rowId xmlns:a16="http://schemas.microsoft.com/office/drawing/2014/main" xmlns="" val="10005"/>
                   </a:ext>
                 </a:extLst>
               </a:tr>
@@ -3332,16 +3334,17 @@
                     <a:p>
                       <a:pPr algn="ctr"/>
                       <a:r>
-                        <a:rPr lang="en-US" sz="1200" dirty="0"/>
-                        <a:t>3.726</a:t>
+                        <a:rPr lang="en-US" sz="1200" dirty="0" smtClean="0"/>
+                        <a:t>3.783</a:t>
                       </a:r>
+                      <a:endParaRPr lang="en-US" sz="1200" dirty="0"/>
                     </a:p>
                   </a:txBody>
                   <a:tcPr anchor="ctr"/>
                 </a:tc>
                 <a:extLst>
                   <a:ext uri="{0D108BD9-81ED-4DB2-BD59-A6C34878D82A}">
-                    <a16:rowId xmlns:a16="http://schemas.microsoft.com/office/drawing/2014/main" val="10006"/>
+                    <a16:rowId xmlns:a16="http://schemas.microsoft.com/office/drawing/2014/main" xmlns="" val="10006"/>
                   </a:ext>
                 </a:extLst>
               </a:tr>
@@ -3356,7 +3359,7 @@
               <p:cNvPr id="3" name="Table 2">
                 <a:extLst>
                   <a:ext uri="{FF2B5EF4-FFF2-40B4-BE49-F238E27FC236}">
-                    <a16:creationId xmlns:a16="http://schemas.microsoft.com/office/drawing/2014/main" id="{D0EB71A3-46E8-4D14-8C66-7AA2857B02D9}"/>
+                    <a16:creationId xmlns:a16="http://schemas.microsoft.com/office/drawing/2014/main" xmlns="" id="{D0EB71A3-46E8-4D14-8C66-7AA2857B02D9}"/>
                   </a:ext>
                 </a:extLst>
               </p:cNvPr>
@@ -3366,7 +3369,7 @@
               <p:nvPr>
                 <p:extLst>
                   <p:ext uri="{D42A27DB-BD31-4B8C-83A1-F6EECF244321}">
-                    <p14:modId xmlns:p14="http://schemas.microsoft.com/office/powerpoint/2010/main" val="2046063666"/>
+                    <p14:modId xmlns:p14="http://schemas.microsoft.com/office/powerpoint/2010/main" val="1597656987"/>
                   </p:ext>
                 </p:extLst>
               </p:nvPr>
@@ -3385,35 +3388,35 @@
                     <a:gridCol w="665566">
                       <a:extLst>
                         <a:ext uri="{9D8B030D-6E8A-4147-A177-3AD203B41FA5}">
-                          <a16:colId xmlns:a16="http://schemas.microsoft.com/office/drawing/2014/main" val="20000"/>
+                          <a16:colId xmlns:a16="http://schemas.microsoft.com/office/drawing/2014/main" xmlns="" val="20000"/>
                         </a:ext>
                       </a:extLst>
                     </a:gridCol>
                     <a:gridCol w="1018270">
                       <a:extLst>
                         <a:ext uri="{9D8B030D-6E8A-4147-A177-3AD203B41FA5}">
-                          <a16:colId xmlns:a16="http://schemas.microsoft.com/office/drawing/2014/main" val="20002"/>
+                          <a16:colId xmlns:a16="http://schemas.microsoft.com/office/drawing/2014/main" xmlns="" val="20002"/>
                         </a:ext>
                       </a:extLst>
                     </a:gridCol>
                     <a:gridCol w="1174700">
                       <a:extLst>
                         <a:ext uri="{9D8B030D-6E8A-4147-A177-3AD203B41FA5}">
-                          <a16:colId xmlns:a16="http://schemas.microsoft.com/office/drawing/2014/main" val="20003"/>
+                          <a16:colId xmlns:a16="http://schemas.microsoft.com/office/drawing/2014/main" xmlns="" val="20003"/>
                         </a:ext>
                       </a:extLst>
                     </a:gridCol>
                     <a:gridCol w="1106056">
                       <a:extLst>
                         <a:ext uri="{9D8B030D-6E8A-4147-A177-3AD203B41FA5}">
-                          <a16:colId xmlns:a16="http://schemas.microsoft.com/office/drawing/2014/main" val="20004"/>
+                          <a16:colId xmlns:a16="http://schemas.microsoft.com/office/drawing/2014/main" xmlns="" val="20004"/>
                         </a:ext>
                       </a:extLst>
                     </a:gridCol>
                     <a:gridCol w="989514">
                       <a:extLst>
                         <a:ext uri="{9D8B030D-6E8A-4147-A177-3AD203B41FA5}">
-                          <a16:colId xmlns:a16="http://schemas.microsoft.com/office/drawing/2014/main" val="20005"/>
+                          <a16:colId xmlns:a16="http://schemas.microsoft.com/office/drawing/2014/main" xmlns="" val="20005"/>
                         </a:ext>
                       </a:extLst>
                     </a:gridCol>
@@ -3508,7 +3511,7 @@
                     </a:tc>
                     <a:extLst>
                       <a:ext uri="{0D108BD9-81ED-4DB2-BD59-A6C34878D82A}">
-                        <a16:rowId xmlns:a16="http://schemas.microsoft.com/office/drawing/2014/main" val="10000"/>
+                        <a16:rowId xmlns:a16="http://schemas.microsoft.com/office/drawing/2014/main" xmlns="" val="10000"/>
                       </a:ext>
                     </a:extLst>
                   </a:tr>
@@ -3543,7 +3546,7 @@
                                 <m:sSubPr>
                                   <m:ctrlPr>
                                     <a:rPr lang="en-US" sz="1200" i="1" dirty="0" smtClean="0">
-                                      <a:latin typeface="Cambria Math" panose="02040503050406030204" pitchFamily="18" charset="0"/>
+                                      <a:latin typeface="Cambria Math"/>
                                     </a:rPr>
                                   </m:ctrlPr>
                                 </m:sSubPr>
@@ -3600,7 +3603,7 @@
                                   <m:sSubPr>
                                     <m:ctrlPr>
                                       <a:rPr lang="en-US" sz="1200" i="1" dirty="0" smtClean="0">
-                                        <a:latin typeface="Cambria Math" panose="02040503050406030204" pitchFamily="18" charset="0"/>
+                                        <a:latin typeface="Cambria Math"/>
                                       </a:rPr>
                                     </m:ctrlPr>
                                   </m:sSubPr>
@@ -3682,16 +3685,17 @@
                         <a:p>
                           <a:pPr algn="ctr"/>
                           <a:r>
-                            <a:rPr lang="en-US" sz="1200" dirty="0"/>
-                            <a:t>15.530</a:t>
-                          </a:r>
+                            <a:rPr lang="en-US" sz="1200" dirty="0" smtClean="0"/>
+                            <a:t>17.048</a:t>
+                          </a:r>
+                          <a:endParaRPr lang="en-US" sz="1200" dirty="0"/>
                         </a:p>
                       </a:txBody>
                       <a:tcPr anchor="ctr"/>
                     </a:tc>
                     <a:extLst>
                       <a:ext uri="{0D108BD9-81ED-4DB2-BD59-A6C34878D82A}">
-                        <a16:rowId xmlns:a16="http://schemas.microsoft.com/office/drawing/2014/main" val="10001"/>
+                        <a16:rowId xmlns:a16="http://schemas.microsoft.com/office/drawing/2014/main" xmlns="" val="10001"/>
                       </a:ext>
                     </a:extLst>
                   </a:tr>
@@ -3726,7 +3730,7 @@
                                 <m:sSubPr>
                                   <m:ctrlPr>
                                     <a:rPr lang="en-US" sz="1200" i="1" dirty="0" smtClean="0">
-                                      <a:latin typeface="Cambria Math" panose="02040503050406030204" pitchFamily="18" charset="0"/>
+                                      <a:latin typeface="Cambria Math"/>
                                     </a:rPr>
                                   </m:ctrlPr>
                                 </m:sSubPr>
@@ -3777,7 +3781,7 @@
                                 <m:sSubPr>
                                   <m:ctrlPr>
                                     <a:rPr lang="en-US" sz="1200" i="1" dirty="0" smtClean="0">
-                                      <a:latin typeface="Cambria Math" panose="02040503050406030204" pitchFamily="18" charset="0"/>
+                                      <a:latin typeface="Cambria Math"/>
                                     </a:rPr>
                                   </m:ctrlPr>
                                 </m:sSubPr>
@@ -3858,16 +3862,17 @@
                         <a:p>
                           <a:pPr algn="ctr"/>
                           <a:r>
-                            <a:rPr lang="en-US" sz="1200" dirty="0"/>
-                            <a:t>11.729</a:t>
-                          </a:r>
+                            <a:rPr lang="en-US" sz="1200" dirty="0" smtClean="0"/>
+                            <a:t>12.819</a:t>
+                          </a:r>
+                          <a:endParaRPr lang="en-US" sz="1200" dirty="0"/>
                         </a:p>
                       </a:txBody>
                       <a:tcPr anchor="ctr"/>
                     </a:tc>
                     <a:extLst>
                       <a:ext uri="{0D108BD9-81ED-4DB2-BD59-A6C34878D82A}">
-                        <a16:rowId xmlns:a16="http://schemas.microsoft.com/office/drawing/2014/main" val="10002"/>
+                        <a16:rowId xmlns:a16="http://schemas.microsoft.com/office/drawing/2014/main" xmlns="" val="10002"/>
                       </a:ext>
                     </a:extLst>
                   </a:tr>
@@ -3902,7 +3907,7 @@
                                 <m:sSubPr>
                                   <m:ctrlPr>
                                     <a:rPr lang="en-US" sz="1200" i="1" dirty="0" smtClean="0">
-                                      <a:latin typeface="Cambria Math" panose="02040503050406030204" pitchFamily="18" charset="0"/>
+                                      <a:latin typeface="Cambria Math"/>
                                     </a:rPr>
                                   </m:ctrlPr>
                                 </m:sSubPr>
@@ -3953,7 +3958,7 @@
                                 <m:sSubPr>
                                   <m:ctrlPr>
                                     <a:rPr lang="en-US" sz="1200" i="1" dirty="0" smtClean="0">
-                                      <a:latin typeface="Cambria Math" panose="02040503050406030204" pitchFamily="18" charset="0"/>
+                                      <a:latin typeface="Cambria Math"/>
                                     </a:rPr>
                                   </m:ctrlPr>
                                 </m:sSubPr>
@@ -4034,16 +4039,17 @@
                         <a:p>
                           <a:pPr algn="ctr"/>
                           <a:r>
-                            <a:rPr lang="en-US" sz="1200" dirty="0"/>
-                            <a:t>2.276</a:t>
-                          </a:r>
+                            <a:rPr lang="en-US" sz="1200" dirty="0" smtClean="0"/>
+                            <a:t>2.485</a:t>
+                          </a:r>
+                          <a:endParaRPr lang="en-US" sz="1200" dirty="0"/>
                         </a:p>
                       </a:txBody>
                       <a:tcPr anchor="ctr"/>
                     </a:tc>
                     <a:extLst>
                       <a:ext uri="{0D108BD9-81ED-4DB2-BD59-A6C34878D82A}">
-                        <a16:rowId xmlns:a16="http://schemas.microsoft.com/office/drawing/2014/main" val="10003"/>
+                        <a16:rowId xmlns:a16="http://schemas.microsoft.com/office/drawing/2014/main" xmlns="" val="10003"/>
                       </a:ext>
                     </a:extLst>
                   </a:tr>
@@ -4058,7 +4064,7 @@
               <p:cNvPr id="3" name="Table 2">
                 <a:extLst>
                   <a:ext uri="{FF2B5EF4-FFF2-40B4-BE49-F238E27FC236}">
-                    <a16:creationId xmlns:a16="http://schemas.microsoft.com/office/drawing/2014/main" id="{D0EB71A3-46E8-4D14-8C66-7AA2857B02D9}"/>
+                    <a16:creationId xmlns:a16="http://schemas.microsoft.com/office/drawing/2014/main" xmlns:a14="http://schemas.microsoft.com/office/drawing/2010/main" xmlns="" id="{D0EB71A3-46E8-4D14-8C66-7AA2857B02D9}"/>
                   </a:ext>
                 </a:extLst>
               </p:cNvPr>
@@ -4068,7 +4074,7 @@
               <p:nvPr>
                 <p:extLst>
                   <p:ext uri="{D42A27DB-BD31-4B8C-83A1-F6EECF244321}">
-                    <p14:modId xmlns:p14="http://schemas.microsoft.com/office/powerpoint/2010/main" val="2046063666"/>
+                    <p14:modId xmlns:p14="http://schemas.microsoft.com/office/powerpoint/2010/main" val="1597656987"/>
                   </p:ext>
                 </p:extLst>
               </p:nvPr>
@@ -4087,35 +4093,35 @@
                     <a:gridCol w="665566">
                       <a:extLst>
                         <a:ext uri="{9D8B030D-6E8A-4147-A177-3AD203B41FA5}">
-                          <a16:colId xmlns:a16="http://schemas.microsoft.com/office/drawing/2014/main" val="20000"/>
+                          <a16:colId xmlns:a16="http://schemas.microsoft.com/office/drawing/2014/main" xmlns:a14="http://schemas.microsoft.com/office/drawing/2010/main" xmlns="" val="20000"/>
                         </a:ext>
                       </a:extLst>
                     </a:gridCol>
                     <a:gridCol w="1018270">
                       <a:extLst>
                         <a:ext uri="{9D8B030D-6E8A-4147-A177-3AD203B41FA5}">
-                          <a16:colId xmlns:a16="http://schemas.microsoft.com/office/drawing/2014/main" val="20002"/>
+                          <a16:colId xmlns:a16="http://schemas.microsoft.com/office/drawing/2014/main" xmlns:a14="http://schemas.microsoft.com/office/drawing/2010/main" xmlns="" val="20002"/>
                         </a:ext>
                       </a:extLst>
                     </a:gridCol>
                     <a:gridCol w="1174700">
                       <a:extLst>
                         <a:ext uri="{9D8B030D-6E8A-4147-A177-3AD203B41FA5}">
-                          <a16:colId xmlns:a16="http://schemas.microsoft.com/office/drawing/2014/main" val="20003"/>
+                          <a16:colId xmlns:a16="http://schemas.microsoft.com/office/drawing/2014/main" xmlns:a14="http://schemas.microsoft.com/office/drawing/2010/main" xmlns="" val="20003"/>
                         </a:ext>
                       </a:extLst>
                     </a:gridCol>
                     <a:gridCol w="1106056">
                       <a:extLst>
                         <a:ext uri="{9D8B030D-6E8A-4147-A177-3AD203B41FA5}">
-                          <a16:colId xmlns:a16="http://schemas.microsoft.com/office/drawing/2014/main" val="20004"/>
+                          <a16:colId xmlns:a16="http://schemas.microsoft.com/office/drawing/2014/main" xmlns:a14="http://schemas.microsoft.com/office/drawing/2010/main" xmlns="" val="20004"/>
                         </a:ext>
                       </a:extLst>
                     </a:gridCol>
                     <a:gridCol w="989514">
                       <a:extLst>
                         <a:ext uri="{9D8B030D-6E8A-4147-A177-3AD203B41FA5}">
-                          <a16:colId xmlns:a16="http://schemas.microsoft.com/office/drawing/2014/main" val="20005"/>
+                          <a16:colId xmlns:a16="http://schemas.microsoft.com/office/drawing/2014/main" xmlns:a14="http://schemas.microsoft.com/office/drawing/2010/main" xmlns="" val="20005"/>
                         </a:ext>
                       </a:extLst>
                     </a:gridCol>
@@ -4210,7 +4216,7 @@
                     </a:tc>
                     <a:extLst>
                       <a:ext uri="{0D108BD9-81ED-4DB2-BD59-A6C34878D82A}">
-                        <a16:rowId xmlns:a16="http://schemas.microsoft.com/office/drawing/2014/main" val="10000"/>
+                        <a16:rowId xmlns:a16="http://schemas.microsoft.com/office/drawing/2014/main" xmlns:a14="http://schemas.microsoft.com/office/drawing/2010/main" xmlns="" val="10000"/>
                       </a:ext>
                     </a:extLst>
                   </a:tr>
@@ -4238,10 +4244,10 @@
                         </a:p>
                       </a:txBody>
                       <a:tcPr anchor="ctr">
-                        <a:blipFill>
+                        <a:blipFill rotWithShape="1">
                           <a:blip r:embed="rId2"/>
                           <a:stretch>
-                            <a:fillRect l="-65269" t="-101316" r="-323353" b="-200000"/>
+                            <a:fillRect l="-65269" t="-101333" r="-321557" b="-210667"/>
                           </a:stretch>
                         </a:blipFill>
                       </a:tcPr>
@@ -4281,16 +4287,17 @@
                         <a:p>
                           <a:pPr algn="ctr"/>
                           <a:r>
-                            <a:rPr lang="en-US" sz="1200" dirty="0"/>
-                            <a:t>15.530</a:t>
-                          </a:r>
+                            <a:rPr lang="en-US" sz="1200" dirty="0" smtClean="0"/>
+                            <a:t>17.048</a:t>
+                          </a:r>
+                          <a:endParaRPr lang="en-US" sz="1200" dirty="0"/>
                         </a:p>
                       </a:txBody>
                       <a:tcPr anchor="ctr"/>
                     </a:tc>
                     <a:extLst>
                       <a:ext uri="{0D108BD9-81ED-4DB2-BD59-A6C34878D82A}">
-                        <a16:rowId xmlns:a16="http://schemas.microsoft.com/office/drawing/2014/main" val="10001"/>
+                        <a16:rowId xmlns:a16="http://schemas.microsoft.com/office/drawing/2014/main" xmlns:a14="http://schemas.microsoft.com/office/drawing/2010/main" xmlns="" val="10001"/>
                       </a:ext>
                     </a:extLst>
                   </a:tr>
@@ -4318,10 +4325,10 @@
                         </a:p>
                       </a:txBody>
                       <a:tcPr anchor="ctr">
-                        <a:blipFill>
+                        <a:blipFill rotWithShape="1">
                           <a:blip r:embed="rId2"/>
                           <a:stretch>
-                            <a:fillRect l="-65269" t="-204000" r="-323353" b="-102667"/>
+                            <a:fillRect l="-65269" t="-201333" r="-321557" b="-110667"/>
                           </a:stretch>
                         </a:blipFill>
                       </a:tcPr>
@@ -4361,16 +4368,17 @@
                         <a:p>
                           <a:pPr algn="ctr"/>
                           <a:r>
-                            <a:rPr lang="en-US" sz="1200" dirty="0"/>
-                            <a:t>11.729</a:t>
-                          </a:r>
+                            <a:rPr lang="en-US" sz="1200" dirty="0" smtClean="0"/>
+                            <a:t>12.819</a:t>
+                          </a:r>
+                          <a:endParaRPr lang="en-US" sz="1200" dirty="0"/>
                         </a:p>
                       </a:txBody>
                       <a:tcPr anchor="ctr"/>
                     </a:tc>
                     <a:extLst>
                       <a:ext uri="{0D108BD9-81ED-4DB2-BD59-A6C34878D82A}">
-                        <a16:rowId xmlns:a16="http://schemas.microsoft.com/office/drawing/2014/main" val="10002"/>
+                        <a16:rowId xmlns:a16="http://schemas.microsoft.com/office/drawing/2014/main" xmlns:a14="http://schemas.microsoft.com/office/drawing/2010/main" xmlns="" val="10002"/>
                       </a:ext>
                     </a:extLst>
                   </a:tr>
@@ -4398,10 +4406,10 @@
                         </a:p>
                       </a:txBody>
                       <a:tcPr anchor="ctr">
-                        <a:blipFill>
+                        <a:blipFill rotWithShape="1">
                           <a:blip r:embed="rId2"/>
                           <a:stretch>
-                            <a:fillRect l="-65269" t="-304000" r="-323353" b="-2667"/>
+                            <a:fillRect l="-65269" t="-301333" r="-321557" b="-10667"/>
                           </a:stretch>
                         </a:blipFill>
                       </a:tcPr>
@@ -4441,16 +4449,17 @@
                         <a:p>
                           <a:pPr algn="ctr"/>
                           <a:r>
-                            <a:rPr lang="en-US" sz="1200" dirty="0"/>
-                            <a:t>2.276</a:t>
-                          </a:r>
+                            <a:rPr lang="en-US" sz="1200" dirty="0" smtClean="0"/>
+                            <a:t>2.485</a:t>
+                          </a:r>
+                          <a:endParaRPr lang="en-US" sz="1200" dirty="0"/>
                         </a:p>
                       </a:txBody>
                       <a:tcPr anchor="ctr"/>
                     </a:tc>
                     <a:extLst>
                       <a:ext uri="{0D108BD9-81ED-4DB2-BD59-A6C34878D82A}">
-                        <a16:rowId xmlns:a16="http://schemas.microsoft.com/office/drawing/2014/main" val="10003"/>
+                        <a16:rowId xmlns:a16="http://schemas.microsoft.com/office/drawing/2014/main" xmlns:a14="http://schemas.microsoft.com/office/drawing/2010/main" xmlns="" val="10003"/>
                       </a:ext>
                     </a:extLst>
                   </a:tr>
@@ -4465,7 +4474,7 @@
           <p:cNvPr id="2" name="TextBox 1">
             <a:extLst>
               <a:ext uri="{FF2B5EF4-FFF2-40B4-BE49-F238E27FC236}">
-                <a16:creationId xmlns:a16="http://schemas.microsoft.com/office/drawing/2014/main" id="{AA70D9EB-9FA9-459F-981E-5061D572C3E4}"/>
+                <a16:creationId xmlns:a16="http://schemas.microsoft.com/office/drawing/2014/main" xmlns="" id="{AA70D9EB-9FA9-459F-981E-5061D572C3E4}"/>
               </a:ext>
             </a:extLst>
           </p:cNvPr>
@@ -4474,7 +4483,7 @@
         </p:nvSpPr>
         <p:spPr>
           <a:xfrm>
-            <a:off x="6946711" y="655093"/>
+            <a:off x="5186150" y="0"/>
             <a:ext cx="2083455" cy="369332"/>
           </a:xfrm>
           <a:prstGeom prst="rect">
@@ -4495,6 +4504,1521 @@
           </a:p>
         </p:txBody>
       </p:sp>
+      <p:graphicFrame>
+        <p:nvGraphicFramePr>
+          <p:cNvPr id="5" name="Table 4"/>
+          <p:cNvGraphicFramePr>
+            <a:graphicFrameLocks noGrp="1"/>
+          </p:cNvGraphicFramePr>
+          <p:nvPr>
+            <p:extLst>
+              <p:ext uri="{D42A27DB-BD31-4B8C-83A1-F6EECF244321}">
+                <p14:modId xmlns:p14="http://schemas.microsoft.com/office/powerpoint/2010/main" val="1491023550"/>
+              </p:ext>
+            </p:extLst>
+          </p:nvPr>
+        </p:nvGraphicFramePr>
+        <p:xfrm>
+          <a:off x="6683974" y="572155"/>
+          <a:ext cx="4954106" cy="1828798"/>
+        </p:xfrm>
+        <a:graphic>
+          <a:graphicData uri="http://schemas.openxmlformats.org/drawingml/2006/table">
+            <a:tbl>
+              <a:tblPr firstRow="1" bandRow="1">
+                <a:tableStyleId>{8EC20E35-A176-4012-BC5E-935CFFF8708E}</a:tableStyleId>
+              </a:tblPr>
+              <a:tblGrid>
+                <a:gridCol w="692129">
+                  <a:extLst>
+                    <a:ext uri="{9D8B030D-6E8A-4147-A177-3AD203B41FA5}">
+                      <a16:colId xmlns:a16="http://schemas.microsoft.com/office/drawing/2014/main" xmlns="" val="20000"/>
+                    </a:ext>
+                  </a:extLst>
+                </a:gridCol>
+                <a:gridCol w="1030076">
+                  <a:extLst>
+                    <a:ext uri="{9D8B030D-6E8A-4147-A177-3AD203B41FA5}">
+                      <a16:colId xmlns:a16="http://schemas.microsoft.com/office/drawing/2014/main" xmlns="" val="20001"/>
+                    </a:ext>
+                  </a:extLst>
+                </a:gridCol>
+                <a:gridCol w="1175269">
+                  <a:extLst>
+                    <a:ext uri="{9D8B030D-6E8A-4147-A177-3AD203B41FA5}">
+                      <a16:colId xmlns:a16="http://schemas.microsoft.com/office/drawing/2014/main" xmlns="" val="20003"/>
+                    </a:ext>
+                  </a:extLst>
+                </a:gridCol>
+                <a:gridCol w="1028316">
+                  <a:extLst>
+                    <a:ext uri="{9D8B030D-6E8A-4147-A177-3AD203B41FA5}">
+                      <a16:colId xmlns:a16="http://schemas.microsoft.com/office/drawing/2014/main" xmlns="" val="20004"/>
+                    </a:ext>
+                  </a:extLst>
+                </a:gridCol>
+                <a:gridCol w="1028316">
+                  <a:extLst>
+                    <a:ext uri="{9D8B030D-6E8A-4147-A177-3AD203B41FA5}">
+                      <a16:colId xmlns:a16="http://schemas.microsoft.com/office/drawing/2014/main" xmlns="" val="20005"/>
+                    </a:ext>
+                  </a:extLst>
+                </a:gridCol>
+              </a:tblGrid>
+              <a:tr h="532660">
+                <a:tc>
+                  <a:txBody>
+                    <a:bodyPr/>
+                    <a:lstStyle/>
+                    <a:p>
+                      <a:pPr algn="ctr"/>
+                      <a:r>
+                        <a:rPr lang="en-US" sz="1200" dirty="0"/>
+                        <a:t>Case</a:t>
+                      </a:r>
+                    </a:p>
+                  </a:txBody>
+                  <a:tcPr anchor="ctr"/>
+                </a:tc>
+                <a:tc>
+                  <a:txBody>
+                    <a:bodyPr/>
+                    <a:lstStyle/>
+                    <a:p>
+                      <a:pPr algn="ctr"/>
+                      <a:r>
+                        <a:rPr lang="en-US" sz="1200" dirty="0"/>
+                        <a:t>Bank</a:t>
+                      </a:r>
+                      <a:r>
+                        <a:rPr lang="en-US" sz="1200" baseline="0" dirty="0"/>
+                        <a:t> Angle Limits</a:t>
+                      </a:r>
+                      <a:endParaRPr lang="en-US" sz="1200" dirty="0"/>
+                    </a:p>
+                  </a:txBody>
+                  <a:tcPr anchor="ctr"/>
+                </a:tc>
+                <a:tc>
+                  <a:txBody>
+                    <a:bodyPr/>
+                    <a:lstStyle/>
+                    <a:p>
+                      <a:pPr algn="ctr"/>
+                      <a:r>
+                        <a:rPr lang="en-US" sz="1200" dirty="0"/>
+                        <a:t>Mean Altitude (km)</a:t>
+                      </a:r>
+                    </a:p>
+                  </a:txBody>
+                  <a:tcPr anchor="ctr"/>
+                </a:tc>
+                <a:tc>
+                  <a:txBody>
+                    <a:bodyPr/>
+                    <a:lstStyle/>
+                    <a:p>
+                      <a:pPr algn="ctr"/>
+                      <a:r>
+                        <a:rPr lang="en-US" sz="1200" baseline="0" dirty="0" smtClean="0"/>
+                        <a:t>1% </a:t>
+                      </a:r>
+                      <a:r>
+                        <a:rPr lang="en-US" sz="1200" baseline="0" dirty="0"/>
+                        <a:t>Low Altitude (km)</a:t>
+                      </a:r>
+                      <a:endParaRPr lang="en-US" sz="1200" dirty="0"/>
+                    </a:p>
+                  </a:txBody>
+                  <a:tcPr anchor="ctr"/>
+                </a:tc>
+                <a:tc>
+                  <a:txBody>
+                    <a:bodyPr/>
+                    <a:lstStyle/>
+                    <a:p>
+                      <a:pPr algn="ctr"/>
+                      <a:r>
+                        <a:rPr lang="en-US" sz="1200" dirty="0" smtClean="0"/>
+                        <a:t>99% </a:t>
+                      </a:r>
+                      <a:r>
+                        <a:rPr lang="en-US" sz="1200" dirty="0"/>
+                        <a:t>Range Error (km)</a:t>
+                      </a:r>
+                    </a:p>
+                  </a:txBody>
+                  <a:tcPr anchor="ctr"/>
+                </a:tc>
+                <a:extLst>
+                  <a:ext uri="{0D108BD9-81ED-4DB2-BD59-A6C34878D82A}">
+                    <a16:rowId xmlns:a16="http://schemas.microsoft.com/office/drawing/2014/main" xmlns="" val="10000"/>
+                  </a:ext>
+                </a:extLst>
+              </a:tr>
+              <a:tr h="432046">
+                <a:tc>
+                  <a:txBody>
+                    <a:bodyPr/>
+                    <a:lstStyle/>
+                    <a:p>
+                      <a:pPr algn="ctr"/>
+                      <a:r>
+                        <a:rPr lang="en-US" sz="1200" dirty="0"/>
+                        <a:t>1</a:t>
+                      </a:r>
+                    </a:p>
+                  </a:txBody>
+                  <a:tcPr anchor="ctr"/>
+                </a:tc>
+                <a:tc>
+                  <a:txBody>
+                    <a:bodyPr/>
+                    <a:lstStyle/>
+                    <a:p>
+                      <a:pPr algn="ctr"/>
+                      <a:r>
+                        <a:rPr lang="en-US" sz="1200" dirty="0"/>
+                        <a:t>[0°,   90°]</a:t>
+                      </a:r>
+                    </a:p>
+                  </a:txBody>
+                  <a:tcPr anchor="ctr"/>
+                </a:tc>
+                <a:tc>
+                  <a:txBody>
+                    <a:bodyPr/>
+                    <a:lstStyle/>
+                    <a:p>
+                      <a:pPr algn="ctr"/>
+                      <a:r>
+                        <a:rPr lang="en-US" sz="1200" dirty="0" smtClean="0"/>
+                        <a:t>6.38</a:t>
+                      </a:r>
+                      <a:endParaRPr lang="en-US" sz="1200" dirty="0"/>
+                    </a:p>
+                  </a:txBody>
+                  <a:tcPr anchor="ctr"/>
+                </a:tc>
+                <a:tc>
+                  <a:txBody>
+                    <a:bodyPr/>
+                    <a:lstStyle/>
+                    <a:p>
+                      <a:pPr algn="ctr"/>
+                      <a:r>
+                        <a:rPr lang="en-US" sz="1200" dirty="0" smtClean="0"/>
+                        <a:t>2.63</a:t>
+                      </a:r>
+                      <a:endParaRPr lang="en-US" sz="1200" dirty="0"/>
+                    </a:p>
+                  </a:txBody>
+                  <a:tcPr anchor="ctr"/>
+                </a:tc>
+                <a:tc>
+                  <a:txBody>
+                    <a:bodyPr/>
+                    <a:lstStyle/>
+                    <a:p>
+                      <a:pPr algn="ctr"/>
+                      <a:r>
+                        <a:rPr lang="en-US" sz="1200" dirty="0" smtClean="0"/>
+                        <a:t>20.01</a:t>
+                      </a:r>
+                      <a:endParaRPr lang="en-US" sz="1200" dirty="0"/>
+                    </a:p>
+                  </a:txBody>
+                  <a:tcPr anchor="ctr"/>
+                </a:tc>
+                <a:extLst>
+                  <a:ext uri="{0D108BD9-81ED-4DB2-BD59-A6C34878D82A}">
+                    <a16:rowId xmlns:a16="http://schemas.microsoft.com/office/drawing/2014/main" xmlns="" val="10004"/>
+                  </a:ext>
+                </a:extLst>
+              </a:tr>
+              <a:tr h="432046">
+                <a:tc>
+                  <a:txBody>
+                    <a:bodyPr/>
+                    <a:lstStyle/>
+                    <a:p>
+                      <a:pPr algn="ctr"/>
+                      <a:r>
+                        <a:rPr lang="en-US" sz="1200" dirty="0"/>
+                        <a:t>2</a:t>
+                      </a:r>
+                    </a:p>
+                  </a:txBody>
+                  <a:tcPr anchor="ctr"/>
+                </a:tc>
+                <a:tc>
+                  <a:txBody>
+                    <a:bodyPr/>
+                    <a:lstStyle/>
+                    <a:p>
+                      <a:pPr algn="ctr"/>
+                      <a:r>
+                        <a:rPr lang="en-US" sz="1200" dirty="0"/>
+                        <a:t>[15°, 75°]</a:t>
+                      </a:r>
+                    </a:p>
+                  </a:txBody>
+                  <a:tcPr anchor="ctr"/>
+                </a:tc>
+                <a:tc>
+                  <a:txBody>
+                    <a:bodyPr/>
+                    <a:lstStyle/>
+                    <a:p>
+                      <a:pPr algn="ctr"/>
+                      <a:r>
+                        <a:rPr lang="en-US" sz="1200" dirty="0" smtClean="0"/>
+                        <a:t>6.20</a:t>
+                      </a:r>
+                      <a:endParaRPr lang="en-US" sz="1200" dirty="0"/>
+                    </a:p>
+                  </a:txBody>
+                  <a:tcPr anchor="ctr"/>
+                </a:tc>
+                <a:tc>
+                  <a:txBody>
+                    <a:bodyPr/>
+                    <a:lstStyle/>
+                    <a:p>
+                      <a:pPr algn="ctr"/>
+                      <a:r>
+                        <a:rPr lang="en-US" sz="1200" dirty="0" smtClean="0"/>
+                        <a:t>3.59</a:t>
+                      </a:r>
+                      <a:endParaRPr lang="en-US" sz="1200" dirty="0"/>
+                    </a:p>
+                  </a:txBody>
+                  <a:tcPr anchor="ctr"/>
+                </a:tc>
+                <a:tc>
+                  <a:txBody>
+                    <a:bodyPr/>
+                    <a:lstStyle/>
+                    <a:p>
+                      <a:pPr algn="ctr"/>
+                      <a:r>
+                        <a:rPr lang="en-US" sz="1200" dirty="0" smtClean="0"/>
+                        <a:t>16.29</a:t>
+                      </a:r>
+                      <a:endParaRPr lang="en-US" sz="1200" dirty="0"/>
+                    </a:p>
+                  </a:txBody>
+                  <a:tcPr anchor="ctr"/>
+                </a:tc>
+                <a:extLst>
+                  <a:ext uri="{0D108BD9-81ED-4DB2-BD59-A6C34878D82A}">
+                    <a16:rowId xmlns:a16="http://schemas.microsoft.com/office/drawing/2014/main" xmlns="" val="10005"/>
+                  </a:ext>
+                </a:extLst>
+              </a:tr>
+              <a:tr h="432046">
+                <a:tc>
+                  <a:txBody>
+                    <a:bodyPr/>
+                    <a:lstStyle/>
+                    <a:p>
+                      <a:pPr algn="ctr"/>
+                      <a:r>
+                        <a:rPr lang="en-US" sz="1200" dirty="0"/>
+                        <a:t>3</a:t>
+                      </a:r>
+                    </a:p>
+                  </a:txBody>
+                  <a:tcPr anchor="ctr"/>
+                </a:tc>
+                <a:tc>
+                  <a:txBody>
+                    <a:bodyPr/>
+                    <a:lstStyle/>
+                    <a:p>
+                      <a:pPr algn="ctr"/>
+                      <a:r>
+                        <a:rPr lang="en-US" sz="1200" dirty="0"/>
+                        <a:t>[30°, 60°]</a:t>
+                      </a:r>
+                    </a:p>
+                  </a:txBody>
+                  <a:tcPr anchor="ctr"/>
+                </a:tc>
+                <a:tc>
+                  <a:txBody>
+                    <a:bodyPr/>
+                    <a:lstStyle/>
+                    <a:p>
+                      <a:pPr algn="ctr"/>
+                      <a:r>
+                        <a:rPr lang="en-US" sz="1200" smtClean="0"/>
+                        <a:t>4.80</a:t>
+                      </a:r>
+                      <a:endParaRPr lang="en-US" sz="1200" dirty="0"/>
+                    </a:p>
+                  </a:txBody>
+                  <a:tcPr anchor="ctr"/>
+                </a:tc>
+                <a:tc>
+                  <a:txBody>
+                    <a:bodyPr/>
+                    <a:lstStyle/>
+                    <a:p>
+                      <a:pPr algn="ctr"/>
+                      <a:r>
+                        <a:rPr lang="en-US" sz="1200" dirty="0" smtClean="0"/>
+                        <a:t>2.79</a:t>
+                      </a:r>
+                      <a:endParaRPr lang="en-US" sz="1200" dirty="0"/>
+                    </a:p>
+                  </a:txBody>
+                  <a:tcPr anchor="ctr"/>
+                </a:tc>
+                <a:tc>
+                  <a:txBody>
+                    <a:bodyPr/>
+                    <a:lstStyle/>
+                    <a:p>
+                      <a:pPr algn="ctr"/>
+                      <a:r>
+                        <a:rPr lang="en-US" sz="1200" dirty="0" smtClean="0"/>
+                        <a:t>4.26</a:t>
+                      </a:r>
+                      <a:endParaRPr lang="en-US" sz="1200" dirty="0"/>
+                    </a:p>
+                  </a:txBody>
+                  <a:tcPr anchor="ctr"/>
+                </a:tc>
+                <a:extLst>
+                  <a:ext uri="{0D108BD9-81ED-4DB2-BD59-A6C34878D82A}">
+                    <a16:rowId xmlns:a16="http://schemas.microsoft.com/office/drawing/2014/main" xmlns="" val="10006"/>
+                  </a:ext>
+                </a:extLst>
+              </a:tr>
+            </a:tbl>
+          </a:graphicData>
+        </a:graphic>
+      </p:graphicFrame>
+      <mc:AlternateContent xmlns:mc="http://schemas.openxmlformats.org/markup-compatibility/2006">
+        <mc:Choice xmlns:a14="http://schemas.microsoft.com/office/drawing/2010/main" Requires="a14">
+          <p:graphicFrame>
+            <p:nvGraphicFramePr>
+              <p:cNvPr id="6" name="Table 5">
+                <a:extLst>
+                  <a:ext uri="{FF2B5EF4-FFF2-40B4-BE49-F238E27FC236}">
+                    <a16:creationId xmlns:a16="http://schemas.microsoft.com/office/drawing/2014/main" xmlns="" id="{D0EB71A3-46E8-4D14-8C66-7AA2857B02D9}"/>
+                  </a:ext>
+                </a:extLst>
+              </p:cNvPr>
+              <p:cNvGraphicFramePr>
+                <a:graphicFrameLocks noGrp="1"/>
+              </p:cNvGraphicFramePr>
+              <p:nvPr>
+                <p:extLst>
+                  <p:ext uri="{D42A27DB-BD31-4B8C-83A1-F6EECF244321}">
+                    <p14:modId xmlns:p14="http://schemas.microsoft.com/office/powerpoint/2010/main" val="4136382163"/>
+                  </p:ext>
+                </p:extLst>
+              </p:nvPr>
+            </p:nvGraphicFramePr>
+            <p:xfrm>
+              <a:off x="6692600" y="2866779"/>
+              <a:ext cx="4954106" cy="1828800"/>
+            </p:xfrm>
+            <a:graphic>
+              <a:graphicData uri="http://schemas.openxmlformats.org/drawingml/2006/table">
+                <a:tbl>
+                  <a:tblPr firstRow="1" bandRow="1">
+                    <a:tableStyleId>{8EC20E35-A176-4012-BC5E-935CFFF8708E}</a:tableStyleId>
+                  </a:tblPr>
+                  <a:tblGrid>
+                    <a:gridCol w="665566">
+                      <a:extLst>
+                        <a:ext uri="{9D8B030D-6E8A-4147-A177-3AD203B41FA5}">
+                          <a16:colId xmlns:a16="http://schemas.microsoft.com/office/drawing/2014/main" xmlns="" val="20000"/>
+                        </a:ext>
+                      </a:extLst>
+                    </a:gridCol>
+                    <a:gridCol w="1018270">
+                      <a:extLst>
+                        <a:ext uri="{9D8B030D-6E8A-4147-A177-3AD203B41FA5}">
+                          <a16:colId xmlns:a16="http://schemas.microsoft.com/office/drawing/2014/main" xmlns="" val="20002"/>
+                        </a:ext>
+                      </a:extLst>
+                    </a:gridCol>
+                    <a:gridCol w="1174700">
+                      <a:extLst>
+                        <a:ext uri="{9D8B030D-6E8A-4147-A177-3AD203B41FA5}">
+                          <a16:colId xmlns:a16="http://schemas.microsoft.com/office/drawing/2014/main" xmlns="" val="20003"/>
+                        </a:ext>
+                      </a:extLst>
+                    </a:gridCol>
+                    <a:gridCol w="1106056">
+                      <a:extLst>
+                        <a:ext uri="{9D8B030D-6E8A-4147-A177-3AD203B41FA5}">
+                          <a16:colId xmlns:a16="http://schemas.microsoft.com/office/drawing/2014/main" xmlns="" val="20004"/>
+                        </a:ext>
+                      </a:extLst>
+                    </a:gridCol>
+                    <a:gridCol w="989514">
+                      <a:extLst>
+                        <a:ext uri="{9D8B030D-6E8A-4147-A177-3AD203B41FA5}">
+                          <a16:colId xmlns:a16="http://schemas.microsoft.com/office/drawing/2014/main" xmlns="" val="20005"/>
+                        </a:ext>
+                      </a:extLst>
+                    </a:gridCol>
+                  </a:tblGrid>
+                  <a:tr h="362434">
+                    <a:tc>
+                      <a:txBody>
+                        <a:bodyPr/>
+                        <a:lstStyle/>
+                        <a:p>
+                          <a:pPr algn="ctr"/>
+                          <a:r>
+                            <a:rPr lang="en-US" sz="1200" dirty="0"/>
+                            <a:t>Case</a:t>
+                          </a:r>
+                        </a:p>
+                      </a:txBody>
+                      <a:tcPr anchor="ctr"/>
+                    </a:tc>
+                    <a:tc>
+                      <a:txBody>
+                        <a:bodyPr/>
+                        <a:lstStyle/>
+                        <a:p>
+                          <a:pPr algn="ctr"/>
+                          <a:r>
+                            <a:rPr lang="en-US" sz="1200" dirty="0"/>
+                            <a:t>Weights</a:t>
+                          </a:r>
+                        </a:p>
+                      </a:txBody>
+                      <a:tcPr anchor="ctr"/>
+                    </a:tc>
+                    <a:tc>
+                      <a:txBody>
+                        <a:bodyPr/>
+                        <a:lstStyle/>
+                        <a:p>
+                          <a:pPr algn="ctr"/>
+                          <a:r>
+                            <a:rPr lang="en-US" sz="1200" dirty="0"/>
+                            <a:t>Mean Altitude (km)</a:t>
+                          </a:r>
+                        </a:p>
+                      </a:txBody>
+                      <a:tcPr anchor="ctr"/>
+                    </a:tc>
+                    <a:tc>
+                      <a:txBody>
+                        <a:bodyPr/>
+                        <a:lstStyle/>
+                        <a:p>
+                          <a:pPr algn="ctr"/>
+                          <a:r>
+                            <a:rPr lang="en-US" sz="1200" dirty="0" smtClean="0"/>
+                            <a:t>1% </a:t>
+                          </a:r>
+                          <a:r>
+                            <a:rPr lang="en-US" sz="1200" baseline="0" dirty="0" smtClean="0"/>
+                            <a:t>Low </a:t>
+                          </a:r>
+                          <a:r>
+                            <a:rPr lang="en-US" sz="1200" baseline="0" dirty="0"/>
+                            <a:t>Altitude (km)</a:t>
+                          </a:r>
+                          <a:endParaRPr lang="en-US" sz="1200" dirty="0"/>
+                        </a:p>
+                      </a:txBody>
+                      <a:tcPr anchor="ctr"/>
+                    </a:tc>
+                    <a:tc>
+                      <a:txBody>
+                        <a:bodyPr/>
+                        <a:lstStyle/>
+                        <a:p>
+                          <a:pPr algn="ctr"/>
+                          <a:r>
+                            <a:rPr lang="en-US" sz="1200" dirty="0" smtClean="0"/>
+                            <a:t>99% </a:t>
+                          </a:r>
+                          <a:r>
+                            <a:rPr lang="en-US" sz="1200" dirty="0"/>
+                            <a:t>Range Error (km)</a:t>
+                          </a:r>
+                        </a:p>
+                      </a:txBody>
+                      <a:tcPr anchor="ctr"/>
+                    </a:tc>
+                    <a:extLst>
+                      <a:ext uri="{0D108BD9-81ED-4DB2-BD59-A6C34878D82A}">
+                        <a16:rowId xmlns:a16="http://schemas.microsoft.com/office/drawing/2014/main" xmlns="" val="10000"/>
+                      </a:ext>
+                    </a:extLst>
+                  </a:tr>
+                  <a:tr h="362434">
+                    <a:tc>
+                      <a:txBody>
+                        <a:bodyPr/>
+                        <a:lstStyle/>
+                        <a:p>
+                          <a:pPr algn="ctr"/>
+                          <a:r>
+                            <a:rPr lang="en-US" sz="1200" dirty="0"/>
+                            <a:t>4</a:t>
+                          </a:r>
+                        </a:p>
+                      </a:txBody>
+                      <a:tcPr anchor="ctr"/>
+                    </a:tc>
+                    <a:tc>
+                      <a:txBody>
+                        <a:bodyPr/>
+                        <a:lstStyle/>
+                        <a:p>
+                          <a:pPr algn="ctr"/>
+                          <a:r>
+                            <a:rPr lang="en-US" sz="1200" dirty="0"/>
+                            <a:t> </a:t>
+                          </a:r>
+                          <a14:m>
+                            <m:oMath xmlns:m="http://schemas.openxmlformats.org/officeDocument/2006/math">
+                              <m:sSub>
+                                <m:sSubPr>
+                                  <m:ctrlPr>
+                                    <a:rPr lang="en-US" sz="1200" i="1" dirty="0" smtClean="0">
+                                      <a:latin typeface="Cambria Math"/>
+                                    </a:rPr>
+                                  </m:ctrlPr>
+                                </m:sSubPr>
+                                <m:e>
+                                  <m:r>
+                                    <a:rPr lang="en-US" sz="1200" i="1" dirty="0" smtClean="0">
+                                      <a:latin typeface="Cambria Math" panose="02040503050406030204" pitchFamily="18" charset="0"/>
+                                    </a:rPr>
+                                    <m:t>𝑤</m:t>
+                                  </m:r>
+                                </m:e>
+                                <m:sub>
+                                  <m:r>
+                                    <a:rPr lang="en-US" sz="1200" i="1" dirty="0" smtClean="0">
+                                      <a:latin typeface="Cambria Math" panose="02040503050406030204" pitchFamily="18" charset="0"/>
+                                    </a:rPr>
+                                    <m:t>h</m:t>
+                                  </m:r>
+                                </m:sub>
+                              </m:sSub>
+                              <m:r>
+                                <a:rPr lang="en-US" sz="1200" i="1" dirty="0" smtClean="0">
+                                  <a:latin typeface="Cambria Math" panose="02040503050406030204" pitchFamily="18" charset="0"/>
+                                </a:rPr>
+                                <m:t>=</m:t>
+                              </m:r>
+                              <m:r>
+                                <a:rPr lang="en-US" sz="1200" b="0" i="1" dirty="0" smtClean="0">
+                                  <a:latin typeface="Cambria Math" panose="02040503050406030204" pitchFamily="18" charset="0"/>
+                                </a:rPr>
+                                <m:t>0</m:t>
+                              </m:r>
+                            </m:oMath>
+                          </a14:m>
+                          <a:endParaRPr lang="en-US" sz="1200" b="0" i="1" dirty="0">
+                            <a:latin typeface="Cambria Math" panose="02040503050406030204" pitchFamily="18" charset="0"/>
+                          </a:endParaRPr>
+                        </a:p>
+                        <a:p>
+                          <a:pPr algn="ctr"/>
+                          <a14:m>
+                            <m:oMathPara xmlns:m="http://schemas.openxmlformats.org/officeDocument/2006/math">
+                              <m:oMathParaPr>
+                                <m:jc m:val="centerGroup"/>
+                              </m:oMathParaPr>
+                              <m:oMath xmlns:m="http://schemas.openxmlformats.org/officeDocument/2006/math">
+                                <m:r>
+                                  <a:rPr lang="en-US" sz="1200" b="0" i="1" dirty="0" smtClean="0">
+                                    <a:latin typeface="Cambria Math" panose="02040503050406030204" pitchFamily="18" charset="0"/>
+                                  </a:rPr>
+                                  <m:t> </m:t>
+                                </m:r>
+                                <m:sSub>
+                                  <m:sSubPr>
+                                    <m:ctrlPr>
+                                      <a:rPr lang="en-US" sz="1200" i="1" dirty="0" smtClean="0">
+                                        <a:latin typeface="Cambria Math"/>
+                                      </a:rPr>
+                                    </m:ctrlPr>
+                                  </m:sSubPr>
+                                  <m:e>
+                                    <m:r>
+                                      <a:rPr lang="en-US" sz="1200" i="1" dirty="0" smtClean="0">
+                                        <a:latin typeface="Cambria Math" panose="02040503050406030204" pitchFamily="18" charset="0"/>
+                                      </a:rPr>
+                                      <m:t>𝑤</m:t>
+                                    </m:r>
+                                  </m:e>
+                                  <m:sub>
+                                    <m:r>
+                                      <a:rPr lang="en-US" sz="1200" b="0" i="1" dirty="0" smtClean="0">
+                                        <a:latin typeface="Cambria Math" panose="02040503050406030204" pitchFamily="18" charset="0"/>
+                                      </a:rPr>
+                                      <m:t>𝑠</m:t>
+                                    </m:r>
+                                  </m:sub>
+                                </m:sSub>
+                                <m:r>
+                                  <a:rPr lang="en-US" sz="1200" b="0" i="1" dirty="0" smtClean="0">
+                                    <a:latin typeface="Cambria Math" panose="02040503050406030204" pitchFamily="18" charset="0"/>
+                                  </a:rPr>
+                                  <m:t> </m:t>
+                                </m:r>
+                                <m:r>
+                                  <a:rPr lang="en-US" sz="1200" i="1" dirty="0" smtClean="0">
+                                    <a:latin typeface="Cambria Math" panose="02040503050406030204" pitchFamily="18" charset="0"/>
+                                  </a:rPr>
+                                  <m:t>=</m:t>
+                                </m:r>
+                                <m:r>
+                                  <a:rPr lang="en-US" sz="1200" b="0" i="1" dirty="0" smtClean="0">
+                                    <a:latin typeface="Cambria Math" panose="02040503050406030204" pitchFamily="18" charset="0"/>
+                                  </a:rPr>
+                                  <m:t>0</m:t>
+                                </m:r>
+                              </m:oMath>
+                            </m:oMathPara>
+                          </a14:m>
+                          <a:endParaRPr lang="en-US" sz="1200" dirty="0"/>
+                        </a:p>
+                      </a:txBody>
+                      <a:tcPr anchor="ctr"/>
+                    </a:tc>
+                    <a:tc>
+                      <a:txBody>
+                        <a:bodyPr/>
+                        <a:lstStyle/>
+                        <a:p>
+                          <a:pPr algn="ctr"/>
+                          <a:r>
+                            <a:rPr lang="en-US" sz="1200" dirty="0" smtClean="0"/>
+                            <a:t>6.32</a:t>
+                          </a:r>
+                          <a:endParaRPr lang="en-US" sz="1200" dirty="0"/>
+                        </a:p>
+                      </a:txBody>
+                      <a:tcPr anchor="ctr"/>
+                    </a:tc>
+                    <a:tc>
+                      <a:txBody>
+                        <a:bodyPr/>
+                        <a:lstStyle/>
+                        <a:p>
+                          <a:pPr algn="ctr"/>
+                          <a:r>
+                            <a:rPr lang="en-US" sz="1200" dirty="0" smtClean="0"/>
+                            <a:t>3.23</a:t>
+                          </a:r>
+                          <a:endParaRPr lang="en-US" sz="1200" dirty="0"/>
+                        </a:p>
+                      </a:txBody>
+                      <a:tcPr anchor="ctr"/>
+                    </a:tc>
+                    <a:tc>
+                      <a:txBody>
+                        <a:bodyPr/>
+                        <a:lstStyle/>
+                        <a:p>
+                          <a:pPr algn="ctr"/>
+                          <a:r>
+                            <a:rPr lang="en-US" sz="1200" dirty="0" smtClean="0"/>
+                            <a:t>15.50</a:t>
+                          </a:r>
+                          <a:endParaRPr lang="en-US" sz="1200" dirty="0"/>
+                        </a:p>
+                      </a:txBody>
+                      <a:tcPr anchor="ctr"/>
+                    </a:tc>
+                    <a:extLst>
+                      <a:ext uri="{0D108BD9-81ED-4DB2-BD59-A6C34878D82A}">
+                        <a16:rowId xmlns:a16="http://schemas.microsoft.com/office/drawing/2014/main" xmlns="" val="10001"/>
+                      </a:ext>
+                    </a:extLst>
+                  </a:tr>
+                  <a:tr h="362434">
+                    <a:tc>
+                      <a:txBody>
+                        <a:bodyPr/>
+                        <a:lstStyle/>
+                        <a:p>
+                          <a:pPr algn="ctr"/>
+                          <a:r>
+                            <a:rPr lang="en-US" sz="1200" dirty="0"/>
+                            <a:t>5</a:t>
+                          </a:r>
+                        </a:p>
+                      </a:txBody>
+                      <a:tcPr anchor="ctr"/>
+                    </a:tc>
+                    <a:tc>
+                      <a:txBody>
+                        <a:bodyPr/>
+                        <a:lstStyle/>
+                        <a:p>
+                          <a:pPr algn="ctr"/>
+                          <a:r>
+                            <a:rPr lang="en-US" sz="1200" dirty="0"/>
+                            <a:t> </a:t>
+                          </a:r>
+                          <a14:m>
+                            <m:oMath xmlns:m="http://schemas.openxmlformats.org/officeDocument/2006/math">
+                              <m:sSub>
+                                <m:sSubPr>
+                                  <m:ctrlPr>
+                                    <a:rPr lang="en-US" sz="1200" i="1" dirty="0" smtClean="0">
+                                      <a:latin typeface="Cambria Math"/>
+                                    </a:rPr>
+                                  </m:ctrlPr>
+                                </m:sSubPr>
+                                <m:e>
+                                  <m:r>
+                                    <a:rPr lang="en-US" sz="1200" i="1" dirty="0" smtClean="0">
+                                      <a:latin typeface="Cambria Math" panose="02040503050406030204" pitchFamily="18" charset="0"/>
+                                    </a:rPr>
+                                    <m:t>𝑤</m:t>
+                                  </m:r>
+                                </m:e>
+                                <m:sub>
+                                  <m:r>
+                                    <a:rPr lang="en-US" sz="1200" i="1" dirty="0" smtClean="0">
+                                      <a:latin typeface="Cambria Math" panose="02040503050406030204" pitchFamily="18" charset="0"/>
+                                    </a:rPr>
+                                    <m:t>h</m:t>
+                                  </m:r>
+                                </m:sub>
+                              </m:sSub>
+                              <m:r>
+                                <a:rPr lang="en-US" sz="1200" i="1" dirty="0" smtClean="0">
+                                  <a:latin typeface="Cambria Math" panose="02040503050406030204" pitchFamily="18" charset="0"/>
+                                </a:rPr>
+                                <m:t>=</m:t>
+                              </m:r>
+                              <m:r>
+                                <a:rPr lang="en-US" sz="1200" b="0" i="1" dirty="0" smtClean="0">
+                                  <a:latin typeface="Cambria Math" panose="02040503050406030204" pitchFamily="18" charset="0"/>
+                                </a:rPr>
+                                <m:t>3</m:t>
+                              </m:r>
+                            </m:oMath>
+                          </a14:m>
+                          <a:r>
+                            <a:rPr lang="en-US" sz="1200" dirty="0"/>
+                            <a:t> </a:t>
+                          </a:r>
+                          <a14:m>
+                            <m:oMath xmlns:m="http://schemas.openxmlformats.org/officeDocument/2006/math">
+                              <m:r>
+                                <a:rPr lang="en-US" sz="1200" b="0" i="0" dirty="0" smtClean="0">
+                                  <a:latin typeface="Cambria Math" panose="02040503050406030204" pitchFamily="18" charset="0"/>
+                                </a:rPr>
+                                <m:t> </m:t>
+                              </m:r>
+                              <m:sSub>
+                                <m:sSubPr>
+                                  <m:ctrlPr>
+                                    <a:rPr lang="en-US" sz="1200" i="1" dirty="0" smtClean="0">
+                                      <a:latin typeface="Cambria Math"/>
+                                    </a:rPr>
+                                  </m:ctrlPr>
+                                </m:sSubPr>
+                                <m:e>
+                                  <m:r>
+                                    <a:rPr lang="en-US" sz="1200" i="1" dirty="0" smtClean="0">
+                                      <a:latin typeface="Cambria Math" panose="02040503050406030204" pitchFamily="18" charset="0"/>
+                                    </a:rPr>
+                                    <m:t>𝑤</m:t>
+                                  </m:r>
+                                </m:e>
+                                <m:sub>
+                                  <m:r>
+                                    <a:rPr lang="en-US" sz="1200" b="0" i="1" dirty="0" smtClean="0">
+                                      <a:latin typeface="Cambria Math" panose="02040503050406030204" pitchFamily="18" charset="0"/>
+                                    </a:rPr>
+                                    <m:t>𝑠</m:t>
+                                  </m:r>
+                                </m:sub>
+                              </m:sSub>
+                              <m:r>
+                                <a:rPr lang="en-US" sz="1200" b="0" i="1" dirty="0" smtClean="0">
+                                  <a:latin typeface="Cambria Math" panose="02040503050406030204" pitchFamily="18" charset="0"/>
+                                </a:rPr>
+                                <m:t> </m:t>
+                              </m:r>
+                              <m:r>
+                                <a:rPr lang="en-US" sz="1200" i="1" dirty="0" smtClean="0">
+                                  <a:latin typeface="Cambria Math" panose="02040503050406030204" pitchFamily="18" charset="0"/>
+                                </a:rPr>
+                                <m:t>=</m:t>
+                              </m:r>
+                              <m:r>
+                                <a:rPr lang="en-US" sz="1200" b="0" i="1" dirty="0" smtClean="0">
+                                  <a:latin typeface="Cambria Math" panose="02040503050406030204" pitchFamily="18" charset="0"/>
+                                </a:rPr>
+                                <m:t>0</m:t>
+                              </m:r>
+                            </m:oMath>
+                          </a14:m>
+                          <a:endParaRPr lang="en-US" sz="1200" dirty="0"/>
+                        </a:p>
+                      </a:txBody>
+                      <a:tcPr anchor="ctr"/>
+                    </a:tc>
+                    <a:tc>
+                      <a:txBody>
+                        <a:bodyPr/>
+                        <a:lstStyle/>
+                        <a:p>
+                          <a:pPr algn="ctr"/>
+                          <a:r>
+                            <a:rPr lang="en-US" sz="1200" dirty="0"/>
+                            <a:t>6.064</a:t>
+                          </a:r>
+                        </a:p>
+                      </a:txBody>
+                      <a:tcPr anchor="ctr"/>
+                    </a:tc>
+                    <a:tc>
+                      <a:txBody>
+                        <a:bodyPr/>
+                        <a:lstStyle/>
+                        <a:p>
+                          <a:pPr algn="ctr"/>
+                          <a:r>
+                            <a:rPr lang="en-US" sz="1200" dirty="0" smtClean="0"/>
+                            <a:t>4.09</a:t>
+                          </a:r>
+                          <a:endParaRPr lang="en-US" sz="1200" dirty="0"/>
+                        </a:p>
+                      </a:txBody>
+                      <a:tcPr anchor="ctr"/>
+                    </a:tc>
+                    <a:tc>
+                      <a:txBody>
+                        <a:bodyPr/>
+                        <a:lstStyle/>
+                        <a:p>
+                          <a:pPr algn="ctr"/>
+                          <a:r>
+                            <a:rPr lang="en-US" sz="1200" dirty="0" smtClean="0"/>
+                            <a:t>13.98</a:t>
+                          </a:r>
+                          <a:endParaRPr lang="en-US" sz="1200" dirty="0"/>
+                        </a:p>
+                      </a:txBody>
+                      <a:tcPr anchor="ctr"/>
+                    </a:tc>
+                    <a:extLst>
+                      <a:ext uri="{0D108BD9-81ED-4DB2-BD59-A6C34878D82A}">
+                        <a16:rowId xmlns:a16="http://schemas.microsoft.com/office/drawing/2014/main" xmlns="" val="10002"/>
+                      </a:ext>
+                    </a:extLst>
+                  </a:tr>
+                  <a:tr h="432637">
+                    <a:tc>
+                      <a:txBody>
+                        <a:bodyPr/>
+                        <a:lstStyle/>
+                        <a:p>
+                          <a:pPr algn="ctr"/>
+                          <a:r>
+                            <a:rPr lang="en-US" sz="1200" dirty="0"/>
+                            <a:t>6</a:t>
+                          </a:r>
+                        </a:p>
+                      </a:txBody>
+                      <a:tcPr anchor="ctr"/>
+                    </a:tc>
+                    <a:tc>
+                      <a:txBody>
+                        <a:bodyPr/>
+                        <a:lstStyle/>
+                        <a:p>
+                          <a:pPr algn="ctr"/>
+                          <a:r>
+                            <a:rPr lang="en-US" sz="1200" dirty="0"/>
+                            <a:t> </a:t>
+                          </a:r>
+                          <a14:m>
+                            <m:oMath xmlns:m="http://schemas.openxmlformats.org/officeDocument/2006/math">
+                              <m:sSub>
+                                <m:sSubPr>
+                                  <m:ctrlPr>
+                                    <a:rPr lang="en-US" sz="1200" i="1" dirty="0" smtClean="0">
+                                      <a:latin typeface="Cambria Math"/>
+                                    </a:rPr>
+                                  </m:ctrlPr>
+                                </m:sSubPr>
+                                <m:e>
+                                  <m:r>
+                                    <a:rPr lang="en-US" sz="1200" i="1" dirty="0" smtClean="0">
+                                      <a:latin typeface="Cambria Math" panose="02040503050406030204" pitchFamily="18" charset="0"/>
+                                    </a:rPr>
+                                    <m:t>𝑤</m:t>
+                                  </m:r>
+                                </m:e>
+                                <m:sub>
+                                  <m:r>
+                                    <a:rPr lang="en-US" sz="1200" i="1" dirty="0" smtClean="0">
+                                      <a:latin typeface="Cambria Math" panose="02040503050406030204" pitchFamily="18" charset="0"/>
+                                    </a:rPr>
+                                    <m:t>h</m:t>
+                                  </m:r>
+                                </m:sub>
+                              </m:sSub>
+                              <m:r>
+                                <a:rPr lang="en-US" sz="1200" i="1" dirty="0" smtClean="0">
+                                  <a:latin typeface="Cambria Math" panose="02040503050406030204" pitchFamily="18" charset="0"/>
+                                </a:rPr>
+                                <m:t>=</m:t>
+                              </m:r>
+                              <m:r>
+                                <a:rPr lang="en-US" sz="1200" b="0" i="1" dirty="0" smtClean="0">
+                                  <a:latin typeface="Cambria Math" panose="02040503050406030204" pitchFamily="18" charset="0"/>
+                                </a:rPr>
+                                <m:t>0</m:t>
+                              </m:r>
+                            </m:oMath>
+                          </a14:m>
+                          <a:r>
+                            <a:rPr lang="en-US" sz="1200" dirty="0"/>
+                            <a:t> </a:t>
+                          </a:r>
+                          <a14:m>
+                            <m:oMath xmlns:m="http://schemas.openxmlformats.org/officeDocument/2006/math">
+                              <m:r>
+                                <a:rPr lang="en-US" sz="1200" b="0" i="0" dirty="0" smtClean="0">
+                                  <a:latin typeface="Cambria Math" panose="02040503050406030204" pitchFamily="18" charset="0"/>
+                                </a:rPr>
+                                <m:t> </m:t>
+                              </m:r>
+                              <m:sSub>
+                                <m:sSubPr>
+                                  <m:ctrlPr>
+                                    <a:rPr lang="en-US" sz="1200" i="1" dirty="0" smtClean="0">
+                                      <a:latin typeface="Cambria Math"/>
+                                    </a:rPr>
+                                  </m:ctrlPr>
+                                </m:sSubPr>
+                                <m:e>
+                                  <m:r>
+                                    <a:rPr lang="en-US" sz="1200" i="1" dirty="0" smtClean="0">
+                                      <a:latin typeface="Cambria Math" panose="02040503050406030204" pitchFamily="18" charset="0"/>
+                                    </a:rPr>
+                                    <m:t>𝑤</m:t>
+                                  </m:r>
+                                </m:e>
+                                <m:sub>
+                                  <m:r>
+                                    <a:rPr lang="en-US" sz="1200" b="0" i="1" dirty="0" smtClean="0">
+                                      <a:latin typeface="Cambria Math" panose="02040503050406030204" pitchFamily="18" charset="0"/>
+                                    </a:rPr>
+                                    <m:t>𝑠</m:t>
+                                  </m:r>
+                                </m:sub>
+                              </m:sSub>
+                              <m:r>
+                                <a:rPr lang="en-US" sz="1200" b="0" i="1" dirty="0" smtClean="0">
+                                  <a:latin typeface="Cambria Math" panose="02040503050406030204" pitchFamily="18" charset="0"/>
+                                </a:rPr>
+                                <m:t> </m:t>
+                              </m:r>
+                              <m:r>
+                                <a:rPr lang="en-US" sz="1200" i="1" dirty="0" smtClean="0">
+                                  <a:latin typeface="Cambria Math" panose="02040503050406030204" pitchFamily="18" charset="0"/>
+                                </a:rPr>
+                                <m:t>=</m:t>
+                              </m:r>
+                              <m:r>
+                                <a:rPr lang="en-US" sz="1200" b="0" i="1" dirty="0" smtClean="0">
+                                  <a:latin typeface="Cambria Math" panose="02040503050406030204" pitchFamily="18" charset="0"/>
+                                </a:rPr>
+                                <m:t>3</m:t>
+                              </m:r>
+                            </m:oMath>
+                          </a14:m>
+                          <a:endParaRPr lang="en-US" sz="1200" dirty="0"/>
+                        </a:p>
+                      </a:txBody>
+                      <a:tcPr anchor="ctr"/>
+                    </a:tc>
+                    <a:tc>
+                      <a:txBody>
+                        <a:bodyPr/>
+                        <a:lstStyle/>
+                        <a:p>
+                          <a:pPr algn="ctr"/>
+                          <a:r>
+                            <a:rPr lang="en-US" sz="1200" dirty="0" smtClean="0"/>
+                            <a:t>4.84</a:t>
+                          </a:r>
+                          <a:endParaRPr lang="en-US" sz="1200" dirty="0"/>
+                        </a:p>
+                      </a:txBody>
+                      <a:tcPr anchor="ctr"/>
+                    </a:tc>
+                    <a:tc>
+                      <a:txBody>
+                        <a:bodyPr/>
+                        <a:lstStyle/>
+                        <a:p>
+                          <a:pPr algn="ctr"/>
+                          <a:r>
+                            <a:rPr lang="en-US" sz="1200" dirty="0" smtClean="0"/>
+                            <a:t>3.01</a:t>
+                          </a:r>
+                          <a:endParaRPr lang="en-US" sz="1200" dirty="0"/>
+                        </a:p>
+                      </a:txBody>
+                      <a:tcPr anchor="ctr"/>
+                    </a:tc>
+                    <a:tc>
+                      <a:txBody>
+                        <a:bodyPr/>
+                        <a:lstStyle/>
+                        <a:p>
+                          <a:pPr algn="ctr"/>
+                          <a:r>
+                            <a:rPr lang="en-US" sz="1200" dirty="0" smtClean="0"/>
+                            <a:t>2.73</a:t>
+                          </a:r>
+                          <a:endParaRPr lang="en-US" sz="1200" dirty="0"/>
+                        </a:p>
+                      </a:txBody>
+                      <a:tcPr anchor="ctr"/>
+                    </a:tc>
+                    <a:extLst>
+                      <a:ext uri="{0D108BD9-81ED-4DB2-BD59-A6C34878D82A}">
+                        <a16:rowId xmlns:a16="http://schemas.microsoft.com/office/drawing/2014/main" xmlns="" val="10003"/>
+                      </a:ext>
+                    </a:extLst>
+                  </a:tr>
+                </a:tbl>
+              </a:graphicData>
+            </a:graphic>
+          </p:graphicFrame>
+        </mc:Choice>
+        <mc:Fallback>
+          <p:graphicFrame>
+            <p:nvGraphicFramePr>
+              <p:cNvPr id="6" name="Table 5">
+                <a:extLst>
+                  <a:ext uri="{FF2B5EF4-FFF2-40B4-BE49-F238E27FC236}">
+                    <a16:creationId xmlns:a16="http://schemas.microsoft.com/office/drawing/2014/main" xmlns:a14="http://schemas.microsoft.com/office/drawing/2010/main" xmlns="" id="{D0EB71A3-46E8-4D14-8C66-7AA2857B02D9}"/>
+                  </a:ext>
+                </a:extLst>
+              </p:cNvPr>
+              <p:cNvGraphicFramePr>
+                <a:graphicFrameLocks noGrp="1"/>
+              </p:cNvGraphicFramePr>
+              <p:nvPr>
+                <p:extLst>
+                  <p:ext uri="{D42A27DB-BD31-4B8C-83A1-F6EECF244321}">
+                    <p14:modId xmlns:p14="http://schemas.microsoft.com/office/powerpoint/2010/main" val="4136382163"/>
+                  </p:ext>
+                </p:extLst>
+              </p:nvPr>
+            </p:nvGraphicFramePr>
+            <p:xfrm>
+              <a:off x="6692600" y="2866779"/>
+              <a:ext cx="4954106" cy="1828800"/>
+            </p:xfrm>
+            <a:graphic>
+              <a:graphicData uri="http://schemas.openxmlformats.org/drawingml/2006/table">
+                <a:tbl>
+                  <a:tblPr firstRow="1" bandRow="1">
+                    <a:tableStyleId>{8EC20E35-A176-4012-BC5E-935CFFF8708E}</a:tableStyleId>
+                  </a:tblPr>
+                  <a:tblGrid>
+                    <a:gridCol w="665566">
+                      <a:extLst>
+                        <a:ext uri="{9D8B030D-6E8A-4147-A177-3AD203B41FA5}">
+                          <a16:colId xmlns:a16="http://schemas.microsoft.com/office/drawing/2014/main" xmlns:a14="http://schemas.microsoft.com/office/drawing/2010/main" xmlns="" val="20000"/>
+                        </a:ext>
+                      </a:extLst>
+                    </a:gridCol>
+                    <a:gridCol w="1018270">
+                      <a:extLst>
+                        <a:ext uri="{9D8B030D-6E8A-4147-A177-3AD203B41FA5}">
+                          <a16:colId xmlns:a16="http://schemas.microsoft.com/office/drawing/2014/main" xmlns:a14="http://schemas.microsoft.com/office/drawing/2010/main" xmlns="" val="20002"/>
+                        </a:ext>
+                      </a:extLst>
+                    </a:gridCol>
+                    <a:gridCol w="1174700">
+                      <a:extLst>
+                        <a:ext uri="{9D8B030D-6E8A-4147-A177-3AD203B41FA5}">
+                          <a16:colId xmlns:a16="http://schemas.microsoft.com/office/drawing/2014/main" xmlns:a14="http://schemas.microsoft.com/office/drawing/2010/main" xmlns="" val="20003"/>
+                        </a:ext>
+                      </a:extLst>
+                    </a:gridCol>
+                    <a:gridCol w="1106056">
+                      <a:extLst>
+                        <a:ext uri="{9D8B030D-6E8A-4147-A177-3AD203B41FA5}">
+                          <a16:colId xmlns:a16="http://schemas.microsoft.com/office/drawing/2014/main" xmlns:a14="http://schemas.microsoft.com/office/drawing/2010/main" xmlns="" val="20004"/>
+                        </a:ext>
+                      </a:extLst>
+                    </a:gridCol>
+                    <a:gridCol w="989514">
+                      <a:extLst>
+                        <a:ext uri="{9D8B030D-6E8A-4147-A177-3AD203B41FA5}">
+                          <a16:colId xmlns:a16="http://schemas.microsoft.com/office/drawing/2014/main" xmlns:a14="http://schemas.microsoft.com/office/drawing/2010/main" xmlns="" val="20005"/>
+                        </a:ext>
+                      </a:extLst>
+                    </a:gridCol>
+                  </a:tblGrid>
+                  <a:tr h="457200">
+                    <a:tc>
+                      <a:txBody>
+                        <a:bodyPr/>
+                        <a:lstStyle/>
+                        <a:p>
+                          <a:pPr algn="ctr"/>
+                          <a:r>
+                            <a:rPr lang="en-US" sz="1200" dirty="0"/>
+                            <a:t>Case</a:t>
+                          </a:r>
+                        </a:p>
+                      </a:txBody>
+                      <a:tcPr anchor="ctr"/>
+                    </a:tc>
+                    <a:tc>
+                      <a:txBody>
+                        <a:bodyPr/>
+                        <a:lstStyle/>
+                        <a:p>
+                          <a:pPr algn="ctr"/>
+                          <a:r>
+                            <a:rPr lang="en-US" sz="1200" dirty="0"/>
+                            <a:t>Weights</a:t>
+                          </a:r>
+                        </a:p>
+                      </a:txBody>
+                      <a:tcPr anchor="ctr"/>
+                    </a:tc>
+                    <a:tc>
+                      <a:txBody>
+                        <a:bodyPr/>
+                        <a:lstStyle/>
+                        <a:p>
+                          <a:pPr algn="ctr"/>
+                          <a:r>
+                            <a:rPr lang="en-US" sz="1200" dirty="0"/>
+                            <a:t>Mean Altitude (km)</a:t>
+                          </a:r>
+                        </a:p>
+                      </a:txBody>
+                      <a:tcPr anchor="ctr"/>
+                    </a:tc>
+                    <a:tc>
+                      <a:txBody>
+                        <a:bodyPr/>
+                        <a:lstStyle/>
+                        <a:p>
+                          <a:pPr algn="ctr"/>
+                          <a:r>
+                            <a:rPr lang="en-US" sz="1200" dirty="0" smtClean="0"/>
+                            <a:t>1% </a:t>
+                          </a:r>
+                          <a:r>
+                            <a:rPr lang="en-US" sz="1200" baseline="0" dirty="0" smtClean="0"/>
+                            <a:t>Low </a:t>
+                          </a:r>
+                          <a:r>
+                            <a:rPr lang="en-US" sz="1200" baseline="0" dirty="0"/>
+                            <a:t>Altitude (km)</a:t>
+                          </a:r>
+                          <a:endParaRPr lang="en-US" sz="1200" dirty="0"/>
+                        </a:p>
+                      </a:txBody>
+                      <a:tcPr anchor="ctr"/>
+                    </a:tc>
+                    <a:tc>
+                      <a:txBody>
+                        <a:bodyPr/>
+                        <a:lstStyle/>
+                        <a:p>
+                          <a:pPr algn="ctr"/>
+                          <a:r>
+                            <a:rPr lang="en-US" sz="1200" dirty="0" smtClean="0"/>
+                            <a:t>99% </a:t>
+                          </a:r>
+                          <a:r>
+                            <a:rPr lang="en-US" sz="1200" dirty="0"/>
+                            <a:t>Range Error (km)</a:t>
+                          </a:r>
+                        </a:p>
+                      </a:txBody>
+                      <a:tcPr anchor="ctr"/>
+                    </a:tc>
+                    <a:extLst>
+                      <a:ext uri="{0D108BD9-81ED-4DB2-BD59-A6C34878D82A}">
+                        <a16:rowId xmlns:a16="http://schemas.microsoft.com/office/drawing/2014/main" xmlns:a14="http://schemas.microsoft.com/office/drawing/2010/main" xmlns="" val="10000"/>
+                      </a:ext>
+                    </a:extLst>
+                  </a:tr>
+                  <a:tr h="457200">
+                    <a:tc>
+                      <a:txBody>
+                        <a:bodyPr/>
+                        <a:lstStyle/>
+                        <a:p>
+                          <a:pPr algn="ctr"/>
+                          <a:r>
+                            <a:rPr lang="en-US" sz="1200" dirty="0"/>
+                            <a:t>4</a:t>
+                          </a:r>
+                        </a:p>
+                      </a:txBody>
+                      <a:tcPr anchor="ctr"/>
+                    </a:tc>
+                    <a:tc>
+                      <a:txBody>
+                        <a:bodyPr/>
+                        <a:lstStyle/>
+                        <a:p>
+                          <a:endParaRPr lang="en-US"/>
+                        </a:p>
+                      </a:txBody>
+                      <a:tcPr anchor="ctr">
+                        <a:blipFill rotWithShape="1">
+                          <a:blip r:embed="rId3"/>
+                          <a:stretch>
+                            <a:fillRect l="-65868" t="-100000" r="-321557" b="-210667"/>
+                          </a:stretch>
+                        </a:blipFill>
+                      </a:tcPr>
+                    </a:tc>
+                    <a:tc>
+                      <a:txBody>
+                        <a:bodyPr/>
+                        <a:lstStyle/>
+                        <a:p>
+                          <a:pPr algn="ctr"/>
+                          <a:r>
+                            <a:rPr lang="en-US" sz="1200" dirty="0" smtClean="0"/>
+                            <a:t>6.32</a:t>
+                          </a:r>
+                          <a:endParaRPr lang="en-US" sz="1200" dirty="0"/>
+                        </a:p>
+                      </a:txBody>
+                      <a:tcPr anchor="ctr"/>
+                    </a:tc>
+                    <a:tc>
+                      <a:txBody>
+                        <a:bodyPr/>
+                        <a:lstStyle/>
+                        <a:p>
+                          <a:pPr algn="ctr"/>
+                          <a:r>
+                            <a:rPr lang="en-US" sz="1200" dirty="0" smtClean="0"/>
+                            <a:t>3.23</a:t>
+                          </a:r>
+                          <a:endParaRPr lang="en-US" sz="1200" dirty="0"/>
+                        </a:p>
+                      </a:txBody>
+                      <a:tcPr anchor="ctr"/>
+                    </a:tc>
+                    <a:tc>
+                      <a:txBody>
+                        <a:bodyPr/>
+                        <a:lstStyle/>
+                        <a:p>
+                          <a:pPr algn="ctr"/>
+                          <a:r>
+                            <a:rPr lang="en-US" sz="1200" dirty="0" smtClean="0"/>
+                            <a:t>15.50</a:t>
+                          </a:r>
+                          <a:endParaRPr lang="en-US" sz="1200" dirty="0"/>
+                        </a:p>
+                      </a:txBody>
+                      <a:tcPr anchor="ctr"/>
+                    </a:tc>
+                    <a:extLst>
+                      <a:ext uri="{0D108BD9-81ED-4DB2-BD59-A6C34878D82A}">
+                        <a16:rowId xmlns:a16="http://schemas.microsoft.com/office/drawing/2014/main" xmlns:a14="http://schemas.microsoft.com/office/drawing/2010/main" xmlns="" val="10001"/>
+                      </a:ext>
+                    </a:extLst>
+                  </a:tr>
+                  <a:tr h="457200">
+                    <a:tc>
+                      <a:txBody>
+                        <a:bodyPr/>
+                        <a:lstStyle/>
+                        <a:p>
+                          <a:pPr algn="ctr"/>
+                          <a:r>
+                            <a:rPr lang="en-US" sz="1200" dirty="0"/>
+                            <a:t>5</a:t>
+                          </a:r>
+                        </a:p>
+                      </a:txBody>
+                      <a:tcPr anchor="ctr"/>
+                    </a:tc>
+                    <a:tc>
+                      <a:txBody>
+                        <a:bodyPr/>
+                        <a:lstStyle/>
+                        <a:p>
+                          <a:endParaRPr lang="en-US"/>
+                        </a:p>
+                      </a:txBody>
+                      <a:tcPr anchor="ctr">
+                        <a:blipFill rotWithShape="1">
+                          <a:blip r:embed="rId3"/>
+                          <a:stretch>
+                            <a:fillRect l="-65868" t="-200000" r="-321557" b="-110667"/>
+                          </a:stretch>
+                        </a:blipFill>
+                      </a:tcPr>
+                    </a:tc>
+                    <a:tc>
+                      <a:txBody>
+                        <a:bodyPr/>
+                        <a:lstStyle/>
+                        <a:p>
+                          <a:pPr algn="ctr"/>
+                          <a:r>
+                            <a:rPr lang="en-US" sz="1200" dirty="0"/>
+                            <a:t>6.064</a:t>
+                          </a:r>
+                        </a:p>
+                      </a:txBody>
+                      <a:tcPr anchor="ctr"/>
+                    </a:tc>
+                    <a:tc>
+                      <a:txBody>
+                        <a:bodyPr/>
+                        <a:lstStyle/>
+                        <a:p>
+                          <a:pPr algn="ctr"/>
+                          <a:r>
+                            <a:rPr lang="en-US" sz="1200" dirty="0" smtClean="0"/>
+                            <a:t>4.09</a:t>
+                          </a:r>
+                          <a:endParaRPr lang="en-US" sz="1200" dirty="0"/>
+                        </a:p>
+                      </a:txBody>
+                      <a:tcPr anchor="ctr"/>
+                    </a:tc>
+                    <a:tc>
+                      <a:txBody>
+                        <a:bodyPr/>
+                        <a:lstStyle/>
+                        <a:p>
+                          <a:pPr algn="ctr"/>
+                          <a:r>
+                            <a:rPr lang="en-US" sz="1200" dirty="0" smtClean="0"/>
+                            <a:t>13.98</a:t>
+                          </a:r>
+                          <a:endParaRPr lang="en-US" sz="1200" dirty="0"/>
+                        </a:p>
+                      </a:txBody>
+                      <a:tcPr anchor="ctr"/>
+                    </a:tc>
+                    <a:extLst>
+                      <a:ext uri="{0D108BD9-81ED-4DB2-BD59-A6C34878D82A}">
+                        <a16:rowId xmlns:a16="http://schemas.microsoft.com/office/drawing/2014/main" xmlns:a14="http://schemas.microsoft.com/office/drawing/2010/main" xmlns="" val="10002"/>
+                      </a:ext>
+                    </a:extLst>
+                  </a:tr>
+                  <a:tr h="457200">
+                    <a:tc>
+                      <a:txBody>
+                        <a:bodyPr/>
+                        <a:lstStyle/>
+                        <a:p>
+                          <a:pPr algn="ctr"/>
+                          <a:r>
+                            <a:rPr lang="en-US" sz="1200" dirty="0"/>
+                            <a:t>6</a:t>
+                          </a:r>
+                        </a:p>
+                      </a:txBody>
+                      <a:tcPr anchor="ctr"/>
+                    </a:tc>
+                    <a:tc>
+                      <a:txBody>
+                        <a:bodyPr/>
+                        <a:lstStyle/>
+                        <a:p>
+                          <a:endParaRPr lang="en-US"/>
+                        </a:p>
+                      </a:txBody>
+                      <a:tcPr anchor="ctr">
+                        <a:blipFill rotWithShape="1">
+                          <a:blip r:embed="rId3"/>
+                          <a:stretch>
+                            <a:fillRect l="-65868" t="-300000" r="-321557" b="-10667"/>
+                          </a:stretch>
+                        </a:blipFill>
+                      </a:tcPr>
+                    </a:tc>
+                    <a:tc>
+                      <a:txBody>
+                        <a:bodyPr/>
+                        <a:lstStyle/>
+                        <a:p>
+                          <a:pPr algn="ctr"/>
+                          <a:r>
+                            <a:rPr lang="en-US" sz="1200" dirty="0" smtClean="0"/>
+                            <a:t>4.84</a:t>
+                          </a:r>
+                          <a:endParaRPr lang="en-US" sz="1200" dirty="0"/>
+                        </a:p>
+                      </a:txBody>
+                      <a:tcPr anchor="ctr"/>
+                    </a:tc>
+                    <a:tc>
+                      <a:txBody>
+                        <a:bodyPr/>
+                        <a:lstStyle/>
+                        <a:p>
+                          <a:pPr algn="ctr"/>
+                          <a:r>
+                            <a:rPr lang="en-US" sz="1200" dirty="0" smtClean="0"/>
+                            <a:t>3.01</a:t>
+                          </a:r>
+                          <a:endParaRPr lang="en-US" sz="1200" dirty="0"/>
+                        </a:p>
+                      </a:txBody>
+                      <a:tcPr anchor="ctr"/>
+                    </a:tc>
+                    <a:tc>
+                      <a:txBody>
+                        <a:bodyPr/>
+                        <a:lstStyle/>
+                        <a:p>
+                          <a:pPr algn="ctr"/>
+                          <a:r>
+                            <a:rPr lang="en-US" sz="1200" dirty="0" smtClean="0"/>
+                            <a:t>2.73</a:t>
+                          </a:r>
+                          <a:endParaRPr lang="en-US" sz="1200" dirty="0"/>
+                        </a:p>
+                      </a:txBody>
+                      <a:tcPr anchor="ctr"/>
+                    </a:tc>
+                    <a:extLst>
+                      <a:ext uri="{0D108BD9-81ED-4DB2-BD59-A6C34878D82A}">
+                        <a16:rowId xmlns:a16="http://schemas.microsoft.com/office/drawing/2014/main" xmlns:a14="http://schemas.microsoft.com/office/drawing/2010/main" xmlns="" val="10003"/>
+                      </a:ext>
+                    </a:extLst>
+                  </a:tr>
+                </a:tbl>
+              </a:graphicData>
+            </a:graphic>
+          </p:graphicFrame>
+        </mc:Fallback>
+      </mc:AlternateContent>
     </p:spTree>
     <p:extLst>
       <p:ext uri="{BB962C8B-B14F-4D97-AF65-F5344CB8AC3E}">
@@ -4534,7 +6058,7 @@
           <p:nvPr>
             <p:extLst>
               <p:ext uri="{D42A27DB-BD31-4B8C-83A1-F6EECF244321}">
-                <p14:modId xmlns:p14="http://schemas.microsoft.com/office/powerpoint/2010/main" val="746430633"/>
+                <p14:modId xmlns:p14="http://schemas.microsoft.com/office/powerpoint/2010/main" val="1344838815"/>
               </p:ext>
             </p:extLst>
           </p:nvPr>
@@ -4553,35 +6077,35 @@
                 <a:gridCol w="692129">
                   <a:extLst>
                     <a:ext uri="{9D8B030D-6E8A-4147-A177-3AD203B41FA5}">
-                      <a16:colId xmlns:a16="http://schemas.microsoft.com/office/drawing/2014/main" val="20000"/>
+                      <a16:colId xmlns:a16="http://schemas.microsoft.com/office/drawing/2014/main" xmlns="" val="20000"/>
                     </a:ext>
                   </a:extLst>
                 </a:gridCol>
                 <a:gridCol w="1030076">
                   <a:extLst>
                     <a:ext uri="{9D8B030D-6E8A-4147-A177-3AD203B41FA5}">
-                      <a16:colId xmlns:a16="http://schemas.microsoft.com/office/drawing/2014/main" val="20001"/>
+                      <a16:colId xmlns:a16="http://schemas.microsoft.com/office/drawing/2014/main" xmlns="" val="20001"/>
                     </a:ext>
                   </a:extLst>
                 </a:gridCol>
                 <a:gridCol w="1175269">
                   <a:extLst>
                     <a:ext uri="{9D8B030D-6E8A-4147-A177-3AD203B41FA5}">
-                      <a16:colId xmlns:a16="http://schemas.microsoft.com/office/drawing/2014/main" val="20003"/>
+                      <a16:colId xmlns:a16="http://schemas.microsoft.com/office/drawing/2014/main" xmlns="" val="20003"/>
                     </a:ext>
                   </a:extLst>
                 </a:gridCol>
                 <a:gridCol w="1028316">
                   <a:extLst>
                     <a:ext uri="{9D8B030D-6E8A-4147-A177-3AD203B41FA5}">
-                      <a16:colId xmlns:a16="http://schemas.microsoft.com/office/drawing/2014/main" val="20004"/>
+                      <a16:colId xmlns:a16="http://schemas.microsoft.com/office/drawing/2014/main" xmlns="" val="20004"/>
                     </a:ext>
                   </a:extLst>
                 </a:gridCol>
                 <a:gridCol w="1028316">
                   <a:extLst>
                     <a:ext uri="{9D8B030D-6E8A-4147-A177-3AD203B41FA5}">
-                      <a16:colId xmlns:a16="http://schemas.microsoft.com/office/drawing/2014/main" val="20005"/>
+                      <a16:colId xmlns:a16="http://schemas.microsoft.com/office/drawing/2014/main" xmlns="" val="20005"/>
                     </a:ext>
                   </a:extLst>
                 </a:gridCol>
@@ -4681,7 +6205,7 @@
                 </a:tc>
                 <a:extLst>
                   <a:ext uri="{0D108BD9-81ED-4DB2-BD59-A6C34878D82A}">
-                    <a16:rowId xmlns:a16="http://schemas.microsoft.com/office/drawing/2014/main" val="10000"/>
+                    <a16:rowId xmlns:a16="http://schemas.microsoft.com/office/drawing/2014/main" xmlns="" val="10000"/>
                   </a:ext>
                 </a:extLst>
               </a:tr>
@@ -4749,16 +6273,17 @@
                     <a:p>
                       <a:pPr algn="ctr"/>
                       <a:r>
-                        <a:rPr lang="en-US" sz="1200" dirty="0"/>
-                        <a:t>18.504</a:t>
+                        <a:rPr lang="en-US" sz="1200" dirty="0" smtClean="0"/>
+                        <a:t>21.670</a:t>
                       </a:r>
+                      <a:endParaRPr lang="en-US" sz="1200" dirty="0"/>
                     </a:p>
                   </a:txBody>
                   <a:tcPr anchor="ctr"/>
                 </a:tc>
                 <a:extLst>
                   <a:ext uri="{0D108BD9-81ED-4DB2-BD59-A6C34878D82A}">
-                    <a16:rowId xmlns:a16="http://schemas.microsoft.com/office/drawing/2014/main" val="10004"/>
+                    <a16:rowId xmlns:a16="http://schemas.microsoft.com/office/drawing/2014/main" xmlns="" val="10004"/>
                   </a:ext>
                 </a:extLst>
               </a:tr>
@@ -4826,16 +6351,17 @@
                     <a:p>
                       <a:pPr algn="ctr"/>
                       <a:r>
-                        <a:rPr lang="en-US" sz="1200" dirty="0"/>
-                        <a:t>14.311</a:t>
+                        <a:rPr lang="en-US" sz="1200" dirty="0" smtClean="0"/>
+                        <a:t>16.008</a:t>
                       </a:r>
+                      <a:endParaRPr lang="en-US" sz="1200" dirty="0"/>
                     </a:p>
                   </a:txBody>
                   <a:tcPr anchor="ctr"/>
                 </a:tc>
                 <a:extLst>
                   <a:ext uri="{0D108BD9-81ED-4DB2-BD59-A6C34878D82A}">
-                    <a16:rowId xmlns:a16="http://schemas.microsoft.com/office/drawing/2014/main" val="10005"/>
+                    <a16:rowId xmlns:a16="http://schemas.microsoft.com/office/drawing/2014/main" xmlns="" val="10005"/>
                   </a:ext>
                 </a:extLst>
               </a:tr>
@@ -4903,16 +6429,17 @@
                     <a:p>
                       <a:pPr algn="ctr"/>
                       <a:r>
-                        <a:rPr lang="en-US" sz="1200" dirty="0"/>
-                        <a:t>3.913</a:t>
+                        <a:rPr lang="en-US" sz="1200" dirty="0" smtClean="0"/>
+                        <a:t>4.084</a:t>
                       </a:r>
+                      <a:endParaRPr lang="en-US" sz="1200" dirty="0"/>
                     </a:p>
                   </a:txBody>
                   <a:tcPr anchor="ctr"/>
                 </a:tc>
                 <a:extLst>
                   <a:ext uri="{0D108BD9-81ED-4DB2-BD59-A6C34878D82A}">
-                    <a16:rowId xmlns:a16="http://schemas.microsoft.com/office/drawing/2014/main" val="10006"/>
+                    <a16:rowId xmlns:a16="http://schemas.microsoft.com/office/drawing/2014/main" xmlns="" val="10006"/>
                   </a:ext>
                 </a:extLst>
               </a:tr>
@@ -4927,7 +6454,7 @@
               <p:cNvPr id="3" name="Table 2">
                 <a:extLst>
                   <a:ext uri="{FF2B5EF4-FFF2-40B4-BE49-F238E27FC236}">
-                    <a16:creationId xmlns:a16="http://schemas.microsoft.com/office/drawing/2014/main" id="{D0EB71A3-46E8-4D14-8C66-7AA2857B02D9}"/>
+                    <a16:creationId xmlns:a16="http://schemas.microsoft.com/office/drawing/2014/main" xmlns="" id="{D0EB71A3-46E8-4D14-8C66-7AA2857B02D9}"/>
                   </a:ext>
                 </a:extLst>
               </p:cNvPr>
@@ -4937,7 +6464,7 @@
               <p:nvPr>
                 <p:extLst>
                   <p:ext uri="{D42A27DB-BD31-4B8C-83A1-F6EECF244321}">
-                    <p14:modId xmlns:p14="http://schemas.microsoft.com/office/powerpoint/2010/main" val="2951616292"/>
+                    <p14:modId xmlns:p14="http://schemas.microsoft.com/office/powerpoint/2010/main" val="2246017044"/>
                   </p:ext>
                 </p:extLst>
               </p:nvPr>
@@ -4956,35 +6483,35 @@
                     <a:gridCol w="665566">
                       <a:extLst>
                         <a:ext uri="{9D8B030D-6E8A-4147-A177-3AD203B41FA5}">
-                          <a16:colId xmlns:a16="http://schemas.microsoft.com/office/drawing/2014/main" val="20000"/>
+                          <a16:colId xmlns:a16="http://schemas.microsoft.com/office/drawing/2014/main" xmlns="" val="20000"/>
                         </a:ext>
                       </a:extLst>
                     </a:gridCol>
                     <a:gridCol w="1018270">
                       <a:extLst>
                         <a:ext uri="{9D8B030D-6E8A-4147-A177-3AD203B41FA5}">
-                          <a16:colId xmlns:a16="http://schemas.microsoft.com/office/drawing/2014/main" val="20002"/>
+                          <a16:colId xmlns:a16="http://schemas.microsoft.com/office/drawing/2014/main" xmlns="" val="20002"/>
                         </a:ext>
                       </a:extLst>
                     </a:gridCol>
                     <a:gridCol w="1174700">
                       <a:extLst>
                         <a:ext uri="{9D8B030D-6E8A-4147-A177-3AD203B41FA5}">
-                          <a16:colId xmlns:a16="http://schemas.microsoft.com/office/drawing/2014/main" val="20003"/>
+                          <a16:colId xmlns:a16="http://schemas.microsoft.com/office/drawing/2014/main" xmlns="" val="20003"/>
                         </a:ext>
                       </a:extLst>
                     </a:gridCol>
                     <a:gridCol w="1106056">
                       <a:extLst>
                         <a:ext uri="{9D8B030D-6E8A-4147-A177-3AD203B41FA5}">
-                          <a16:colId xmlns:a16="http://schemas.microsoft.com/office/drawing/2014/main" val="20004"/>
+                          <a16:colId xmlns:a16="http://schemas.microsoft.com/office/drawing/2014/main" xmlns="" val="20004"/>
                         </a:ext>
                       </a:extLst>
                     </a:gridCol>
                     <a:gridCol w="989514">
                       <a:extLst>
                         <a:ext uri="{9D8B030D-6E8A-4147-A177-3AD203B41FA5}">
-                          <a16:colId xmlns:a16="http://schemas.microsoft.com/office/drawing/2014/main" val="20005"/>
+                          <a16:colId xmlns:a16="http://schemas.microsoft.com/office/drawing/2014/main" xmlns="" val="20005"/>
                         </a:ext>
                       </a:extLst>
                     </a:gridCol>
@@ -5079,7 +6606,7 @@
                     </a:tc>
                     <a:extLst>
                       <a:ext uri="{0D108BD9-81ED-4DB2-BD59-A6C34878D82A}">
-                        <a16:rowId xmlns:a16="http://schemas.microsoft.com/office/drawing/2014/main" val="10000"/>
+                        <a16:rowId xmlns:a16="http://schemas.microsoft.com/office/drawing/2014/main" xmlns="" val="10000"/>
                       </a:ext>
                     </a:extLst>
                   </a:tr>
@@ -5114,7 +6641,7 @@
                                 <m:sSubPr>
                                   <m:ctrlPr>
                                     <a:rPr lang="en-US" sz="1200" i="1" dirty="0" smtClean="0">
-                                      <a:latin typeface="Cambria Math" panose="02040503050406030204" pitchFamily="18" charset="0"/>
+                                      <a:latin typeface="Cambria Math"/>
                                     </a:rPr>
                                   </m:ctrlPr>
                                 </m:sSubPr>
@@ -5171,7 +6698,7 @@
                                   <m:sSubPr>
                                     <m:ctrlPr>
                                       <a:rPr lang="en-US" sz="1200" i="1" dirty="0" smtClean="0">
-                                        <a:latin typeface="Cambria Math" panose="02040503050406030204" pitchFamily="18" charset="0"/>
+                                        <a:latin typeface="Cambria Math"/>
                                       </a:rPr>
                                     </m:ctrlPr>
                                   </m:sSubPr>
@@ -5253,16 +6780,17 @@
                         <a:p>
                           <a:pPr algn="ctr"/>
                           <a:r>
-                            <a:rPr lang="en-US" sz="1200" dirty="0"/>
-                            <a:t>16.249</a:t>
-                          </a:r>
+                            <a:rPr lang="en-US" sz="1200" dirty="0" smtClean="0"/>
+                            <a:t>17.372</a:t>
+                          </a:r>
+                          <a:endParaRPr lang="en-US" sz="1200" dirty="0"/>
                         </a:p>
                       </a:txBody>
                       <a:tcPr anchor="ctr"/>
                     </a:tc>
                     <a:extLst>
                       <a:ext uri="{0D108BD9-81ED-4DB2-BD59-A6C34878D82A}">
-                        <a16:rowId xmlns:a16="http://schemas.microsoft.com/office/drawing/2014/main" val="10001"/>
+                        <a16:rowId xmlns:a16="http://schemas.microsoft.com/office/drawing/2014/main" xmlns="" val="10001"/>
                       </a:ext>
                     </a:extLst>
                   </a:tr>
@@ -5297,7 +6825,7 @@
                                 <m:sSubPr>
                                   <m:ctrlPr>
                                     <a:rPr lang="en-US" sz="1200" i="1" dirty="0" smtClean="0">
-                                      <a:latin typeface="Cambria Math" panose="02040503050406030204" pitchFamily="18" charset="0"/>
+                                      <a:latin typeface="Cambria Math"/>
                                     </a:rPr>
                                   </m:ctrlPr>
                                 </m:sSubPr>
@@ -5348,7 +6876,7 @@
                                 <m:sSubPr>
                                   <m:ctrlPr>
                                     <a:rPr lang="en-US" sz="1200" i="1" dirty="0" smtClean="0">
-                                      <a:latin typeface="Cambria Math" panose="02040503050406030204" pitchFamily="18" charset="0"/>
+                                      <a:latin typeface="Cambria Math"/>
                                     </a:rPr>
                                   </m:ctrlPr>
                                 </m:sSubPr>
@@ -5429,16 +6957,17 @@
                         <a:p>
                           <a:pPr algn="ctr"/>
                           <a:r>
-                            <a:rPr lang="en-US" sz="1200" dirty="0"/>
-                            <a:t>11.720</a:t>
-                          </a:r>
+                            <a:rPr lang="en-US" sz="1200" dirty="0" smtClean="0"/>
+                            <a:t>12.366</a:t>
+                          </a:r>
+                          <a:endParaRPr lang="en-US" sz="1200" dirty="0"/>
                         </a:p>
                       </a:txBody>
                       <a:tcPr anchor="ctr"/>
                     </a:tc>
                     <a:extLst>
                       <a:ext uri="{0D108BD9-81ED-4DB2-BD59-A6C34878D82A}">
-                        <a16:rowId xmlns:a16="http://schemas.microsoft.com/office/drawing/2014/main" val="10002"/>
+                        <a16:rowId xmlns:a16="http://schemas.microsoft.com/office/drawing/2014/main" xmlns="" val="10002"/>
                       </a:ext>
                     </a:extLst>
                   </a:tr>
@@ -5473,7 +7002,7 @@
                                 <m:sSubPr>
                                   <m:ctrlPr>
                                     <a:rPr lang="en-US" sz="1200" i="1" dirty="0" smtClean="0">
-                                      <a:latin typeface="Cambria Math" panose="02040503050406030204" pitchFamily="18" charset="0"/>
+                                      <a:latin typeface="Cambria Math"/>
                                     </a:rPr>
                                   </m:ctrlPr>
                                 </m:sSubPr>
@@ -5524,7 +7053,7 @@
                                 <m:sSubPr>
                                   <m:ctrlPr>
                                     <a:rPr lang="en-US" sz="1200" i="1" dirty="0" smtClean="0">
-                                      <a:latin typeface="Cambria Math" panose="02040503050406030204" pitchFamily="18" charset="0"/>
+                                      <a:latin typeface="Cambria Math"/>
                                     </a:rPr>
                                   </m:ctrlPr>
                                 </m:sSubPr>
@@ -5605,16 +7134,17 @@
                         <a:p>
                           <a:pPr algn="ctr"/>
                           <a:r>
-                            <a:rPr lang="en-US" sz="1200" dirty="0"/>
-                            <a:t>1.709</a:t>
-                          </a:r>
+                            <a:rPr lang="en-US" sz="1200" dirty="0" smtClean="0"/>
+                            <a:t>1.896</a:t>
+                          </a:r>
+                          <a:endParaRPr lang="en-US" sz="1200" dirty="0"/>
                         </a:p>
                       </a:txBody>
                       <a:tcPr anchor="ctr"/>
                     </a:tc>
                     <a:extLst>
                       <a:ext uri="{0D108BD9-81ED-4DB2-BD59-A6C34878D82A}">
-                        <a16:rowId xmlns:a16="http://schemas.microsoft.com/office/drawing/2014/main" val="10003"/>
+                        <a16:rowId xmlns:a16="http://schemas.microsoft.com/office/drawing/2014/main" xmlns="" val="10003"/>
                       </a:ext>
                     </a:extLst>
                   </a:tr>
@@ -5629,7 +7159,7 @@
               <p:cNvPr id="3" name="Table 2">
                 <a:extLst>
                   <a:ext uri="{FF2B5EF4-FFF2-40B4-BE49-F238E27FC236}">
-                    <a16:creationId xmlns:a16="http://schemas.microsoft.com/office/drawing/2014/main" id="{D0EB71A3-46E8-4D14-8C66-7AA2857B02D9}"/>
+                    <a16:creationId xmlns:a16="http://schemas.microsoft.com/office/drawing/2014/main" xmlns:a14="http://schemas.microsoft.com/office/drawing/2010/main" xmlns="" id="{D0EB71A3-46E8-4D14-8C66-7AA2857B02D9}"/>
                   </a:ext>
                 </a:extLst>
               </p:cNvPr>
@@ -5639,7 +7169,7 @@
               <p:nvPr>
                 <p:extLst>
                   <p:ext uri="{D42A27DB-BD31-4B8C-83A1-F6EECF244321}">
-                    <p14:modId xmlns:p14="http://schemas.microsoft.com/office/powerpoint/2010/main" val="2951616292"/>
+                    <p14:modId xmlns:p14="http://schemas.microsoft.com/office/powerpoint/2010/main" val="2246017044"/>
                   </p:ext>
                 </p:extLst>
               </p:nvPr>
@@ -5658,35 +7188,35 @@
                     <a:gridCol w="665566">
                       <a:extLst>
                         <a:ext uri="{9D8B030D-6E8A-4147-A177-3AD203B41FA5}">
-                          <a16:colId xmlns:a16="http://schemas.microsoft.com/office/drawing/2014/main" val="20000"/>
+                          <a16:colId xmlns:a16="http://schemas.microsoft.com/office/drawing/2014/main" xmlns:a14="http://schemas.microsoft.com/office/drawing/2010/main" xmlns="" val="20000"/>
                         </a:ext>
                       </a:extLst>
                     </a:gridCol>
                     <a:gridCol w="1018270">
                       <a:extLst>
                         <a:ext uri="{9D8B030D-6E8A-4147-A177-3AD203B41FA5}">
-                          <a16:colId xmlns:a16="http://schemas.microsoft.com/office/drawing/2014/main" val="20002"/>
+                          <a16:colId xmlns:a16="http://schemas.microsoft.com/office/drawing/2014/main" xmlns:a14="http://schemas.microsoft.com/office/drawing/2010/main" xmlns="" val="20002"/>
                         </a:ext>
                       </a:extLst>
                     </a:gridCol>
                     <a:gridCol w="1174700">
                       <a:extLst>
                         <a:ext uri="{9D8B030D-6E8A-4147-A177-3AD203B41FA5}">
-                          <a16:colId xmlns:a16="http://schemas.microsoft.com/office/drawing/2014/main" val="20003"/>
+                          <a16:colId xmlns:a16="http://schemas.microsoft.com/office/drawing/2014/main" xmlns:a14="http://schemas.microsoft.com/office/drawing/2010/main" xmlns="" val="20003"/>
                         </a:ext>
                       </a:extLst>
                     </a:gridCol>
                     <a:gridCol w="1106056">
                       <a:extLst>
                         <a:ext uri="{9D8B030D-6E8A-4147-A177-3AD203B41FA5}">
-                          <a16:colId xmlns:a16="http://schemas.microsoft.com/office/drawing/2014/main" val="20004"/>
+                          <a16:colId xmlns:a16="http://schemas.microsoft.com/office/drawing/2014/main" xmlns:a14="http://schemas.microsoft.com/office/drawing/2010/main" xmlns="" val="20004"/>
                         </a:ext>
                       </a:extLst>
                     </a:gridCol>
                     <a:gridCol w="989514">
                       <a:extLst>
                         <a:ext uri="{9D8B030D-6E8A-4147-A177-3AD203B41FA5}">
-                          <a16:colId xmlns:a16="http://schemas.microsoft.com/office/drawing/2014/main" val="20005"/>
+                          <a16:colId xmlns:a16="http://schemas.microsoft.com/office/drawing/2014/main" xmlns:a14="http://schemas.microsoft.com/office/drawing/2010/main" xmlns="" val="20005"/>
                         </a:ext>
                       </a:extLst>
                     </a:gridCol>
@@ -5781,7 +7311,7 @@
                     </a:tc>
                     <a:extLst>
                       <a:ext uri="{0D108BD9-81ED-4DB2-BD59-A6C34878D82A}">
-                        <a16:rowId xmlns:a16="http://schemas.microsoft.com/office/drawing/2014/main" val="10000"/>
+                        <a16:rowId xmlns:a16="http://schemas.microsoft.com/office/drawing/2014/main" xmlns:a14="http://schemas.microsoft.com/office/drawing/2010/main" xmlns="" val="10000"/>
                       </a:ext>
                     </a:extLst>
                   </a:tr>
@@ -5809,10 +7339,10 @@
                         </a:p>
                       </a:txBody>
                       <a:tcPr anchor="ctr">
-                        <a:blipFill>
+                        <a:blipFill rotWithShape="1">
                           <a:blip r:embed="rId2"/>
                           <a:stretch>
-                            <a:fillRect l="-65269" t="-101316" r="-323353" b="-200000"/>
+                            <a:fillRect l="-65269" t="-101333" r="-321557" b="-210667"/>
                           </a:stretch>
                         </a:blipFill>
                       </a:tcPr>
@@ -5852,16 +7382,17 @@
                         <a:p>
                           <a:pPr algn="ctr"/>
                           <a:r>
-                            <a:rPr lang="en-US" sz="1200" dirty="0"/>
-                            <a:t>16.249</a:t>
-                          </a:r>
+                            <a:rPr lang="en-US" sz="1200" dirty="0" smtClean="0"/>
+                            <a:t>17.372</a:t>
+                          </a:r>
+                          <a:endParaRPr lang="en-US" sz="1200" dirty="0"/>
                         </a:p>
                       </a:txBody>
                       <a:tcPr anchor="ctr"/>
                     </a:tc>
                     <a:extLst>
                       <a:ext uri="{0D108BD9-81ED-4DB2-BD59-A6C34878D82A}">
-                        <a16:rowId xmlns:a16="http://schemas.microsoft.com/office/drawing/2014/main" val="10001"/>
+                        <a16:rowId xmlns:a16="http://schemas.microsoft.com/office/drawing/2014/main" xmlns:a14="http://schemas.microsoft.com/office/drawing/2010/main" xmlns="" val="10001"/>
                       </a:ext>
                     </a:extLst>
                   </a:tr>
@@ -5889,10 +7420,10 @@
                         </a:p>
                       </a:txBody>
                       <a:tcPr anchor="ctr">
-                        <a:blipFill>
+                        <a:blipFill rotWithShape="1">
                           <a:blip r:embed="rId2"/>
                           <a:stretch>
-                            <a:fillRect l="-65269" t="-204000" r="-323353" b="-102667"/>
+                            <a:fillRect l="-65269" t="-201333" r="-321557" b="-110667"/>
                           </a:stretch>
                         </a:blipFill>
                       </a:tcPr>
@@ -5932,16 +7463,17 @@
                         <a:p>
                           <a:pPr algn="ctr"/>
                           <a:r>
-                            <a:rPr lang="en-US" sz="1200" dirty="0"/>
-                            <a:t>11.720</a:t>
-                          </a:r>
+                            <a:rPr lang="en-US" sz="1200" dirty="0" smtClean="0"/>
+                            <a:t>12.366</a:t>
+                          </a:r>
+                          <a:endParaRPr lang="en-US" sz="1200" dirty="0"/>
                         </a:p>
                       </a:txBody>
                       <a:tcPr anchor="ctr"/>
                     </a:tc>
                     <a:extLst>
                       <a:ext uri="{0D108BD9-81ED-4DB2-BD59-A6C34878D82A}">
-                        <a16:rowId xmlns:a16="http://schemas.microsoft.com/office/drawing/2014/main" val="10002"/>
+                        <a16:rowId xmlns:a16="http://schemas.microsoft.com/office/drawing/2014/main" xmlns:a14="http://schemas.microsoft.com/office/drawing/2010/main" xmlns="" val="10002"/>
                       </a:ext>
                     </a:extLst>
                   </a:tr>
@@ -5969,10 +7501,10 @@
                         </a:p>
                       </a:txBody>
                       <a:tcPr anchor="ctr">
-                        <a:blipFill>
+                        <a:blipFill rotWithShape="1">
                           <a:blip r:embed="rId2"/>
                           <a:stretch>
-                            <a:fillRect l="-65269" t="-304000" r="-323353" b="-2667"/>
+                            <a:fillRect l="-65269" t="-301333" r="-321557" b="-10667"/>
                           </a:stretch>
                         </a:blipFill>
                       </a:tcPr>
@@ -6012,16 +7544,17 @@
                         <a:p>
                           <a:pPr algn="ctr"/>
                           <a:r>
-                            <a:rPr lang="en-US" sz="1200" dirty="0"/>
-                            <a:t>1.709</a:t>
-                          </a:r>
+                            <a:rPr lang="en-US" sz="1200" dirty="0" smtClean="0"/>
+                            <a:t>1.896</a:t>
+                          </a:r>
+                          <a:endParaRPr lang="en-US" sz="1200" dirty="0"/>
                         </a:p>
                       </a:txBody>
                       <a:tcPr anchor="ctr"/>
                     </a:tc>
                     <a:extLst>
                       <a:ext uri="{0D108BD9-81ED-4DB2-BD59-A6C34878D82A}">
-                        <a16:rowId xmlns:a16="http://schemas.microsoft.com/office/drawing/2014/main" val="10003"/>
+                        <a16:rowId xmlns:a16="http://schemas.microsoft.com/office/drawing/2014/main" xmlns:a14="http://schemas.microsoft.com/office/drawing/2010/main" xmlns="" val="10003"/>
                       </a:ext>
                     </a:extLst>
                   </a:tr>
@@ -6036,7 +7569,7 @@
           <p:cNvPr id="2" name="TextBox 1">
             <a:extLst>
               <a:ext uri="{FF2B5EF4-FFF2-40B4-BE49-F238E27FC236}">
-                <a16:creationId xmlns:a16="http://schemas.microsoft.com/office/drawing/2014/main" id="{AA70D9EB-9FA9-459F-981E-5061D572C3E4}"/>
+                <a16:creationId xmlns:a16="http://schemas.microsoft.com/office/drawing/2014/main" xmlns="" id="{AA70D9EB-9FA9-459F-981E-5061D572C3E4}"/>
               </a:ext>
             </a:extLst>
           </p:cNvPr>
@@ -6105,7 +7638,7 @@
           <p:nvPr>
             <p:extLst>
               <p:ext uri="{D42A27DB-BD31-4B8C-83A1-F6EECF244321}">
-                <p14:modId xmlns:p14="http://schemas.microsoft.com/office/powerpoint/2010/main" val="94341890"/>
+                <p14:modId xmlns:p14="http://schemas.microsoft.com/office/powerpoint/2010/main" val="4050001404"/>
               </p:ext>
             </p:extLst>
           </p:nvPr>
@@ -6124,35 +7657,35 @@
                 <a:gridCol w="692129">
                   <a:extLst>
                     <a:ext uri="{9D8B030D-6E8A-4147-A177-3AD203B41FA5}">
-                      <a16:colId xmlns:a16="http://schemas.microsoft.com/office/drawing/2014/main" val="20000"/>
+                      <a16:colId xmlns:a16="http://schemas.microsoft.com/office/drawing/2014/main" xmlns="" val="20000"/>
                     </a:ext>
                   </a:extLst>
                 </a:gridCol>
                 <a:gridCol w="1030076">
                   <a:extLst>
                     <a:ext uri="{9D8B030D-6E8A-4147-A177-3AD203B41FA5}">
-                      <a16:colId xmlns:a16="http://schemas.microsoft.com/office/drawing/2014/main" val="20001"/>
+                      <a16:colId xmlns:a16="http://schemas.microsoft.com/office/drawing/2014/main" xmlns="" val="20001"/>
                     </a:ext>
                   </a:extLst>
                 </a:gridCol>
                 <a:gridCol w="1175269">
                   <a:extLst>
                     <a:ext uri="{9D8B030D-6E8A-4147-A177-3AD203B41FA5}">
-                      <a16:colId xmlns:a16="http://schemas.microsoft.com/office/drawing/2014/main" val="20003"/>
+                      <a16:colId xmlns:a16="http://schemas.microsoft.com/office/drawing/2014/main" xmlns="" val="20003"/>
                     </a:ext>
                   </a:extLst>
                 </a:gridCol>
                 <a:gridCol w="1028316">
                   <a:extLst>
                     <a:ext uri="{9D8B030D-6E8A-4147-A177-3AD203B41FA5}">
-                      <a16:colId xmlns:a16="http://schemas.microsoft.com/office/drawing/2014/main" val="20004"/>
+                      <a16:colId xmlns:a16="http://schemas.microsoft.com/office/drawing/2014/main" xmlns="" val="20004"/>
                     </a:ext>
                   </a:extLst>
                 </a:gridCol>
                 <a:gridCol w="1028316">
                   <a:extLst>
                     <a:ext uri="{9D8B030D-6E8A-4147-A177-3AD203B41FA5}">
-                      <a16:colId xmlns:a16="http://schemas.microsoft.com/office/drawing/2014/main" val="20005"/>
+                      <a16:colId xmlns:a16="http://schemas.microsoft.com/office/drawing/2014/main" xmlns="" val="20005"/>
                     </a:ext>
                   </a:extLst>
                 </a:gridCol>
@@ -6252,7 +7785,7 @@
                 </a:tc>
                 <a:extLst>
                   <a:ext uri="{0D108BD9-81ED-4DB2-BD59-A6C34878D82A}">
-                    <a16:rowId xmlns:a16="http://schemas.microsoft.com/office/drawing/2014/main" val="10000"/>
+                    <a16:rowId xmlns:a16="http://schemas.microsoft.com/office/drawing/2014/main" xmlns="" val="10000"/>
                   </a:ext>
                 </a:extLst>
               </a:tr>
@@ -6320,16 +7853,17 @@
                     <a:p>
                       <a:pPr algn="ctr"/>
                       <a:r>
-                        <a:rPr lang="en-US" sz="1200" dirty="0"/>
-                        <a:t>53.903</a:t>
+                        <a:rPr lang="en-US" sz="1200" dirty="0" smtClean="0"/>
+                        <a:t>55.103</a:t>
                       </a:r>
+                      <a:endParaRPr lang="en-US" sz="1200" dirty="0"/>
                     </a:p>
                   </a:txBody>
                   <a:tcPr anchor="ctr"/>
                 </a:tc>
                 <a:extLst>
                   <a:ext uri="{0D108BD9-81ED-4DB2-BD59-A6C34878D82A}">
-                    <a16:rowId xmlns:a16="http://schemas.microsoft.com/office/drawing/2014/main" val="10004"/>
+                    <a16:rowId xmlns:a16="http://schemas.microsoft.com/office/drawing/2014/main" xmlns="" val="10004"/>
                   </a:ext>
                 </a:extLst>
               </a:tr>
@@ -6406,7 +7940,7 @@
                 </a:tc>
                 <a:extLst>
                   <a:ext uri="{0D108BD9-81ED-4DB2-BD59-A6C34878D82A}">
-                    <a16:rowId xmlns:a16="http://schemas.microsoft.com/office/drawing/2014/main" val="10005"/>
+                    <a16:rowId xmlns:a16="http://schemas.microsoft.com/office/drawing/2014/main" xmlns="" val="10005"/>
                   </a:ext>
                 </a:extLst>
               </a:tr>
@@ -6483,7 +8017,7 @@
                 </a:tc>
                 <a:extLst>
                   <a:ext uri="{0D108BD9-81ED-4DB2-BD59-A6C34878D82A}">
-                    <a16:rowId xmlns:a16="http://schemas.microsoft.com/office/drawing/2014/main" val="10006"/>
+                    <a16:rowId xmlns:a16="http://schemas.microsoft.com/office/drawing/2014/main" xmlns="" val="10006"/>
                   </a:ext>
                 </a:extLst>
               </a:tr>
@@ -6498,7 +8032,7 @@
               <p:cNvPr id="3" name="Table 2">
                 <a:extLst>
                   <a:ext uri="{FF2B5EF4-FFF2-40B4-BE49-F238E27FC236}">
-                    <a16:creationId xmlns:a16="http://schemas.microsoft.com/office/drawing/2014/main" id="{D0EB71A3-46E8-4D14-8C66-7AA2857B02D9}"/>
+                    <a16:creationId xmlns:a16="http://schemas.microsoft.com/office/drawing/2014/main" xmlns="" id="{D0EB71A3-46E8-4D14-8C66-7AA2857B02D9}"/>
                   </a:ext>
                 </a:extLst>
               </p:cNvPr>
@@ -6527,35 +8061,35 @@
                     <a:gridCol w="665566">
                       <a:extLst>
                         <a:ext uri="{9D8B030D-6E8A-4147-A177-3AD203B41FA5}">
-                          <a16:colId xmlns:a16="http://schemas.microsoft.com/office/drawing/2014/main" val="20000"/>
+                          <a16:colId xmlns:a16="http://schemas.microsoft.com/office/drawing/2014/main" xmlns="" val="20000"/>
                         </a:ext>
                       </a:extLst>
                     </a:gridCol>
                     <a:gridCol w="1018270">
                       <a:extLst>
                         <a:ext uri="{9D8B030D-6E8A-4147-A177-3AD203B41FA5}">
-                          <a16:colId xmlns:a16="http://schemas.microsoft.com/office/drawing/2014/main" val="20002"/>
+                          <a16:colId xmlns:a16="http://schemas.microsoft.com/office/drawing/2014/main" xmlns="" val="20002"/>
                         </a:ext>
                       </a:extLst>
                     </a:gridCol>
                     <a:gridCol w="1174700">
                       <a:extLst>
                         <a:ext uri="{9D8B030D-6E8A-4147-A177-3AD203B41FA5}">
-                          <a16:colId xmlns:a16="http://schemas.microsoft.com/office/drawing/2014/main" val="20003"/>
+                          <a16:colId xmlns:a16="http://schemas.microsoft.com/office/drawing/2014/main" xmlns="" val="20003"/>
                         </a:ext>
                       </a:extLst>
                     </a:gridCol>
                     <a:gridCol w="1106056">
                       <a:extLst>
                         <a:ext uri="{9D8B030D-6E8A-4147-A177-3AD203B41FA5}">
-                          <a16:colId xmlns:a16="http://schemas.microsoft.com/office/drawing/2014/main" val="20004"/>
+                          <a16:colId xmlns:a16="http://schemas.microsoft.com/office/drawing/2014/main" xmlns="" val="20004"/>
                         </a:ext>
                       </a:extLst>
                     </a:gridCol>
                     <a:gridCol w="989514">
                       <a:extLst>
                         <a:ext uri="{9D8B030D-6E8A-4147-A177-3AD203B41FA5}">
-                          <a16:colId xmlns:a16="http://schemas.microsoft.com/office/drawing/2014/main" val="20005"/>
+                          <a16:colId xmlns:a16="http://schemas.microsoft.com/office/drawing/2014/main" xmlns="" val="20005"/>
                         </a:ext>
                       </a:extLst>
                     </a:gridCol>
@@ -6650,7 +8184,7 @@
                     </a:tc>
                     <a:extLst>
                       <a:ext uri="{0D108BD9-81ED-4DB2-BD59-A6C34878D82A}">
-                        <a16:rowId xmlns:a16="http://schemas.microsoft.com/office/drawing/2014/main" val="10000"/>
+                        <a16:rowId xmlns:a16="http://schemas.microsoft.com/office/drawing/2014/main" xmlns="" val="10000"/>
                       </a:ext>
                     </a:extLst>
                   </a:tr>
@@ -6685,7 +8219,7 @@
                                 <m:sSubPr>
                                   <m:ctrlPr>
                                     <a:rPr lang="en-US" sz="1200" i="1" dirty="0" smtClean="0">
-                                      <a:latin typeface="Cambria Math" panose="02040503050406030204" pitchFamily="18" charset="0"/>
+                                      <a:latin typeface="Cambria Math"/>
                                     </a:rPr>
                                   </m:ctrlPr>
                                 </m:sSubPr>
@@ -6742,7 +8276,7 @@
                                   <m:sSubPr>
                                     <m:ctrlPr>
                                       <a:rPr lang="en-US" sz="1200" i="1" dirty="0" smtClean="0">
-                                        <a:latin typeface="Cambria Math" panose="02040503050406030204" pitchFamily="18" charset="0"/>
+                                        <a:latin typeface="Cambria Math"/>
                                       </a:rPr>
                                     </m:ctrlPr>
                                   </m:sSubPr>
@@ -6833,7 +8367,7 @@
                     </a:tc>
                     <a:extLst>
                       <a:ext uri="{0D108BD9-81ED-4DB2-BD59-A6C34878D82A}">
-                        <a16:rowId xmlns:a16="http://schemas.microsoft.com/office/drawing/2014/main" val="10001"/>
+                        <a16:rowId xmlns:a16="http://schemas.microsoft.com/office/drawing/2014/main" xmlns="" val="10001"/>
                       </a:ext>
                     </a:extLst>
                   </a:tr>
@@ -6868,7 +8402,7 @@
                                 <m:sSubPr>
                                   <m:ctrlPr>
                                     <a:rPr lang="en-US" sz="1200" i="1" dirty="0" smtClean="0">
-                                      <a:latin typeface="Cambria Math" panose="02040503050406030204" pitchFamily="18" charset="0"/>
+                                      <a:latin typeface="Cambria Math"/>
                                     </a:rPr>
                                   </m:ctrlPr>
                                 </m:sSubPr>
@@ -6919,7 +8453,7 @@
                                 <m:sSubPr>
                                   <m:ctrlPr>
                                     <a:rPr lang="en-US" sz="1200" i="1" dirty="0" smtClean="0">
-                                      <a:latin typeface="Cambria Math" panose="02040503050406030204" pitchFamily="18" charset="0"/>
+                                      <a:latin typeface="Cambria Math"/>
                                     </a:rPr>
                                   </m:ctrlPr>
                                 </m:sSubPr>
@@ -7009,7 +8543,7 @@
                     </a:tc>
                     <a:extLst>
                       <a:ext uri="{0D108BD9-81ED-4DB2-BD59-A6C34878D82A}">
-                        <a16:rowId xmlns:a16="http://schemas.microsoft.com/office/drawing/2014/main" val="10002"/>
+                        <a16:rowId xmlns:a16="http://schemas.microsoft.com/office/drawing/2014/main" xmlns="" val="10002"/>
                       </a:ext>
                     </a:extLst>
                   </a:tr>
@@ -7044,7 +8578,7 @@
                                 <m:sSubPr>
                                   <m:ctrlPr>
                                     <a:rPr lang="en-US" sz="1200" i="1" dirty="0" smtClean="0">
-                                      <a:latin typeface="Cambria Math" panose="02040503050406030204" pitchFamily="18" charset="0"/>
+                                      <a:latin typeface="Cambria Math"/>
                                     </a:rPr>
                                   </m:ctrlPr>
                                 </m:sSubPr>
@@ -7095,7 +8629,7 @@
                                 <m:sSubPr>
                                   <m:ctrlPr>
                                     <a:rPr lang="en-US" sz="1200" i="1" dirty="0" smtClean="0">
-                                      <a:latin typeface="Cambria Math" panose="02040503050406030204" pitchFamily="18" charset="0"/>
+                                      <a:latin typeface="Cambria Math"/>
                                     </a:rPr>
                                   </m:ctrlPr>
                                 </m:sSubPr>
@@ -7149,43 +8683,44 @@
                           <a:pPr algn="ctr"/>
                           <a:r>
                             <a:rPr lang="en-US" sz="1200" dirty="0"/>
-                            <a:t>4.743</a:t>
-                          </a:r>
-                        </a:p>
-                      </a:txBody>
-                      <a:tcPr anchor="ctr"/>
-                    </a:tc>
-                    <a:tc>
-                      <a:txBody>
-                        <a:bodyPr/>
-                        <a:lstStyle/>
-                        <a:p>
-                          <a:pPr algn="ctr"/>
-                          <a:r>
-                            <a:rPr lang="en-US" sz="1200" dirty="0"/>
-                            <a:t>2.494</a:t>
-                          </a:r>
-                        </a:p>
-                      </a:txBody>
-                      <a:tcPr anchor="ctr"/>
-                    </a:tc>
-                    <a:tc>
-                      <a:txBody>
-                        <a:bodyPr/>
-                        <a:lstStyle/>
-                        <a:p>
-                          <a:pPr algn="ctr"/>
-                          <a:r>
-                            <a:rPr lang="en-US" sz="1200" dirty="0"/>
-                            <a:t>1.729</a:t>
-                          </a:r>
+                            <a:t>4.723</a:t>
+                          </a:r>
+                        </a:p>
+                      </a:txBody>
+                      <a:tcPr anchor="ctr"/>
+                    </a:tc>
+                    <a:tc>
+                      <a:txBody>
+                        <a:bodyPr/>
+                        <a:lstStyle/>
+                        <a:p>
+                          <a:pPr algn="ctr"/>
+                          <a:r>
+                            <a:rPr lang="en-US" sz="1200" dirty="0"/>
+                            <a:t>2.470</a:t>
+                          </a:r>
+                        </a:p>
+                      </a:txBody>
+                      <a:tcPr anchor="ctr"/>
+                    </a:tc>
+                    <a:tc>
+                      <a:txBody>
+                        <a:bodyPr/>
+                        <a:lstStyle/>
+                        <a:p>
+                          <a:pPr algn="ctr"/>
+                          <a:r>
+                            <a:rPr lang="en-US" sz="1200" dirty="0" smtClean="0"/>
+                            <a:t>1.896</a:t>
+                          </a:r>
+                          <a:endParaRPr lang="en-US" sz="1200" dirty="0"/>
                         </a:p>
                       </a:txBody>
                       <a:tcPr anchor="ctr"/>
                     </a:tc>
                     <a:extLst>
                       <a:ext uri="{0D108BD9-81ED-4DB2-BD59-A6C34878D82A}">
-                        <a16:rowId xmlns:a16="http://schemas.microsoft.com/office/drawing/2014/main" val="10003"/>
+                        <a16:rowId xmlns:a16="http://schemas.microsoft.com/office/drawing/2014/main" xmlns="" val="10003"/>
                       </a:ext>
                     </a:extLst>
                   </a:tr>
@@ -7200,7 +8735,7 @@
               <p:cNvPr id="3" name="Table 2">
                 <a:extLst>
                   <a:ext uri="{FF2B5EF4-FFF2-40B4-BE49-F238E27FC236}">
-                    <a16:creationId xmlns:a16="http://schemas.microsoft.com/office/drawing/2014/main" id="{D0EB71A3-46E8-4D14-8C66-7AA2857B02D9}"/>
+                    <a16:creationId xmlns:a16="http://schemas.microsoft.com/office/drawing/2014/main" xmlns:a14="http://schemas.microsoft.com/office/drawing/2010/main" xmlns="" id="{D0EB71A3-46E8-4D14-8C66-7AA2857B02D9}"/>
                   </a:ext>
                 </a:extLst>
               </p:cNvPr>
@@ -7229,35 +8764,35 @@
                     <a:gridCol w="665566">
                       <a:extLst>
                         <a:ext uri="{9D8B030D-6E8A-4147-A177-3AD203B41FA5}">
-                          <a16:colId xmlns:a16="http://schemas.microsoft.com/office/drawing/2014/main" val="20000"/>
+                          <a16:colId xmlns:a16="http://schemas.microsoft.com/office/drawing/2014/main" xmlns:a14="http://schemas.microsoft.com/office/drawing/2010/main" xmlns="" val="20000"/>
                         </a:ext>
                       </a:extLst>
                     </a:gridCol>
                     <a:gridCol w="1018270">
                       <a:extLst>
                         <a:ext uri="{9D8B030D-6E8A-4147-A177-3AD203B41FA5}">
-                          <a16:colId xmlns:a16="http://schemas.microsoft.com/office/drawing/2014/main" val="20002"/>
+                          <a16:colId xmlns:a16="http://schemas.microsoft.com/office/drawing/2014/main" xmlns:a14="http://schemas.microsoft.com/office/drawing/2010/main" xmlns="" val="20002"/>
                         </a:ext>
                       </a:extLst>
                     </a:gridCol>
                     <a:gridCol w="1174700">
                       <a:extLst>
                         <a:ext uri="{9D8B030D-6E8A-4147-A177-3AD203B41FA5}">
-                          <a16:colId xmlns:a16="http://schemas.microsoft.com/office/drawing/2014/main" val="20003"/>
+                          <a16:colId xmlns:a16="http://schemas.microsoft.com/office/drawing/2014/main" xmlns:a14="http://schemas.microsoft.com/office/drawing/2010/main" xmlns="" val="20003"/>
                         </a:ext>
                       </a:extLst>
                     </a:gridCol>
                     <a:gridCol w="1106056">
                       <a:extLst>
                         <a:ext uri="{9D8B030D-6E8A-4147-A177-3AD203B41FA5}">
-                          <a16:colId xmlns:a16="http://schemas.microsoft.com/office/drawing/2014/main" val="20004"/>
+                          <a16:colId xmlns:a16="http://schemas.microsoft.com/office/drawing/2014/main" xmlns:a14="http://schemas.microsoft.com/office/drawing/2010/main" xmlns="" val="20004"/>
                         </a:ext>
                       </a:extLst>
                     </a:gridCol>
                     <a:gridCol w="989514">
                       <a:extLst>
                         <a:ext uri="{9D8B030D-6E8A-4147-A177-3AD203B41FA5}">
-                          <a16:colId xmlns:a16="http://schemas.microsoft.com/office/drawing/2014/main" val="20005"/>
+                          <a16:colId xmlns:a16="http://schemas.microsoft.com/office/drawing/2014/main" xmlns:a14="http://schemas.microsoft.com/office/drawing/2010/main" xmlns="" val="20005"/>
                         </a:ext>
                       </a:extLst>
                     </a:gridCol>
@@ -7352,7 +8887,7 @@
                     </a:tc>
                     <a:extLst>
                       <a:ext uri="{0D108BD9-81ED-4DB2-BD59-A6C34878D82A}">
-                        <a16:rowId xmlns:a16="http://schemas.microsoft.com/office/drawing/2014/main" val="10000"/>
+                        <a16:rowId xmlns:a16="http://schemas.microsoft.com/office/drawing/2014/main" xmlns:a14="http://schemas.microsoft.com/office/drawing/2010/main" xmlns="" val="10000"/>
                       </a:ext>
                     </a:extLst>
                   </a:tr>
@@ -7380,10 +8915,10 @@
                         </a:p>
                       </a:txBody>
                       <a:tcPr anchor="ctr">
-                        <a:blipFill>
+                        <a:blipFill rotWithShape="1">
                           <a:blip r:embed="rId2"/>
                           <a:stretch>
-                            <a:fillRect l="-65269" t="-101316" r="-323353" b="-200000"/>
+                            <a:fillRect l="-65269" t="-101333" r="-321557" b="-210667"/>
                           </a:stretch>
                         </a:blipFill>
                       </a:tcPr>
@@ -7432,7 +8967,7 @@
                     </a:tc>
                     <a:extLst>
                       <a:ext uri="{0D108BD9-81ED-4DB2-BD59-A6C34878D82A}">
-                        <a16:rowId xmlns:a16="http://schemas.microsoft.com/office/drawing/2014/main" val="10001"/>
+                        <a16:rowId xmlns:a16="http://schemas.microsoft.com/office/drawing/2014/main" xmlns:a14="http://schemas.microsoft.com/office/drawing/2010/main" xmlns="" val="10001"/>
                       </a:ext>
                     </a:extLst>
                   </a:tr>
@@ -7460,10 +8995,10 @@
                         </a:p>
                       </a:txBody>
                       <a:tcPr anchor="ctr">
-                        <a:blipFill>
+                        <a:blipFill rotWithShape="1">
                           <a:blip r:embed="rId2"/>
                           <a:stretch>
-                            <a:fillRect l="-65269" t="-204000" r="-323353" b="-102667"/>
+                            <a:fillRect l="-65269" t="-201333" r="-321557" b="-110667"/>
                           </a:stretch>
                         </a:blipFill>
                       </a:tcPr>
@@ -7512,7 +9047,7 @@
                     </a:tc>
                     <a:extLst>
                       <a:ext uri="{0D108BD9-81ED-4DB2-BD59-A6C34878D82A}">
-                        <a16:rowId xmlns:a16="http://schemas.microsoft.com/office/drawing/2014/main" val="10002"/>
+                        <a16:rowId xmlns:a16="http://schemas.microsoft.com/office/drawing/2014/main" xmlns:a14="http://schemas.microsoft.com/office/drawing/2010/main" xmlns="" val="10002"/>
                       </a:ext>
                     </a:extLst>
                   </a:tr>
@@ -7540,10 +9075,10 @@
                         </a:p>
                       </a:txBody>
                       <a:tcPr anchor="ctr">
-                        <a:blipFill>
+                        <a:blipFill rotWithShape="1">
                           <a:blip r:embed="rId2"/>
                           <a:stretch>
-                            <a:fillRect l="-65269" t="-304000" r="-323353" b="-2667"/>
+                            <a:fillRect l="-65269" t="-301333" r="-321557" b="-10667"/>
                           </a:stretch>
                         </a:blipFill>
                       </a:tcPr>
@@ -7556,43 +9091,44 @@
                           <a:pPr algn="ctr"/>
                           <a:r>
                             <a:rPr lang="en-US" sz="1200" dirty="0"/>
-                            <a:t>4.743</a:t>
-                          </a:r>
-                        </a:p>
-                      </a:txBody>
-                      <a:tcPr anchor="ctr"/>
-                    </a:tc>
-                    <a:tc>
-                      <a:txBody>
-                        <a:bodyPr/>
-                        <a:lstStyle/>
-                        <a:p>
-                          <a:pPr algn="ctr"/>
-                          <a:r>
-                            <a:rPr lang="en-US" sz="1200" dirty="0"/>
-                            <a:t>2.494</a:t>
-                          </a:r>
-                        </a:p>
-                      </a:txBody>
-                      <a:tcPr anchor="ctr"/>
-                    </a:tc>
-                    <a:tc>
-                      <a:txBody>
-                        <a:bodyPr/>
-                        <a:lstStyle/>
-                        <a:p>
-                          <a:pPr algn="ctr"/>
-                          <a:r>
-                            <a:rPr lang="en-US" sz="1200" dirty="0"/>
-                            <a:t>1.729</a:t>
-                          </a:r>
+                            <a:t>4.723</a:t>
+                          </a:r>
+                        </a:p>
+                      </a:txBody>
+                      <a:tcPr anchor="ctr"/>
+                    </a:tc>
+                    <a:tc>
+                      <a:txBody>
+                        <a:bodyPr/>
+                        <a:lstStyle/>
+                        <a:p>
+                          <a:pPr algn="ctr"/>
+                          <a:r>
+                            <a:rPr lang="en-US" sz="1200" dirty="0"/>
+                            <a:t>2.470</a:t>
+                          </a:r>
+                        </a:p>
+                      </a:txBody>
+                      <a:tcPr anchor="ctr"/>
+                    </a:tc>
+                    <a:tc>
+                      <a:txBody>
+                        <a:bodyPr/>
+                        <a:lstStyle/>
+                        <a:p>
+                          <a:pPr algn="ctr"/>
+                          <a:r>
+                            <a:rPr lang="en-US" sz="1200" dirty="0" smtClean="0"/>
+                            <a:t>1.896</a:t>
+                          </a:r>
+                          <a:endParaRPr lang="en-US" sz="1200" dirty="0"/>
                         </a:p>
                       </a:txBody>
                       <a:tcPr anchor="ctr"/>
                     </a:tc>
                     <a:extLst>
                       <a:ext uri="{0D108BD9-81ED-4DB2-BD59-A6C34878D82A}">
-                        <a16:rowId xmlns:a16="http://schemas.microsoft.com/office/drawing/2014/main" val="10003"/>
+                        <a16:rowId xmlns:a16="http://schemas.microsoft.com/office/drawing/2014/main" xmlns:a14="http://schemas.microsoft.com/office/drawing/2010/main" xmlns="" val="10003"/>
                       </a:ext>
                     </a:extLst>
                   </a:tr>
@@ -7607,7 +9143,7 @@
           <p:cNvPr id="2" name="TextBox 1">
             <a:extLst>
               <a:ext uri="{FF2B5EF4-FFF2-40B4-BE49-F238E27FC236}">
-                <a16:creationId xmlns:a16="http://schemas.microsoft.com/office/drawing/2014/main" id="{AA70D9EB-9FA9-459F-981E-5061D572C3E4}"/>
+                <a16:creationId xmlns:a16="http://schemas.microsoft.com/office/drawing/2014/main" xmlns="" id="{AA70D9EB-9FA9-459F-981E-5061D572C3E4}"/>
               </a:ext>
             </a:extLst>
           </p:cNvPr>
@@ -8051,7 +9587,7 @@
     </a:clrScheme>
     <a:fontScheme name="Office">
       <a:majorFont>
-        <a:latin typeface="Calibri Light" panose="020F0302020204030204"/>
+        <a:latin typeface="Calibri Light"/>
         <a:ea typeface=""/>
         <a:cs typeface=""/>
         <a:font script="Jpan" typeface="ＭＳ Ｐゴシック"/>
@@ -8086,7 +9622,7 @@
         <a:font script="Geor" typeface="Sylfaen"/>
       </a:majorFont>
       <a:minorFont>
-        <a:latin typeface="Calibri" panose="020F0502020204030204"/>
+        <a:latin typeface="Calibri"/>
         <a:ea typeface=""/>
         <a:cs typeface=""/>
         <a:font script="Jpan" typeface="ＭＳ Ｐゴシック"/>
@@ -8263,7 +9799,7 @@
   <a:extraClrSchemeLst/>
   <a:extLst>
     <a:ext uri="{05A4C25C-085E-4340-85A3-A5531E510DB2}">
-      <thm15:themeFamily xmlns:thm15="http://schemas.microsoft.com/office/thememl/2012/main" name="Office Theme" id="{62F939B6-93AF-4DB8-9C6B-D6C7DFDC589F}" vid="{4A3C46E8-61CC-4603-A589-7422A47A8E4A}"/>
+      <thm15:themeFamily xmlns:thm15="http://schemas.microsoft.com/office/thememl/2012/main" xmlns="" name="Office Theme" id="{62F939B6-93AF-4DB8-9C6B-D6C7DFDC589F}" vid="{4A3C46E8-61CC-4603-A589-7422A47A8E4A}"/>
     </a:ext>
   </a:extLst>
 </a:theme>

</xml_diff>